<commit_message>
updated slides from Barry's comments
This needs to get repeated in each of the 5 modules.
</commit_message>
<xml_diff>
--- a/Slides/MVA-What'sNewC#6-Module1.pptx
+++ b/Slides/MVA-What'sNewC#6-Module1.pptx
@@ -7,10 +7,10 @@
     <p:sldMasterId id="2147483871" r:id="rId6"/>
   </p:sldMasterIdLst>
   <p:notesMasterIdLst>
-    <p:notesMasterId r:id="rId17"/>
+    <p:notesMasterId r:id="rId23"/>
   </p:notesMasterIdLst>
   <p:handoutMasterIdLst>
-    <p:handoutMasterId r:id="rId18"/>
+    <p:handoutMasterId r:id="rId24"/>
   </p:handoutMasterIdLst>
   <p:sldIdLst>
     <p:sldId id="286" r:id="rId7"/>
@@ -21,8 +21,14 @@
     <p:sldId id="289" r:id="rId12"/>
     <p:sldId id="288" r:id="rId13"/>
     <p:sldId id="285" r:id="rId14"/>
-    <p:sldId id="267" r:id="rId15"/>
-    <p:sldId id="290" r:id="rId16"/>
+    <p:sldId id="291" r:id="rId15"/>
+    <p:sldId id="292" r:id="rId16"/>
+    <p:sldId id="267" r:id="rId17"/>
+    <p:sldId id="293" r:id="rId18"/>
+    <p:sldId id="294" r:id="rId19"/>
+    <p:sldId id="295" r:id="rId20"/>
+    <p:sldId id="296" r:id="rId21"/>
+    <p:sldId id="290" r:id="rId22"/>
   </p:sldIdLst>
   <p:sldSz cx="12188825" cy="6858000"/>
   <p:notesSz cx="6858000" cy="9144000"/>
@@ -353,7 +359,7 @@
                 <a:latin typeface="Segoe UI" pitchFamily="34" charset="0"/>
               </a:rPr>
               <a:pPr/>
-              <a:t>3/3/2015</a:t>
+              <a:t>3/4/2015</a:t>
             </a:fld>
             <a:endParaRPr lang="en-US" dirty="0">
               <a:latin typeface="Segoe UI" pitchFamily="34" charset="0"/>
@@ -574,7 +580,7 @@
             <a:fld id="{7C3FBCD4-166E-446F-AF18-7D4A0CF9AEF6}" type="datetimeFigureOut">
               <a:rPr lang="en-US" smtClean="0"/>
               <a:pPr/>
-              <a:t>3/3/2015</a:t>
+              <a:t>3/4/2015</a:t>
             </a:fld>
             <a:endParaRPr lang="en-US" dirty="0"/>
           </a:p>
@@ -1013,6 +1019,261 @@
 </p:notes>
 </file>
 
+<file path=ppt/notesSlides/notesSlide10.xml><?xml version="1.0" encoding="utf-8"?>
+<p:notes xmlns:a="http://schemas.openxmlformats.org/drawingml/2006/main" xmlns:r="http://schemas.openxmlformats.org/officeDocument/2006/relationships" xmlns:p="http://schemas.openxmlformats.org/presentationml/2006/main">
+  <p:cSld>
+    <p:spTree>
+      <p:nvGrpSpPr>
+        <p:cNvPr id="1" name=""/>
+        <p:cNvGrpSpPr/>
+        <p:nvPr/>
+      </p:nvGrpSpPr>
+      <p:grpSpPr>
+        <a:xfrm>
+          <a:off x="0" y="0"/>
+          <a:ext cx="0" cy="0"/>
+          <a:chOff x="0" y="0"/>
+          <a:chExt cx="0" cy="0"/>
+        </a:xfrm>
+      </p:grpSpPr>
+      <p:sp>
+        <p:nvSpPr>
+          <p:cNvPr id="2" name="Slide Image Placeholder 1"/>
+          <p:cNvSpPr>
+            <a:spLocks noGrp="1" noRot="1" noChangeAspect="1"/>
+          </p:cNvSpPr>
+          <p:nvPr>
+            <p:ph type="sldImg"/>
+          </p:nvPr>
+        </p:nvSpPr>
+        <p:spPr/>
+      </p:sp>
+      <p:sp>
+        <p:nvSpPr>
+          <p:cNvPr id="3" name="Notes Placeholder 2"/>
+          <p:cNvSpPr>
+            <a:spLocks noGrp="1"/>
+          </p:cNvSpPr>
+          <p:nvPr>
+            <p:ph type="body" idx="1"/>
+          </p:nvPr>
+        </p:nvSpPr>
+        <p:spPr/>
+        <p:txBody>
+          <a:bodyPr/>
+          <a:lstStyle/>
+          <a:p>
+            <a:endParaRPr lang="en-US" dirty="0"/>
+          </a:p>
+        </p:txBody>
+      </p:sp>
+      <p:sp>
+        <p:nvSpPr>
+          <p:cNvPr id="4" name="Slide Number Placeholder 3"/>
+          <p:cNvSpPr>
+            <a:spLocks noGrp="1"/>
+          </p:cNvSpPr>
+          <p:nvPr>
+            <p:ph type="sldNum" sz="quarter" idx="10"/>
+          </p:nvPr>
+        </p:nvSpPr>
+        <p:spPr/>
+        <p:txBody>
+          <a:bodyPr/>
+          <a:lstStyle/>
+          <a:p>
+            <a:fld id="{8B263312-38AA-4E1E-B2B5-0F8F122B24FE}" type="slidenum">
+              <a:rPr lang="en-US" smtClean="0"/>
+              <a:pPr/>
+              <a:t>11</a:t>
+            </a:fld>
+            <a:endParaRPr lang="en-US" dirty="0"/>
+          </a:p>
+        </p:txBody>
+      </p:sp>
+    </p:spTree>
+    <p:extLst>
+      <p:ext uri="{BB962C8B-B14F-4D97-AF65-F5344CB8AC3E}">
+        <p14:creationId xmlns:p14="http://schemas.microsoft.com/office/powerpoint/2010/main" val="2115829590"/>
+      </p:ext>
+    </p:extLst>
+  </p:cSld>
+  <p:clrMapOvr>
+    <a:masterClrMapping/>
+  </p:clrMapOvr>
+</p:notes>
+</file>
+
+<file path=ppt/notesSlides/notesSlide11.xml><?xml version="1.0" encoding="utf-8"?>
+<p:notes xmlns:a="http://schemas.openxmlformats.org/drawingml/2006/main" xmlns:r="http://schemas.openxmlformats.org/officeDocument/2006/relationships" xmlns:p="http://schemas.openxmlformats.org/presentationml/2006/main">
+  <p:cSld>
+    <p:spTree>
+      <p:nvGrpSpPr>
+        <p:cNvPr id="1" name=""/>
+        <p:cNvGrpSpPr/>
+        <p:nvPr/>
+      </p:nvGrpSpPr>
+      <p:grpSpPr>
+        <a:xfrm>
+          <a:off x="0" y="0"/>
+          <a:ext cx="0" cy="0"/>
+          <a:chOff x="0" y="0"/>
+          <a:chExt cx="0" cy="0"/>
+        </a:xfrm>
+      </p:grpSpPr>
+      <p:sp>
+        <p:nvSpPr>
+          <p:cNvPr id="2" name="Slide Image Placeholder 1"/>
+          <p:cNvSpPr>
+            <a:spLocks noGrp="1" noRot="1" noChangeAspect="1"/>
+          </p:cNvSpPr>
+          <p:nvPr>
+            <p:ph type="sldImg"/>
+          </p:nvPr>
+        </p:nvSpPr>
+        <p:spPr/>
+      </p:sp>
+      <p:sp>
+        <p:nvSpPr>
+          <p:cNvPr id="3" name="Notes Placeholder 2"/>
+          <p:cNvSpPr>
+            <a:spLocks noGrp="1"/>
+          </p:cNvSpPr>
+          <p:nvPr>
+            <p:ph type="body" idx="1"/>
+          </p:nvPr>
+        </p:nvSpPr>
+        <p:spPr/>
+        <p:txBody>
+          <a:bodyPr/>
+          <a:lstStyle/>
+          <a:p>
+            <a:endParaRPr lang="en-US" dirty="0"/>
+          </a:p>
+        </p:txBody>
+      </p:sp>
+      <p:sp>
+        <p:nvSpPr>
+          <p:cNvPr id="4" name="Slide Number Placeholder 3"/>
+          <p:cNvSpPr>
+            <a:spLocks noGrp="1"/>
+          </p:cNvSpPr>
+          <p:nvPr>
+            <p:ph type="sldNum" sz="quarter" idx="10"/>
+          </p:nvPr>
+        </p:nvSpPr>
+        <p:spPr/>
+        <p:txBody>
+          <a:bodyPr/>
+          <a:lstStyle/>
+          <a:p>
+            <a:fld id="{8B263312-38AA-4E1E-B2B5-0F8F122B24FE}" type="slidenum">
+              <a:rPr lang="en-US" smtClean="0"/>
+              <a:pPr/>
+              <a:t>13</a:t>
+            </a:fld>
+            <a:endParaRPr lang="en-US" dirty="0"/>
+          </a:p>
+        </p:txBody>
+      </p:sp>
+    </p:spTree>
+    <p:extLst>
+      <p:ext uri="{BB962C8B-B14F-4D97-AF65-F5344CB8AC3E}">
+        <p14:creationId xmlns:p14="http://schemas.microsoft.com/office/powerpoint/2010/main" val="3774424232"/>
+      </p:ext>
+    </p:extLst>
+  </p:cSld>
+  <p:clrMapOvr>
+    <a:masterClrMapping/>
+  </p:clrMapOvr>
+</p:notes>
+</file>
+
+<file path=ppt/notesSlides/notesSlide12.xml><?xml version="1.0" encoding="utf-8"?>
+<p:notes xmlns:a="http://schemas.openxmlformats.org/drawingml/2006/main" xmlns:r="http://schemas.openxmlformats.org/officeDocument/2006/relationships" xmlns:p="http://schemas.openxmlformats.org/presentationml/2006/main">
+  <p:cSld>
+    <p:spTree>
+      <p:nvGrpSpPr>
+        <p:cNvPr id="1" name=""/>
+        <p:cNvGrpSpPr/>
+        <p:nvPr/>
+      </p:nvGrpSpPr>
+      <p:grpSpPr>
+        <a:xfrm>
+          <a:off x="0" y="0"/>
+          <a:ext cx="0" cy="0"/>
+          <a:chOff x="0" y="0"/>
+          <a:chExt cx="0" cy="0"/>
+        </a:xfrm>
+      </p:grpSpPr>
+      <p:sp>
+        <p:nvSpPr>
+          <p:cNvPr id="2" name="Slide Image Placeholder 1"/>
+          <p:cNvSpPr>
+            <a:spLocks noGrp="1" noRot="1" noChangeAspect="1"/>
+          </p:cNvSpPr>
+          <p:nvPr>
+            <p:ph type="sldImg"/>
+          </p:nvPr>
+        </p:nvSpPr>
+        <p:spPr/>
+      </p:sp>
+      <p:sp>
+        <p:nvSpPr>
+          <p:cNvPr id="3" name="Notes Placeholder 2"/>
+          <p:cNvSpPr>
+            <a:spLocks noGrp="1"/>
+          </p:cNvSpPr>
+          <p:nvPr>
+            <p:ph type="body" idx="1"/>
+          </p:nvPr>
+        </p:nvSpPr>
+        <p:spPr/>
+        <p:txBody>
+          <a:bodyPr/>
+          <a:lstStyle/>
+          <a:p>
+            <a:endParaRPr lang="en-US" dirty="0"/>
+          </a:p>
+        </p:txBody>
+      </p:sp>
+      <p:sp>
+        <p:nvSpPr>
+          <p:cNvPr id="4" name="Slide Number Placeholder 3"/>
+          <p:cNvSpPr>
+            <a:spLocks noGrp="1"/>
+          </p:cNvSpPr>
+          <p:nvPr>
+            <p:ph type="sldNum" sz="quarter" idx="10"/>
+          </p:nvPr>
+        </p:nvSpPr>
+        <p:spPr/>
+        <p:txBody>
+          <a:bodyPr/>
+          <a:lstStyle/>
+          <a:p>
+            <a:fld id="{8B263312-38AA-4E1E-B2B5-0F8F122B24FE}" type="slidenum">
+              <a:rPr lang="en-US" smtClean="0"/>
+              <a:pPr/>
+              <a:t>15</a:t>
+            </a:fld>
+            <a:endParaRPr lang="en-US" dirty="0"/>
+          </a:p>
+        </p:txBody>
+      </p:sp>
+    </p:spTree>
+    <p:extLst>
+      <p:ext uri="{BB962C8B-B14F-4D97-AF65-F5344CB8AC3E}">
+        <p14:creationId xmlns:p14="http://schemas.microsoft.com/office/powerpoint/2010/main" val="2023145165"/>
+      </p:ext>
+    </p:extLst>
+  </p:cSld>
+  <p:clrMapOvr>
+    <a:masterClrMapping/>
+  </p:clrMapOvr>
+</p:notes>
+</file>
+
 <file path=ppt/notesSlides/notesSlide2.xml><?xml version="1.0" encoding="utf-8"?>
 <p:notes xmlns:a="http://schemas.openxmlformats.org/drawingml/2006/main" xmlns:r="http://schemas.openxmlformats.org/officeDocument/2006/relationships" xmlns:p="http://schemas.openxmlformats.org/presentationml/2006/main">
   <p:cSld>
@@ -1651,7 +1912,7 @@
     </p:spTree>
     <p:extLst>
       <p:ext uri="{BB962C8B-B14F-4D97-AF65-F5344CB8AC3E}">
-        <p14:creationId xmlns:p14="http://schemas.microsoft.com/office/powerpoint/2010/main" val="2115829590"/>
+        <p14:creationId xmlns:p14="http://schemas.microsoft.com/office/powerpoint/2010/main" val="3003590158"/>
       </p:ext>
     </p:extLst>
   </p:cSld>
@@ -10907,6 +11168,588 @@
           <a:chExt cx="0" cy="0"/>
         </a:xfrm>
       </p:grpSpPr>
+      <p:sp>
+        <p:nvSpPr>
+          <p:cNvPr id="2" name="Text Placeholder 1"/>
+          <p:cNvSpPr>
+            <a:spLocks noGrp="1"/>
+          </p:cNvSpPr>
+          <p:nvPr>
+            <p:ph type="body" sz="quarter" idx="10"/>
+          </p:nvPr>
+        </p:nvSpPr>
+        <p:spPr/>
+        <p:txBody>
+          <a:bodyPr/>
+          <a:lstStyle/>
+          <a:p>
+            <a:r>
+              <a:rPr lang="en-US" sz="3600" dirty="0">
+                <a:ln w="0"/>
+                <a:effectLst>
+                  <a:outerShdw blurRad="38100" dist="19050" dir="2700000" algn="tl" rotWithShape="0">
+                    <a:schemeClr val="dk1">
+                      <a:alpha val="40000"/>
+                    </a:schemeClr>
+                  </a:outerShdw>
+                </a:effectLst>
+              </a:rPr>
+              <a:t>Expression Bodied Members</a:t>
+            </a:r>
+          </a:p>
+          <a:p>
+            <a:endParaRPr lang="en-US" dirty="0"/>
+          </a:p>
+        </p:txBody>
+      </p:sp>
+      <p:sp>
+        <p:nvSpPr>
+          <p:cNvPr id="3" name="Subtitle 2"/>
+          <p:cNvSpPr>
+            <a:spLocks noGrp="1"/>
+          </p:cNvSpPr>
+          <p:nvPr>
+            <p:ph type="subTitle" idx="1"/>
+          </p:nvPr>
+        </p:nvSpPr>
+        <p:spPr/>
+        <p:txBody>
+          <a:bodyPr/>
+          <a:lstStyle/>
+          <a:p>
+            <a:endParaRPr lang="en-US"/>
+          </a:p>
+        </p:txBody>
+      </p:sp>
+    </p:spTree>
+    <p:extLst>
+      <p:ext uri="{BB962C8B-B14F-4D97-AF65-F5344CB8AC3E}">
+        <p14:creationId xmlns:p14="http://schemas.microsoft.com/office/powerpoint/2010/main" val="343548084"/>
+      </p:ext>
+    </p:extLst>
+  </p:cSld>
+  <p:clrMapOvr>
+    <a:masterClrMapping/>
+  </p:clrMapOvr>
+</p:sld>
+</file>
+
+<file path=ppt/slides/slide11.xml><?xml version="1.0" encoding="utf-8"?>
+<p:sld xmlns:a="http://schemas.openxmlformats.org/drawingml/2006/main" xmlns:r="http://schemas.openxmlformats.org/officeDocument/2006/relationships" xmlns:p="http://schemas.openxmlformats.org/presentationml/2006/main">
+  <p:cSld>
+    <p:spTree>
+      <p:nvGrpSpPr>
+        <p:cNvPr id="1" name=""/>
+        <p:cNvGrpSpPr/>
+        <p:nvPr/>
+      </p:nvGrpSpPr>
+      <p:grpSpPr>
+        <a:xfrm>
+          <a:off x="0" y="0"/>
+          <a:ext cx="0" cy="0"/>
+          <a:chOff x="0" y="0"/>
+          <a:chExt cx="0" cy="0"/>
+        </a:xfrm>
+      </p:grpSpPr>
+      <p:sp>
+        <p:nvSpPr>
+          <p:cNvPr id="4" name="Subtitle 3"/>
+          <p:cNvSpPr>
+            <a:spLocks noGrp="1"/>
+          </p:cNvSpPr>
+          <p:nvPr>
+            <p:ph type="subTitle" idx="1"/>
+          </p:nvPr>
+        </p:nvSpPr>
+        <p:spPr/>
+        <p:txBody>
+          <a:bodyPr/>
+          <a:lstStyle/>
+          <a:p>
+            <a:r>
+              <a:rPr lang="en-US" b="0" dirty="0"/>
+              <a:t>https://</a:t>
+            </a:r>
+            <a:r>
+              <a:rPr lang="en-US" b="0" dirty="0" smtClean="0"/>
+              <a:t>github.com/BillWagner/MVA-CSharp6 </a:t>
+            </a:r>
+            <a:r>
+              <a:rPr lang="en-US" dirty="0" smtClean="0"/>
+              <a:t>Expression Bodied </a:t>
+            </a:r>
+            <a:r>
+              <a:rPr lang="en-US" dirty="0" smtClean="0"/>
+              <a:t>Members</a:t>
+            </a:r>
+            <a:endParaRPr lang="en-US" dirty="0"/>
+          </a:p>
+        </p:txBody>
+      </p:sp>
+      <p:sp>
+        <p:nvSpPr>
+          <p:cNvPr id="2" name="Text Placeholder 1"/>
+          <p:cNvSpPr>
+            <a:spLocks noGrp="1"/>
+          </p:cNvSpPr>
+          <p:nvPr>
+            <p:ph type="body" sz="quarter" idx="10"/>
+          </p:nvPr>
+        </p:nvSpPr>
+        <p:spPr/>
+        <p:txBody>
+          <a:bodyPr/>
+          <a:lstStyle/>
+          <a:p>
+            <a:r>
+              <a:rPr lang="en-US" smtClean="0"/>
+              <a:t>demo</a:t>
+            </a:r>
+            <a:endParaRPr lang="en-US" dirty="0"/>
+          </a:p>
+        </p:txBody>
+      </p:sp>
+    </p:spTree>
+    <p:extLst>
+      <p:ext uri="{BB962C8B-B14F-4D97-AF65-F5344CB8AC3E}">
+        <p14:creationId xmlns:p14="http://schemas.microsoft.com/office/powerpoint/2010/main" val="3993867577"/>
+      </p:ext>
+    </p:extLst>
+  </p:cSld>
+  <p:clrMapOvr>
+    <a:masterClrMapping/>
+  </p:clrMapOvr>
+  <p:transition>
+    <p:fade/>
+  </p:transition>
+  <p:timing>
+    <p:tnLst>
+      <p:par>
+        <p:cTn id="1" dur="indefinite" restart="never" nodeType="tmRoot"/>
+      </p:par>
+    </p:tnLst>
+  </p:timing>
+</p:sld>
+</file>
+
+<file path=ppt/slides/slide12.xml><?xml version="1.0" encoding="utf-8"?>
+<p:sld xmlns:a="http://schemas.openxmlformats.org/drawingml/2006/main" xmlns:r="http://schemas.openxmlformats.org/officeDocument/2006/relationships" xmlns:p="http://schemas.openxmlformats.org/presentationml/2006/main">
+  <p:cSld>
+    <p:spTree>
+      <p:nvGrpSpPr>
+        <p:cNvPr id="1" name=""/>
+        <p:cNvGrpSpPr/>
+        <p:nvPr/>
+      </p:nvGrpSpPr>
+      <p:grpSpPr>
+        <a:xfrm>
+          <a:off x="0" y="0"/>
+          <a:ext cx="0" cy="0"/>
+          <a:chOff x="0" y="0"/>
+          <a:chExt cx="0" cy="0"/>
+        </a:xfrm>
+      </p:grpSpPr>
+      <p:sp>
+        <p:nvSpPr>
+          <p:cNvPr id="2" name="Text Placeholder 1"/>
+          <p:cNvSpPr>
+            <a:spLocks noGrp="1"/>
+          </p:cNvSpPr>
+          <p:nvPr>
+            <p:ph type="body" sz="quarter" idx="10"/>
+          </p:nvPr>
+        </p:nvSpPr>
+        <p:spPr/>
+        <p:txBody>
+          <a:bodyPr/>
+          <a:lstStyle/>
+          <a:p>
+            <a:r>
+              <a:rPr lang="en-US" sz="3600" dirty="0" smtClean="0">
+                <a:ln w="0"/>
+                <a:effectLst>
+                  <a:outerShdw blurRad="38100" dist="19050" dir="2700000" algn="tl" rotWithShape="0">
+                    <a:schemeClr val="dk1">
+                      <a:alpha val="40000"/>
+                    </a:schemeClr>
+                  </a:outerShdw>
+                </a:effectLst>
+              </a:rPr>
+              <a:t>Static </a:t>
+            </a:r>
+            <a:r>
+              <a:rPr lang="en-US" sz="3600" dirty="0" err="1" smtClean="0">
+                <a:ln w="0"/>
+                <a:effectLst>
+                  <a:outerShdw blurRad="38100" dist="19050" dir="2700000" algn="tl" rotWithShape="0">
+                    <a:schemeClr val="dk1">
+                      <a:alpha val="40000"/>
+                    </a:schemeClr>
+                  </a:outerShdw>
+                </a:effectLst>
+              </a:rPr>
+              <a:t>Usings</a:t>
+            </a:r>
+            <a:endParaRPr lang="en-US" sz="3600" dirty="0">
+              <a:ln w="0"/>
+              <a:effectLst>
+                <a:outerShdw blurRad="38100" dist="19050" dir="2700000" algn="tl" rotWithShape="0">
+                  <a:schemeClr val="dk1">
+                    <a:alpha val="40000"/>
+                  </a:schemeClr>
+                </a:outerShdw>
+              </a:effectLst>
+            </a:endParaRPr>
+          </a:p>
+          <a:p>
+            <a:endParaRPr lang="en-US" dirty="0"/>
+          </a:p>
+        </p:txBody>
+      </p:sp>
+      <p:sp>
+        <p:nvSpPr>
+          <p:cNvPr id="3" name="Subtitle 2"/>
+          <p:cNvSpPr>
+            <a:spLocks noGrp="1"/>
+          </p:cNvSpPr>
+          <p:nvPr>
+            <p:ph type="subTitle" idx="1"/>
+          </p:nvPr>
+        </p:nvSpPr>
+        <p:spPr/>
+        <p:txBody>
+          <a:bodyPr/>
+          <a:lstStyle/>
+          <a:p>
+            <a:endParaRPr lang="en-US"/>
+          </a:p>
+        </p:txBody>
+      </p:sp>
+    </p:spTree>
+    <p:extLst>
+      <p:ext uri="{BB962C8B-B14F-4D97-AF65-F5344CB8AC3E}">
+        <p14:creationId xmlns:p14="http://schemas.microsoft.com/office/powerpoint/2010/main" val="4223293305"/>
+      </p:ext>
+    </p:extLst>
+  </p:cSld>
+  <p:clrMapOvr>
+    <a:masterClrMapping/>
+  </p:clrMapOvr>
+</p:sld>
+</file>
+
+<file path=ppt/slides/slide13.xml><?xml version="1.0" encoding="utf-8"?>
+<p:sld xmlns:a="http://schemas.openxmlformats.org/drawingml/2006/main" xmlns:r="http://schemas.openxmlformats.org/officeDocument/2006/relationships" xmlns:p="http://schemas.openxmlformats.org/presentationml/2006/main">
+  <p:cSld>
+    <p:spTree>
+      <p:nvGrpSpPr>
+        <p:cNvPr id="1" name=""/>
+        <p:cNvGrpSpPr/>
+        <p:nvPr/>
+      </p:nvGrpSpPr>
+      <p:grpSpPr>
+        <a:xfrm>
+          <a:off x="0" y="0"/>
+          <a:ext cx="0" cy="0"/>
+          <a:chOff x="0" y="0"/>
+          <a:chExt cx="0" cy="0"/>
+        </a:xfrm>
+      </p:grpSpPr>
+      <p:sp>
+        <p:nvSpPr>
+          <p:cNvPr id="4" name="Subtitle 3"/>
+          <p:cNvSpPr>
+            <a:spLocks noGrp="1"/>
+          </p:cNvSpPr>
+          <p:nvPr>
+            <p:ph type="subTitle" idx="1"/>
+          </p:nvPr>
+        </p:nvSpPr>
+        <p:spPr/>
+        <p:txBody>
+          <a:bodyPr/>
+          <a:lstStyle/>
+          <a:p>
+            <a:r>
+              <a:rPr lang="en-US" b="0" dirty="0"/>
+              <a:t>https://</a:t>
+            </a:r>
+            <a:r>
+              <a:rPr lang="en-US" b="0" dirty="0" smtClean="0"/>
+              <a:t>github.com/BillWagner/MVA-CSharp6 </a:t>
+            </a:r>
+            <a:endParaRPr lang="en-US" b="0" dirty="0" smtClean="0"/>
+          </a:p>
+          <a:p>
+            <a:r>
+              <a:rPr lang="en-US" dirty="0" smtClean="0"/>
+              <a:t>Static </a:t>
+            </a:r>
+            <a:r>
+              <a:rPr lang="en-US" dirty="0" err="1" smtClean="0"/>
+              <a:t>Usings</a:t>
+            </a:r>
+            <a:endParaRPr lang="en-US" dirty="0"/>
+          </a:p>
+        </p:txBody>
+      </p:sp>
+      <p:sp>
+        <p:nvSpPr>
+          <p:cNvPr id="2" name="Text Placeholder 1"/>
+          <p:cNvSpPr>
+            <a:spLocks noGrp="1"/>
+          </p:cNvSpPr>
+          <p:nvPr>
+            <p:ph type="body" sz="quarter" idx="10"/>
+          </p:nvPr>
+        </p:nvSpPr>
+        <p:spPr/>
+        <p:txBody>
+          <a:bodyPr/>
+          <a:lstStyle/>
+          <a:p>
+            <a:r>
+              <a:rPr lang="en-US" smtClean="0"/>
+              <a:t>demo</a:t>
+            </a:r>
+            <a:endParaRPr lang="en-US" dirty="0"/>
+          </a:p>
+        </p:txBody>
+      </p:sp>
+    </p:spTree>
+    <p:extLst>
+      <p:ext uri="{BB962C8B-B14F-4D97-AF65-F5344CB8AC3E}">
+        <p14:creationId xmlns:p14="http://schemas.microsoft.com/office/powerpoint/2010/main" val="2280619018"/>
+      </p:ext>
+    </p:extLst>
+  </p:cSld>
+  <p:clrMapOvr>
+    <a:masterClrMapping/>
+  </p:clrMapOvr>
+  <p:transition>
+    <p:fade/>
+  </p:transition>
+  <p:timing>
+    <p:tnLst>
+      <p:par>
+        <p:cTn id="1" dur="indefinite" restart="never" nodeType="tmRoot"/>
+      </p:par>
+    </p:tnLst>
+  </p:timing>
+</p:sld>
+</file>
+
+<file path=ppt/slides/slide14.xml><?xml version="1.0" encoding="utf-8"?>
+<p:sld xmlns:a="http://schemas.openxmlformats.org/drawingml/2006/main" xmlns:r="http://schemas.openxmlformats.org/officeDocument/2006/relationships" xmlns:p="http://schemas.openxmlformats.org/presentationml/2006/main">
+  <p:cSld>
+    <p:spTree>
+      <p:nvGrpSpPr>
+        <p:cNvPr id="1" name=""/>
+        <p:cNvGrpSpPr/>
+        <p:nvPr/>
+      </p:nvGrpSpPr>
+      <p:grpSpPr>
+        <a:xfrm>
+          <a:off x="0" y="0"/>
+          <a:ext cx="0" cy="0"/>
+          <a:chOff x="0" y="0"/>
+          <a:chExt cx="0" cy="0"/>
+        </a:xfrm>
+      </p:grpSpPr>
+      <p:sp>
+        <p:nvSpPr>
+          <p:cNvPr id="2" name="Text Placeholder 1"/>
+          <p:cNvSpPr>
+            <a:spLocks noGrp="1"/>
+          </p:cNvSpPr>
+          <p:nvPr>
+            <p:ph type="body" sz="quarter" idx="10"/>
+          </p:nvPr>
+        </p:nvSpPr>
+        <p:spPr/>
+        <p:txBody>
+          <a:bodyPr/>
+          <a:lstStyle/>
+          <a:p>
+            <a:r>
+              <a:rPr lang="en-US" sz="3600" dirty="0" smtClean="0">
+                <a:ln w="0"/>
+                <a:effectLst>
+                  <a:outerShdw blurRad="38100" dist="19050" dir="2700000" algn="tl" rotWithShape="0">
+                    <a:schemeClr val="dk1">
+                      <a:alpha val="40000"/>
+                    </a:schemeClr>
+                  </a:outerShdw>
+                </a:effectLst>
+              </a:rPr>
+              <a:t>Null Coalescing Operator</a:t>
+            </a:r>
+            <a:endParaRPr lang="en-US" sz="3600" dirty="0">
+              <a:ln w="0"/>
+              <a:effectLst>
+                <a:outerShdw blurRad="38100" dist="19050" dir="2700000" algn="tl" rotWithShape="0">
+                  <a:schemeClr val="dk1">
+                    <a:alpha val="40000"/>
+                  </a:schemeClr>
+                </a:outerShdw>
+              </a:effectLst>
+            </a:endParaRPr>
+          </a:p>
+          <a:p>
+            <a:endParaRPr lang="en-US" dirty="0"/>
+          </a:p>
+        </p:txBody>
+      </p:sp>
+      <p:sp>
+        <p:nvSpPr>
+          <p:cNvPr id="3" name="Subtitle 2"/>
+          <p:cNvSpPr>
+            <a:spLocks noGrp="1"/>
+          </p:cNvSpPr>
+          <p:nvPr>
+            <p:ph type="subTitle" idx="1"/>
+          </p:nvPr>
+        </p:nvSpPr>
+        <p:spPr/>
+        <p:txBody>
+          <a:bodyPr/>
+          <a:lstStyle/>
+          <a:p>
+            <a:endParaRPr lang="en-US"/>
+          </a:p>
+        </p:txBody>
+      </p:sp>
+    </p:spTree>
+    <p:extLst>
+      <p:ext uri="{BB962C8B-B14F-4D97-AF65-F5344CB8AC3E}">
+        <p14:creationId xmlns:p14="http://schemas.microsoft.com/office/powerpoint/2010/main" val="3358675983"/>
+      </p:ext>
+    </p:extLst>
+  </p:cSld>
+  <p:clrMapOvr>
+    <a:masterClrMapping/>
+  </p:clrMapOvr>
+</p:sld>
+</file>
+
+<file path=ppt/slides/slide15.xml><?xml version="1.0" encoding="utf-8"?>
+<p:sld xmlns:a="http://schemas.openxmlformats.org/drawingml/2006/main" xmlns:r="http://schemas.openxmlformats.org/officeDocument/2006/relationships" xmlns:p="http://schemas.openxmlformats.org/presentationml/2006/main">
+  <p:cSld>
+    <p:spTree>
+      <p:nvGrpSpPr>
+        <p:cNvPr id="1" name=""/>
+        <p:cNvGrpSpPr/>
+        <p:nvPr/>
+      </p:nvGrpSpPr>
+      <p:grpSpPr>
+        <a:xfrm>
+          <a:off x="0" y="0"/>
+          <a:ext cx="0" cy="0"/>
+          <a:chOff x="0" y="0"/>
+          <a:chExt cx="0" cy="0"/>
+        </a:xfrm>
+      </p:grpSpPr>
+      <p:sp>
+        <p:nvSpPr>
+          <p:cNvPr id="4" name="Subtitle 3"/>
+          <p:cNvSpPr>
+            <a:spLocks noGrp="1"/>
+          </p:cNvSpPr>
+          <p:nvPr>
+            <p:ph type="subTitle" idx="1"/>
+          </p:nvPr>
+        </p:nvSpPr>
+        <p:spPr/>
+        <p:txBody>
+          <a:bodyPr/>
+          <a:lstStyle/>
+          <a:p>
+            <a:r>
+              <a:rPr lang="en-US" b="0" dirty="0"/>
+              <a:t>https://</a:t>
+            </a:r>
+            <a:r>
+              <a:rPr lang="en-US" b="0" dirty="0" smtClean="0"/>
+              <a:t>github.com/BillWagner/MVA-CSharp6 </a:t>
+            </a:r>
+            <a:endParaRPr lang="en-US" dirty="0"/>
+          </a:p>
+          <a:p>
+            <a:r>
+              <a:rPr lang="en-US" dirty="0" smtClean="0"/>
+              <a:t>Null </a:t>
+            </a:r>
+            <a:r>
+              <a:rPr lang="en-US" smtClean="0"/>
+              <a:t>Coalescing Operator (Elvis)</a:t>
+            </a:r>
+            <a:endParaRPr lang="en-US" dirty="0"/>
+          </a:p>
+        </p:txBody>
+      </p:sp>
+      <p:sp>
+        <p:nvSpPr>
+          <p:cNvPr id="2" name="Text Placeholder 1"/>
+          <p:cNvSpPr>
+            <a:spLocks noGrp="1"/>
+          </p:cNvSpPr>
+          <p:nvPr>
+            <p:ph type="body" sz="quarter" idx="10"/>
+          </p:nvPr>
+        </p:nvSpPr>
+        <p:spPr/>
+        <p:txBody>
+          <a:bodyPr/>
+          <a:lstStyle/>
+          <a:p>
+            <a:r>
+              <a:rPr lang="en-US" smtClean="0"/>
+              <a:t>demo</a:t>
+            </a:r>
+            <a:endParaRPr lang="en-US" dirty="0"/>
+          </a:p>
+        </p:txBody>
+      </p:sp>
+    </p:spTree>
+    <p:extLst>
+      <p:ext uri="{BB962C8B-B14F-4D97-AF65-F5344CB8AC3E}">
+        <p14:creationId xmlns:p14="http://schemas.microsoft.com/office/powerpoint/2010/main" val="3586491665"/>
+      </p:ext>
+    </p:extLst>
+  </p:cSld>
+  <p:clrMapOvr>
+    <a:masterClrMapping/>
+  </p:clrMapOvr>
+  <p:transition>
+    <p:fade/>
+  </p:transition>
+  <p:timing>
+    <p:tnLst>
+      <p:par>
+        <p:cTn id="1" dur="indefinite" restart="never" nodeType="tmRoot"/>
+      </p:par>
+    </p:tnLst>
+  </p:timing>
+</p:sld>
+</file>
+
+<file path=ppt/slides/slide16.xml><?xml version="1.0" encoding="utf-8"?>
+<p:sld xmlns:a="http://schemas.openxmlformats.org/drawingml/2006/main" xmlns:r="http://schemas.openxmlformats.org/officeDocument/2006/relationships" xmlns:p="http://schemas.openxmlformats.org/presentationml/2006/main">
+  <p:cSld>
+    <p:spTree>
+      <p:nvGrpSpPr>
+        <p:cNvPr id="1" name=""/>
+        <p:cNvGrpSpPr/>
+        <p:nvPr/>
+      </p:nvGrpSpPr>
+      <p:grpSpPr>
+        <a:xfrm>
+          <a:off x="0" y="0"/>
+          <a:ext cx="0" cy="0"/>
+          <a:chOff x="0" y="0"/>
+          <a:chExt cx="0" cy="0"/>
+        </a:xfrm>
+      </p:grpSpPr>
     </p:spTree>
     <p:extLst>
       <p:ext uri="{BB962C8B-B14F-4D97-AF65-F5344CB8AC3E}">
@@ -11770,7 +12613,7 @@
                 <a:gridCol w="11521532">
                   <a:extLst>
                     <a:ext uri="{9D8B030D-6E8A-4147-A177-3AD203B41FA5}">
-                      <a16:colId xmlns="" xmlns:a16="http://schemas.microsoft.com/office/drawing/2014/main" val="1632794655"/>
+                      <a16:colId xmlns:a16="http://schemas.microsoft.com/office/drawing/2014/main" xmlns="" val="1632794655"/>
                     </a:ext>
                   </a:extLst>
                 </a:gridCol>
@@ -11798,7 +12641,7 @@
                 </a:tc>
                 <a:extLst>
                   <a:ext uri="{0D108BD9-81ED-4DB2-BD59-A6C34878D82A}">
-                    <a16:rowId xmlns="" xmlns:a16="http://schemas.microsoft.com/office/drawing/2014/main" val="1789177411"/>
+                    <a16:rowId xmlns:a16="http://schemas.microsoft.com/office/drawing/2014/main" xmlns="" val="1789177411"/>
                   </a:ext>
                 </a:extLst>
               </a:tr>
@@ -11833,7 +12676,7 @@
                 </a:tc>
                 <a:extLst>
                   <a:ext uri="{0D108BD9-81ED-4DB2-BD59-A6C34878D82A}">
-                    <a16:rowId xmlns="" xmlns:a16="http://schemas.microsoft.com/office/drawing/2014/main" val="3842815335"/>
+                    <a16:rowId xmlns:a16="http://schemas.microsoft.com/office/drawing/2014/main" xmlns="" val="3842815335"/>
                   </a:ext>
                 </a:extLst>
               </a:tr>
@@ -11877,7 +12720,7 @@
                 </a:tc>
                 <a:extLst>
                   <a:ext uri="{0D108BD9-81ED-4DB2-BD59-A6C34878D82A}">
-                    <a16:rowId xmlns="" xmlns:a16="http://schemas.microsoft.com/office/drawing/2014/main" val="321066646"/>
+                    <a16:rowId xmlns:a16="http://schemas.microsoft.com/office/drawing/2014/main" xmlns="" val="321066646"/>
                   </a:ext>
                 </a:extLst>
               </a:tr>
@@ -11936,7 +12779,7 @@
                 </a:tc>
                 <a:extLst>
                   <a:ext uri="{0D108BD9-81ED-4DB2-BD59-A6C34878D82A}">
-                    <a16:rowId xmlns="" xmlns:a16="http://schemas.microsoft.com/office/drawing/2014/main" val="3812060533"/>
+                    <a16:rowId xmlns:a16="http://schemas.microsoft.com/office/drawing/2014/main" xmlns="" val="3812060533"/>
                   </a:ext>
                 </a:extLst>
               </a:tr>
@@ -11971,7 +12814,7 @@
                 </a:tc>
                 <a:extLst>
                   <a:ext uri="{0D108BD9-81ED-4DB2-BD59-A6C34878D82A}">
-                    <a16:rowId xmlns="" xmlns:a16="http://schemas.microsoft.com/office/drawing/2014/main" val="733235577"/>
+                    <a16:rowId xmlns:a16="http://schemas.microsoft.com/office/drawing/2014/main" xmlns="" val="733235577"/>
                   </a:ext>
                 </a:extLst>
               </a:tr>
@@ -12009,7 +12852,7 @@
                 </a:tc>
                 <a:extLst>
                   <a:ext uri="{0D108BD9-81ED-4DB2-BD59-A6C34878D82A}">
-                    <a16:rowId xmlns="" xmlns:a16="http://schemas.microsoft.com/office/drawing/2014/main" val="2343148695"/>
+                    <a16:rowId xmlns:a16="http://schemas.microsoft.com/office/drawing/2014/main" xmlns="" val="2343148695"/>
                   </a:ext>
                 </a:extLst>
               </a:tr>
@@ -12184,6 +13027,182 @@
           <a:lstStyle/>
           <a:p>
             <a:r>
+              <a:rPr lang="en-US" sz="4800" dirty="0" smtClean="0"/>
+              <a:t>Module Overview</a:t>
+            </a:r>
+            <a:endParaRPr lang="en-US" sz="4800" dirty="0"/>
+          </a:p>
+        </p:txBody>
+      </p:sp>
+      <p:sp>
+        <p:nvSpPr>
+          <p:cNvPr id="2" name="TextBox 1"/>
+          <p:cNvSpPr txBox="1"/>
+          <p:nvPr/>
+        </p:nvSpPr>
+        <p:spPr>
+          <a:xfrm flipH="1">
+            <a:off x="704882" y="2013815"/>
+            <a:ext cx="10450456" cy="1846659"/>
+          </a:xfrm>
+          <a:prstGeom prst="rect">
+            <a:avLst/>
+          </a:prstGeom>
+          <a:noFill/>
+        </p:spPr>
+        <p:txBody>
+          <a:bodyPr wrap="square" lIns="0" tIns="0" rIns="0" bIns="0" rtlCol="0" anchor="ctr">
+            <a:spAutoFit/>
+          </a:bodyPr>
+          <a:lstStyle/>
+          <a:p>
+            <a:pPr marL="857250" indent="-857250">
+              <a:buFont typeface="Arial" panose="020B0604020202020204" pitchFamily="34" charset="0"/>
+              <a:buChar char="•"/>
+            </a:pPr>
+            <a:r>
+              <a:rPr lang="en-US" sz="4000" dirty="0" smtClean="0">
+                <a:ln w="0"/>
+                <a:effectLst>
+                  <a:outerShdw blurRad="38100" dist="19050" dir="2700000" algn="tl" rotWithShape="0">
+                    <a:schemeClr val="dk1">
+                      <a:alpha val="40000"/>
+                    </a:schemeClr>
+                  </a:outerShdw>
+                </a:effectLst>
+              </a:rPr>
+              <a:t>Expression Bodied Members</a:t>
+            </a:r>
+          </a:p>
+          <a:p>
+            <a:pPr marL="857250" indent="-857250">
+              <a:buFont typeface="Arial" panose="020B0604020202020204" pitchFamily="34" charset="0"/>
+              <a:buChar char="•"/>
+            </a:pPr>
+            <a:r>
+              <a:rPr lang="en-US" sz="4000" dirty="0" smtClean="0">
+                <a:ln w="0"/>
+                <a:effectLst>
+                  <a:outerShdw blurRad="38100" dist="19050" dir="2700000" algn="tl" rotWithShape="0">
+                    <a:schemeClr val="dk1">
+                      <a:alpha val="40000"/>
+                    </a:schemeClr>
+                  </a:outerShdw>
+                </a:effectLst>
+              </a:rPr>
+              <a:t>Static </a:t>
+            </a:r>
+            <a:r>
+              <a:rPr lang="en-US" sz="4000" dirty="0" err="1" smtClean="0">
+                <a:ln w="0"/>
+                <a:effectLst>
+                  <a:outerShdw blurRad="38100" dist="19050" dir="2700000" algn="tl" rotWithShape="0">
+                    <a:schemeClr val="dk1">
+                      <a:alpha val="40000"/>
+                    </a:schemeClr>
+                  </a:outerShdw>
+                </a:effectLst>
+              </a:rPr>
+              <a:t>Usings</a:t>
+            </a:r>
+            <a:endParaRPr lang="en-US" sz="4000" dirty="0" smtClean="0">
+              <a:ln w="0"/>
+              <a:effectLst>
+                <a:outerShdw blurRad="38100" dist="19050" dir="2700000" algn="tl" rotWithShape="0">
+                  <a:schemeClr val="dk1">
+                    <a:alpha val="40000"/>
+                  </a:schemeClr>
+                </a:outerShdw>
+              </a:effectLst>
+            </a:endParaRPr>
+          </a:p>
+          <a:p>
+            <a:pPr marL="857250" indent="-857250">
+              <a:buFont typeface="Arial" panose="020B0604020202020204" pitchFamily="34" charset="0"/>
+              <a:buChar char="•"/>
+            </a:pPr>
+            <a:r>
+              <a:rPr lang="en-US" sz="4000" dirty="0" smtClean="0">
+                <a:ln w="0"/>
+                <a:effectLst>
+                  <a:outerShdw blurRad="38100" dist="19050" dir="2700000" algn="tl" rotWithShape="0">
+                    <a:schemeClr val="dk1">
+                      <a:alpha val="40000"/>
+                    </a:schemeClr>
+                  </a:outerShdw>
+                </a:effectLst>
+              </a:rPr>
+              <a:t>Null Coalescing Operator</a:t>
+            </a:r>
+            <a:endParaRPr lang="en-US" sz="4000" dirty="0" smtClean="0">
+              <a:ln w="0"/>
+              <a:effectLst>
+                <a:outerShdw blurRad="38100" dist="19050" dir="2700000" algn="tl" rotWithShape="0">
+                  <a:schemeClr val="dk1">
+                    <a:alpha val="40000"/>
+                  </a:schemeClr>
+                </a:outerShdw>
+              </a:effectLst>
+            </a:endParaRPr>
+          </a:p>
+        </p:txBody>
+      </p:sp>
+    </p:spTree>
+    <p:extLst>
+      <p:ext uri="{BB962C8B-B14F-4D97-AF65-F5344CB8AC3E}">
+        <p14:creationId xmlns:p14="http://schemas.microsoft.com/office/powerpoint/2010/main" val="326740596"/>
+      </p:ext>
+    </p:extLst>
+  </p:cSld>
+  <p:clrMapOvr>
+    <a:masterClrMapping/>
+  </p:clrMapOvr>
+  <p:transition>
+    <p:fade/>
+  </p:transition>
+  <p:timing>
+    <p:tnLst>
+      <p:par>
+        <p:cTn id="1" dur="indefinite" restart="never" nodeType="tmRoot"/>
+      </p:par>
+    </p:tnLst>
+  </p:timing>
+</p:sld>
+</file>
+
+<file path=ppt/slides/slide9.xml><?xml version="1.0" encoding="utf-8"?>
+<p:sld xmlns:a="http://schemas.openxmlformats.org/drawingml/2006/main" xmlns:r="http://schemas.openxmlformats.org/officeDocument/2006/relationships" xmlns:p="http://schemas.openxmlformats.org/presentationml/2006/main">
+  <p:cSld>
+    <p:spTree>
+      <p:nvGrpSpPr>
+        <p:cNvPr id="1" name=""/>
+        <p:cNvGrpSpPr/>
+        <p:nvPr/>
+      </p:nvGrpSpPr>
+      <p:grpSpPr>
+        <a:xfrm>
+          <a:off x="0" y="0"/>
+          <a:ext cx="0" cy="0"/>
+          <a:chOff x="0" y="0"/>
+          <a:chExt cx="0" cy="0"/>
+        </a:xfrm>
+      </p:grpSpPr>
+      <p:sp>
+        <p:nvSpPr>
+          <p:cNvPr id="5" name="Title 4"/>
+          <p:cNvSpPr>
+            <a:spLocks noGrp="1"/>
+          </p:cNvSpPr>
+          <p:nvPr>
+            <p:ph type="title"/>
+          </p:nvPr>
+        </p:nvSpPr>
+        <p:spPr/>
+        <p:txBody>
+          <a:bodyPr/>
+          <a:lstStyle/>
+          <a:p>
+            <a:r>
               <a:rPr lang="en-US" dirty="0" smtClean="0"/>
               <a:t>Features for concise code</a:t>
             </a:r>
@@ -14043,7 +15062,7 @@
     </p:spTree>
     <p:extLst>
       <p:ext uri="{BB962C8B-B14F-4D97-AF65-F5344CB8AC3E}">
-        <p14:creationId xmlns:p14="http://schemas.microsoft.com/office/powerpoint/2010/main" val="326740596"/>
+        <p14:creationId xmlns:p14="http://schemas.microsoft.com/office/powerpoint/2010/main" val="312953767"/>
       </p:ext>
     </p:extLst>
   </p:cSld>
@@ -14930,119 +15949,9 @@
     </p:tnLst>
     <p:bldLst>
       <p:bldP spid="9" grpId="0"/>
-      <p:bldP spid="10" grpId="0" uiExpand="1" build="p"/>
+      <p:bldP spid="10" grpId="0" build="p"/>
       <p:bldP spid="11" grpId="0" build="p"/>
     </p:bldLst>
-  </p:timing>
-</p:sld>
-</file>
-
-<file path=ppt/slides/slide9.xml><?xml version="1.0" encoding="utf-8"?>
-<p:sld xmlns:a="http://schemas.openxmlformats.org/drawingml/2006/main" xmlns:r="http://schemas.openxmlformats.org/officeDocument/2006/relationships" xmlns:p="http://schemas.openxmlformats.org/presentationml/2006/main">
-  <p:cSld>
-    <p:spTree>
-      <p:nvGrpSpPr>
-        <p:cNvPr id="1" name=""/>
-        <p:cNvGrpSpPr/>
-        <p:nvPr/>
-      </p:nvGrpSpPr>
-      <p:grpSpPr>
-        <a:xfrm>
-          <a:off x="0" y="0"/>
-          <a:ext cx="0" cy="0"/>
-          <a:chOff x="0" y="0"/>
-          <a:chExt cx="0" cy="0"/>
-        </a:xfrm>
-      </p:grpSpPr>
-      <p:sp>
-        <p:nvSpPr>
-          <p:cNvPr id="4" name="Subtitle 3"/>
-          <p:cNvSpPr>
-            <a:spLocks noGrp="1"/>
-          </p:cNvSpPr>
-          <p:nvPr>
-            <p:ph type="subTitle" idx="1"/>
-          </p:nvPr>
-        </p:nvSpPr>
-        <p:spPr/>
-        <p:txBody>
-          <a:bodyPr/>
-          <a:lstStyle/>
-          <a:p>
-            <a:r>
-              <a:rPr lang="en-US" b="0"/>
-              <a:t>https</a:t>
-            </a:r>
-            <a:r>
-              <a:rPr lang="en-US" b="0"/>
-              <a:t>://</a:t>
-            </a:r>
-            <a:r>
-              <a:rPr lang="en-US" b="0" smtClean="0"/>
-              <a:t>github.com/BillWagner/MVA-CSharp6 </a:t>
-            </a:r>
-            <a:r>
-              <a:rPr lang="en-US" smtClean="0"/>
-              <a:t>Expression </a:t>
-            </a:r>
-            <a:r>
-              <a:rPr lang="en-US" dirty="0" smtClean="0"/>
-              <a:t>Bodied Members, Static </a:t>
-            </a:r>
-            <a:r>
-              <a:rPr lang="en-US" dirty="0" err="1" smtClean="0"/>
-              <a:t>Usings</a:t>
-            </a:r>
-            <a:r>
-              <a:rPr lang="en-US" dirty="0" smtClean="0"/>
-              <a:t>, and Elvis</a:t>
-            </a:r>
-            <a:endParaRPr lang="en-US" dirty="0"/>
-          </a:p>
-        </p:txBody>
-      </p:sp>
-      <p:sp>
-        <p:nvSpPr>
-          <p:cNvPr id="2" name="Text Placeholder 1"/>
-          <p:cNvSpPr>
-            <a:spLocks noGrp="1"/>
-          </p:cNvSpPr>
-          <p:nvPr>
-            <p:ph type="body" sz="quarter" idx="10"/>
-          </p:nvPr>
-        </p:nvSpPr>
-        <p:spPr/>
-        <p:txBody>
-          <a:bodyPr/>
-          <a:lstStyle/>
-          <a:p>
-            <a:r>
-              <a:rPr lang="en-US" smtClean="0"/>
-              <a:t>demo</a:t>
-            </a:r>
-            <a:endParaRPr lang="en-US" dirty="0"/>
-          </a:p>
-        </p:txBody>
-      </p:sp>
-    </p:spTree>
-    <p:extLst>
-      <p:ext uri="{BB962C8B-B14F-4D97-AF65-F5344CB8AC3E}">
-        <p14:creationId xmlns:p14="http://schemas.microsoft.com/office/powerpoint/2010/main" val="3993867577"/>
-      </p:ext>
-    </p:extLst>
-  </p:cSld>
-  <p:clrMapOvr>
-    <a:masterClrMapping/>
-  </p:clrMapOvr>
-  <p:transition>
-    <p:fade/>
-  </p:transition>
-  <p:timing>
-    <p:tnLst>
-      <p:par>
-        <p:cTn id="1" dur="indefinite" restart="never" nodeType="tmRoot"/>
-      </p:par>
-    </p:tnLst>
   </p:timing>
 </p:sld>
 </file>
@@ -16475,21 +17384,12 @@
 </file>
 
 <file path=customXml/item1.xml><?xml version="1.0" encoding="utf-8"?>
-<p:properties xmlns:p="http://schemas.microsoft.com/office/2006/metadata/properties" xmlns:xsi="http://www.w3.org/2001/XMLSchema-instance" xmlns:pc="http://schemas.microsoft.com/office/infopath/2007/PartnerControls">
-  <documentManagement>
-    <TaxCatchAll xmlns="230e9df3-be65-4c73-a93b-d1236ebd677e"/>
-    <PublishingExpirationDate xmlns="http://schemas.microsoft.com/sharepoint/v3" xsi:nil="true"/>
-    <PublishingStartDate xmlns="http://schemas.microsoft.com/sharepoint/v3" xsi:nil="true"/>
-    <TaxKeywordTaxHTField xmlns="230e9df3-be65-4c73-a93b-d1236ebd677e">
-      <Terms xmlns="http://schemas.microsoft.com/office/infopath/2007/PartnerControls">
-        <TermInfo xmlns="http://schemas.microsoft.com/office/infopath/2007/PartnerControls">
-          <TermName xmlns="http://schemas.microsoft.com/office/infopath/2007/PartnerControls">&lt;Any Related Keywords&gt;</TermName>
-          <TermId xmlns="http://schemas.microsoft.com/office/infopath/2007/PartnerControls">11111111-1111-1111-1111-111111111111</TermId>
-        </TermInfo>
-      </Terms>
-    </TaxKeywordTaxHTField>
-  </documentManagement>
-</p:properties>
+<?mso-contentType ?>
+<FormTemplates xmlns="http://schemas.microsoft.com/sharepoint/v3/contenttype/forms">
+  <Display>DocumentLibraryForm</Display>
+  <Edit>DocumentLibraryForm</Edit>
+  <New>DocumentLibraryForm</New>
+</FormTemplates>
 </file>
 
 <file path=customXml/item2.xml><?xml version="1.0" encoding="utf-8"?>
@@ -16675,21 +17575,27 @@
 </file>
 
 <file path=customXml/item3.xml><?xml version="1.0" encoding="utf-8"?>
-<?mso-contentType ?>
-<FormTemplates xmlns="http://schemas.microsoft.com/sharepoint/v3/contenttype/forms">
-  <Display>DocumentLibraryForm</Display>
-  <Edit>DocumentLibraryForm</Edit>
-  <New>DocumentLibraryForm</New>
-</FormTemplates>
+<p:properties xmlns:p="http://schemas.microsoft.com/office/2006/metadata/properties" xmlns:xsi="http://www.w3.org/2001/XMLSchema-instance" xmlns:pc="http://schemas.microsoft.com/office/infopath/2007/PartnerControls">
+  <documentManagement>
+    <TaxCatchAll xmlns="230e9df3-be65-4c73-a93b-d1236ebd677e"/>
+    <PublishingExpirationDate xmlns="http://schemas.microsoft.com/sharepoint/v3" xsi:nil="true"/>
+    <PublishingStartDate xmlns="http://schemas.microsoft.com/sharepoint/v3" xsi:nil="true"/>
+    <TaxKeywordTaxHTField xmlns="230e9df3-be65-4c73-a93b-d1236ebd677e">
+      <Terms xmlns="http://schemas.microsoft.com/office/infopath/2007/PartnerControls">
+        <TermInfo xmlns="http://schemas.microsoft.com/office/infopath/2007/PartnerControls">
+          <TermName xmlns="http://schemas.microsoft.com/office/infopath/2007/PartnerControls">&lt;Any Related Keywords&gt;</TermName>
+          <TermId xmlns="http://schemas.microsoft.com/office/infopath/2007/PartnerControls">11111111-1111-1111-1111-111111111111</TermId>
+        </TermInfo>
+      </Terms>
+    </TaxKeywordTaxHTField>
+  </documentManagement>
+</p:properties>
 </file>
 
 <file path=customXml/itemProps1.xml><?xml version="1.0" encoding="utf-8"?>
-<ds:datastoreItem xmlns:ds="http://schemas.openxmlformats.org/officeDocument/2006/customXml" ds:itemID="{F990F116-B58F-4255-B05B-DA3808E0E5C6}">
+<ds:datastoreItem xmlns:ds="http://schemas.openxmlformats.org/officeDocument/2006/customXml" ds:itemID="{758FDAC0-319D-4A54-8D8E-1D42CB1F8004}">
   <ds:schemaRefs>
-    <ds:schemaRef ds:uri="http://schemas.microsoft.com/office/2006/metadata/properties"/>
-    <ds:schemaRef ds:uri="http://schemas.microsoft.com/office/infopath/2007/PartnerControls"/>
-    <ds:schemaRef ds:uri="230e9df3-be65-4c73-a93b-d1236ebd677e"/>
-    <ds:schemaRef ds:uri="http://schemas.microsoft.com/sharepoint/v3"/>
+    <ds:schemaRef ds:uri="http://schemas.microsoft.com/sharepoint/v3/contenttype/forms"/>
   </ds:schemaRefs>
 </ds:datastoreItem>
 </file>
@@ -16715,9 +17621,12 @@
 </file>
 
 <file path=customXml/itemProps3.xml><?xml version="1.0" encoding="utf-8"?>
-<ds:datastoreItem xmlns:ds="http://schemas.openxmlformats.org/officeDocument/2006/customXml" ds:itemID="{758FDAC0-319D-4A54-8D8E-1D42CB1F8004}">
+<ds:datastoreItem xmlns:ds="http://schemas.openxmlformats.org/officeDocument/2006/customXml" ds:itemID="{F990F116-B58F-4255-B05B-DA3808E0E5C6}">
   <ds:schemaRefs>
-    <ds:schemaRef ds:uri="http://schemas.microsoft.com/sharepoint/v3/contenttype/forms"/>
+    <ds:schemaRef ds:uri="http://schemas.microsoft.com/office/2006/metadata/properties"/>
+    <ds:schemaRef ds:uri="http://schemas.microsoft.com/office/infopath/2007/PartnerControls"/>
+    <ds:schemaRef ds:uri="230e9df3-be65-4c73-a93b-d1236ebd677e"/>
+    <ds:schemaRef ds:uri="http://schemas.microsoft.com/sharepoint/v3"/>
   </ds:schemaRefs>
 </ds:datastoreItem>
 </file>
</xml_diff>

<commit_message>
Add a summary slide
That way we can discuss the language features at the end of each module.
</commit_message>
<xml_diff>
--- a/Slides/MVA-What'sNewC#6-Module1.pptx
+++ b/Slides/MVA-What'sNewC#6-Module1.pptx
@@ -7,10 +7,10 @@
     <p:sldMasterId id="2147483871" r:id="rId6"/>
   </p:sldMasterIdLst>
   <p:notesMasterIdLst>
-    <p:notesMasterId r:id="rId23"/>
+    <p:notesMasterId r:id="rId24"/>
   </p:notesMasterIdLst>
   <p:handoutMasterIdLst>
-    <p:handoutMasterId r:id="rId24"/>
+    <p:handoutMasterId r:id="rId25"/>
   </p:handoutMasterIdLst>
   <p:sldIdLst>
     <p:sldId id="286" r:id="rId7"/>
@@ -28,7 +28,8 @@
     <p:sldId id="294" r:id="rId19"/>
     <p:sldId id="295" r:id="rId20"/>
     <p:sldId id="296" r:id="rId21"/>
-    <p:sldId id="290" r:id="rId22"/>
+    <p:sldId id="297" r:id="rId22"/>
+    <p:sldId id="290" r:id="rId23"/>
   </p:sldIdLst>
   <p:sldSz cx="12188825" cy="6858000"/>
   <p:notesSz cx="6858000" cy="9144000"/>
@@ -1265,6 +1266,91 @@
     <p:extLst>
       <p:ext uri="{BB962C8B-B14F-4D97-AF65-F5344CB8AC3E}">
         <p14:creationId xmlns:p14="http://schemas.microsoft.com/office/powerpoint/2010/main" val="2023145165"/>
+      </p:ext>
+    </p:extLst>
+  </p:cSld>
+  <p:clrMapOvr>
+    <a:masterClrMapping/>
+  </p:clrMapOvr>
+</p:notes>
+</file>
+
+<file path=ppt/notesSlides/notesSlide13.xml><?xml version="1.0" encoding="utf-8"?>
+<p:notes xmlns:a="http://schemas.openxmlformats.org/drawingml/2006/main" xmlns:r="http://schemas.openxmlformats.org/officeDocument/2006/relationships" xmlns:p="http://schemas.openxmlformats.org/presentationml/2006/main">
+  <p:cSld>
+    <p:spTree>
+      <p:nvGrpSpPr>
+        <p:cNvPr id="1" name=""/>
+        <p:cNvGrpSpPr/>
+        <p:nvPr/>
+      </p:nvGrpSpPr>
+      <p:grpSpPr>
+        <a:xfrm>
+          <a:off x="0" y="0"/>
+          <a:ext cx="0" cy="0"/>
+          <a:chOff x="0" y="0"/>
+          <a:chExt cx="0" cy="0"/>
+        </a:xfrm>
+      </p:grpSpPr>
+      <p:sp>
+        <p:nvSpPr>
+          <p:cNvPr id="2" name="Slide Image Placeholder 1"/>
+          <p:cNvSpPr>
+            <a:spLocks noGrp="1" noRot="1" noChangeAspect="1"/>
+          </p:cNvSpPr>
+          <p:nvPr>
+            <p:ph type="sldImg"/>
+          </p:nvPr>
+        </p:nvSpPr>
+        <p:spPr/>
+      </p:sp>
+      <p:sp>
+        <p:nvSpPr>
+          <p:cNvPr id="3" name="Notes Placeholder 2"/>
+          <p:cNvSpPr>
+            <a:spLocks noGrp="1"/>
+          </p:cNvSpPr>
+          <p:nvPr>
+            <p:ph type="body" idx="1"/>
+          </p:nvPr>
+        </p:nvSpPr>
+        <p:spPr/>
+        <p:txBody>
+          <a:bodyPr/>
+          <a:lstStyle/>
+          <a:p>
+            <a:endParaRPr lang="en-US" dirty="0"/>
+          </a:p>
+        </p:txBody>
+      </p:sp>
+      <p:sp>
+        <p:nvSpPr>
+          <p:cNvPr id="4" name="Slide Number Placeholder 3"/>
+          <p:cNvSpPr>
+            <a:spLocks noGrp="1"/>
+          </p:cNvSpPr>
+          <p:nvPr>
+            <p:ph type="sldNum" sz="quarter" idx="10"/>
+          </p:nvPr>
+        </p:nvSpPr>
+        <p:spPr/>
+        <p:txBody>
+          <a:bodyPr/>
+          <a:lstStyle/>
+          <a:p>
+            <a:fld id="{8B263312-38AA-4E1E-B2B5-0F8F122B24FE}" type="slidenum">
+              <a:rPr lang="en-US" smtClean="0"/>
+              <a:pPr/>
+              <a:t>16</a:t>
+            </a:fld>
+            <a:endParaRPr lang="en-US" dirty="0"/>
+          </a:p>
+        </p:txBody>
+      </p:sp>
+    </p:spTree>
+    <p:extLst>
+      <p:ext uri="{BB962C8B-B14F-4D97-AF65-F5344CB8AC3E}">
+        <p14:creationId xmlns:p14="http://schemas.microsoft.com/office/powerpoint/2010/main" val="1719034996"/>
       </p:ext>
     </p:extLst>
   </p:cSld>
@@ -11276,11 +11362,7 @@
             </a:r>
             <a:r>
               <a:rPr lang="en-US" dirty="0" smtClean="0"/>
-              <a:t>Expression Bodied </a:t>
-            </a:r>
-            <a:r>
-              <a:rPr lang="en-US" dirty="0" smtClean="0"/>
-              <a:t>Members</a:t>
+              <a:t>Expression Bodied Members</a:t>
             </a:r>
             <a:endParaRPr lang="en-US" dirty="0"/>
           </a:p>
@@ -11478,7 +11560,6 @@
               <a:rPr lang="en-US" b="0" dirty="0" smtClean="0"/>
               <a:t>github.com/BillWagner/MVA-CSharp6 </a:t>
             </a:r>
-            <a:endParaRPr lang="en-US" b="0" dirty="0" smtClean="0"/>
           </a:p>
           <a:p>
             <a:r>
@@ -11734,6 +11815,2792 @@
 </file>
 
 <file path=ppt/slides/slide16.xml><?xml version="1.0" encoding="utf-8"?>
+<p:sld xmlns:a="http://schemas.openxmlformats.org/drawingml/2006/main" xmlns:r="http://schemas.openxmlformats.org/officeDocument/2006/relationships" xmlns:p="http://schemas.openxmlformats.org/presentationml/2006/main">
+  <p:cSld>
+    <p:spTree>
+      <p:nvGrpSpPr>
+        <p:cNvPr id="1" name=""/>
+        <p:cNvGrpSpPr/>
+        <p:nvPr/>
+      </p:nvGrpSpPr>
+      <p:grpSpPr>
+        <a:xfrm>
+          <a:off x="0" y="0"/>
+          <a:ext cx="0" cy="0"/>
+          <a:chOff x="0" y="0"/>
+          <a:chExt cx="0" cy="0"/>
+        </a:xfrm>
+      </p:grpSpPr>
+      <p:sp>
+        <p:nvSpPr>
+          <p:cNvPr id="5" name="Title 4"/>
+          <p:cNvSpPr>
+            <a:spLocks noGrp="1"/>
+          </p:cNvSpPr>
+          <p:nvPr>
+            <p:ph type="title"/>
+          </p:nvPr>
+        </p:nvSpPr>
+        <p:spPr/>
+        <p:txBody>
+          <a:bodyPr/>
+          <a:lstStyle/>
+          <a:p>
+            <a:r>
+              <a:rPr lang="en-US" dirty="0" smtClean="0"/>
+              <a:t>Features for concise code</a:t>
+            </a:r>
+            <a:endParaRPr lang="en-US" dirty="0"/>
+          </a:p>
+        </p:txBody>
+      </p:sp>
+      <p:sp>
+        <p:nvSpPr>
+          <p:cNvPr id="9" name="Content Placeholder 5"/>
+          <p:cNvSpPr txBox="1">
+            <a:spLocks/>
+          </p:cNvSpPr>
+          <p:nvPr/>
+        </p:nvSpPr>
+        <p:spPr>
+          <a:xfrm>
+            <a:off x="451121" y="1521230"/>
+            <a:ext cx="4251960" cy="3429000"/>
+          </a:xfrm>
+          <a:prstGeom prst="rect">
+            <a:avLst/>
+          </a:prstGeom>
+        </p:spPr>
+        <p:txBody>
+          <a:bodyPr>
+            <a:normAutofit/>
+          </a:bodyPr>
+          <a:lstStyle>
+            <a:lvl1pPr marL="0" indent="0" algn="l" defTabSz="914363" rtl="0" eaLnBrk="1" latinLnBrk="0" hangingPunct="1">
+              <a:lnSpc>
+                <a:spcPct val="90000"/>
+              </a:lnSpc>
+              <a:spcBef>
+                <a:spcPct val="20000"/>
+              </a:spcBef>
+              <a:buClr>
+                <a:srgbClr val="00DCFF"/>
+              </a:buClr>
+              <a:buSzPct val="90000"/>
+              <a:buFont typeface="Arial" pitchFamily="34" charset="0"/>
+              <a:buNone/>
+              <a:defRPr sz="2400" kern="1200">
+                <a:solidFill>
+                  <a:schemeClr val="tx1">
+                    <a:lumMod val="75000"/>
+                    <a:lumOff val="25000"/>
+                    <a:alpha val="99000"/>
+                  </a:schemeClr>
+                </a:solidFill>
+                <a:latin typeface="+mn-lt"/>
+                <a:ea typeface="+mn-ea"/>
+                <a:cs typeface="+mn-cs"/>
+              </a:defRPr>
+            </a:lvl1pPr>
+            <a:lvl2pPr marL="460375" indent="0" algn="l" defTabSz="914363" rtl="0" eaLnBrk="1" latinLnBrk="0" hangingPunct="1">
+              <a:lnSpc>
+                <a:spcPct val="90000"/>
+              </a:lnSpc>
+              <a:spcBef>
+                <a:spcPct val="20000"/>
+              </a:spcBef>
+              <a:buClr>
+                <a:srgbClr val="00DCFF"/>
+              </a:buClr>
+              <a:buSzPct val="90000"/>
+              <a:buFont typeface="Arial" pitchFamily="34" charset="0"/>
+              <a:buNone/>
+              <a:defRPr sz="2000" kern="1200">
+                <a:solidFill>
+                  <a:schemeClr val="tx1">
+                    <a:lumMod val="75000"/>
+                    <a:lumOff val="25000"/>
+                    <a:alpha val="99000"/>
+                  </a:schemeClr>
+                </a:solidFill>
+                <a:latin typeface="+mn-lt"/>
+                <a:ea typeface="+mn-ea"/>
+                <a:cs typeface="+mn-cs"/>
+              </a:defRPr>
+            </a:lvl2pPr>
+            <a:lvl3pPr marL="855663" indent="0" algn="l" defTabSz="914363" rtl="0" eaLnBrk="1" latinLnBrk="0" hangingPunct="1">
+              <a:lnSpc>
+                <a:spcPct val="90000"/>
+              </a:lnSpc>
+              <a:spcBef>
+                <a:spcPct val="20000"/>
+              </a:spcBef>
+              <a:buClr>
+                <a:srgbClr val="00DCFF"/>
+              </a:buClr>
+              <a:buSzPct val="90000"/>
+              <a:buFont typeface="Arial" pitchFamily="34" charset="0"/>
+              <a:buNone/>
+              <a:defRPr sz="1800" kern="1200">
+                <a:solidFill>
+                  <a:schemeClr val="tx1">
+                    <a:lumMod val="75000"/>
+                    <a:lumOff val="25000"/>
+                    <a:alpha val="99000"/>
+                  </a:schemeClr>
+                </a:solidFill>
+                <a:latin typeface="+mn-lt"/>
+                <a:ea typeface="+mn-ea"/>
+                <a:cs typeface="+mn-cs"/>
+              </a:defRPr>
+            </a:lvl3pPr>
+            <a:lvl4pPr marL="1258888" indent="0" algn="l" defTabSz="914363" rtl="0" eaLnBrk="1" latinLnBrk="0" hangingPunct="1">
+              <a:lnSpc>
+                <a:spcPct val="90000"/>
+              </a:lnSpc>
+              <a:spcBef>
+                <a:spcPct val="20000"/>
+              </a:spcBef>
+              <a:buClr>
+                <a:srgbClr val="00DCFF"/>
+              </a:buClr>
+              <a:buSzPct val="90000"/>
+              <a:buFont typeface="Arial" pitchFamily="34" charset="0"/>
+              <a:buNone/>
+              <a:defRPr sz="1600" kern="1200">
+                <a:solidFill>
+                  <a:schemeClr val="tx1">
+                    <a:lumMod val="75000"/>
+                    <a:lumOff val="25000"/>
+                    <a:alpha val="99000"/>
+                  </a:schemeClr>
+                </a:solidFill>
+                <a:latin typeface="+mn-lt"/>
+                <a:ea typeface="+mn-ea"/>
+                <a:cs typeface="+mn-cs"/>
+              </a:defRPr>
+            </a:lvl4pPr>
+            <a:lvl5pPr marL="1604963" indent="0" algn="l" defTabSz="914363" rtl="0" eaLnBrk="1" latinLnBrk="0" hangingPunct="1">
+              <a:lnSpc>
+                <a:spcPct val="90000"/>
+              </a:lnSpc>
+              <a:spcBef>
+                <a:spcPct val="20000"/>
+              </a:spcBef>
+              <a:buClr>
+                <a:srgbClr val="00DCFF"/>
+              </a:buClr>
+              <a:buSzPct val="90000"/>
+              <a:buFont typeface="Arial" pitchFamily="34" charset="0"/>
+              <a:buNone/>
+              <a:defRPr sz="1600" kern="1200">
+                <a:solidFill>
+                  <a:schemeClr val="tx1">
+                    <a:lumMod val="75000"/>
+                    <a:lumOff val="25000"/>
+                    <a:alpha val="99000"/>
+                  </a:schemeClr>
+                </a:solidFill>
+                <a:latin typeface="+mn-lt"/>
+                <a:ea typeface="+mn-ea"/>
+                <a:cs typeface="+mn-cs"/>
+              </a:defRPr>
+            </a:lvl5pPr>
+            <a:lvl6pPr marL="2514499" indent="-228591" algn="l" defTabSz="914363" rtl="0" eaLnBrk="1" latinLnBrk="0" hangingPunct="1">
+              <a:spcBef>
+                <a:spcPct val="20000"/>
+              </a:spcBef>
+              <a:buFont typeface="Arial" pitchFamily="34" charset="0"/>
+              <a:buChar char="•"/>
+              <a:defRPr sz="2000" kern="1200">
+                <a:solidFill>
+                  <a:schemeClr val="tx1"/>
+                </a:solidFill>
+                <a:latin typeface="+mn-lt"/>
+                <a:ea typeface="+mn-ea"/>
+                <a:cs typeface="+mn-cs"/>
+              </a:defRPr>
+            </a:lvl6pPr>
+            <a:lvl7pPr marL="2971681" indent="-228591" algn="l" defTabSz="914363" rtl="0" eaLnBrk="1" latinLnBrk="0" hangingPunct="1">
+              <a:spcBef>
+                <a:spcPct val="20000"/>
+              </a:spcBef>
+              <a:buFont typeface="Arial" pitchFamily="34" charset="0"/>
+              <a:buChar char="•"/>
+              <a:defRPr sz="2000" kern="1200">
+                <a:solidFill>
+                  <a:schemeClr val="tx1"/>
+                </a:solidFill>
+                <a:latin typeface="+mn-lt"/>
+                <a:ea typeface="+mn-ea"/>
+                <a:cs typeface="+mn-cs"/>
+              </a:defRPr>
+            </a:lvl7pPr>
+            <a:lvl8pPr marL="3428863" indent="-228591" algn="l" defTabSz="914363" rtl="0" eaLnBrk="1" latinLnBrk="0" hangingPunct="1">
+              <a:spcBef>
+                <a:spcPct val="20000"/>
+              </a:spcBef>
+              <a:buFont typeface="Arial" pitchFamily="34" charset="0"/>
+              <a:buChar char="•"/>
+              <a:defRPr sz="2000" kern="1200">
+                <a:solidFill>
+                  <a:schemeClr val="tx1"/>
+                </a:solidFill>
+                <a:latin typeface="+mn-lt"/>
+                <a:ea typeface="+mn-ea"/>
+                <a:cs typeface="+mn-cs"/>
+              </a:defRPr>
+            </a:lvl8pPr>
+            <a:lvl9pPr marL="3886045" indent="-228591" algn="l" defTabSz="914363" rtl="0" eaLnBrk="1" latinLnBrk="0" hangingPunct="1">
+              <a:spcBef>
+                <a:spcPct val="20000"/>
+              </a:spcBef>
+              <a:buFont typeface="Arial" pitchFamily="34" charset="0"/>
+              <a:buChar char="•"/>
+              <a:defRPr sz="2000" kern="1200">
+                <a:solidFill>
+                  <a:schemeClr val="tx1"/>
+                </a:solidFill>
+                <a:latin typeface="+mn-lt"/>
+                <a:ea typeface="+mn-ea"/>
+                <a:cs typeface="+mn-cs"/>
+              </a:defRPr>
+            </a:lvl9pPr>
+          </a:lstStyle>
+          <a:p>
+            <a:pPr>
+              <a:lnSpc>
+                <a:spcPct val="107000"/>
+              </a:lnSpc>
+              <a:spcBef>
+                <a:spcPts val="0"/>
+              </a:spcBef>
+            </a:pPr>
+            <a:r>
+              <a:rPr lang="en-US" sz="1600" dirty="0" smtClean="0">
+                <a:solidFill>
+                  <a:srgbClr val="0000FF"/>
+                </a:solidFill>
+                <a:latin typeface="Consolas" panose="020B0609020204030204" pitchFamily="49" charset="0"/>
+                <a:ea typeface="Calibri" panose="020F0502020204030204" pitchFamily="34" charset="0"/>
+                <a:cs typeface="Consolas" panose="020B0609020204030204" pitchFamily="49" charset="0"/>
+              </a:rPr>
+              <a:t>using static</a:t>
+            </a:r>
+            <a:r>
+              <a:rPr lang="en-US" sz="1600" dirty="0" smtClean="0">
+                <a:solidFill>
+                  <a:srgbClr val="000000"/>
+                </a:solidFill>
+                <a:latin typeface="Consolas" panose="020B0609020204030204" pitchFamily="49" charset="0"/>
+                <a:ea typeface="Calibri" panose="020F0502020204030204" pitchFamily="34" charset="0"/>
+                <a:cs typeface="Consolas" panose="020B0609020204030204" pitchFamily="49" charset="0"/>
+              </a:rPr>
+              <a:t> </a:t>
+            </a:r>
+            <a:r>
+              <a:rPr lang="en-US" sz="1600" dirty="0" err="1" smtClean="0">
+                <a:solidFill>
+                  <a:srgbClr val="000000"/>
+                </a:solidFill>
+                <a:latin typeface="Consolas" panose="020B0609020204030204" pitchFamily="49" charset="0"/>
+                <a:ea typeface="Calibri" panose="020F0502020204030204" pitchFamily="34" charset="0"/>
+                <a:cs typeface="Consolas" panose="020B0609020204030204" pitchFamily="49" charset="0"/>
+              </a:rPr>
+              <a:t>System.</a:t>
+            </a:r>
+            <a:r>
+              <a:rPr lang="en-US" sz="1600" dirty="0" err="1" smtClean="0">
+                <a:solidFill>
+                  <a:srgbClr val="2B91AF"/>
+                </a:solidFill>
+                <a:latin typeface="Consolas" panose="020B0609020204030204" pitchFamily="49" charset="0"/>
+                <a:ea typeface="Calibri" panose="020F0502020204030204" pitchFamily="34" charset="0"/>
+                <a:cs typeface="Consolas" panose="020B0609020204030204" pitchFamily="49" charset="0"/>
+              </a:rPr>
+              <a:t>Math</a:t>
+            </a:r>
+            <a:r>
+              <a:rPr lang="en-US" sz="1600" dirty="0" smtClean="0">
+                <a:solidFill>
+                  <a:srgbClr val="000000"/>
+                </a:solidFill>
+                <a:latin typeface="Consolas" panose="020B0609020204030204" pitchFamily="49" charset="0"/>
+                <a:ea typeface="Calibri" panose="020F0502020204030204" pitchFamily="34" charset="0"/>
+                <a:cs typeface="Consolas" panose="020B0609020204030204" pitchFamily="49" charset="0"/>
+              </a:rPr>
+              <a:t>;</a:t>
+            </a:r>
+            <a:endParaRPr lang="en-US" sz="1600" dirty="0" smtClean="0">
+              <a:latin typeface="Consolas" panose="020B0609020204030204" pitchFamily="49" charset="0"/>
+              <a:ea typeface="Calibri" panose="020F0502020204030204" pitchFamily="34" charset="0"/>
+              <a:cs typeface="Consolas" panose="020B0609020204030204" pitchFamily="49" charset="0"/>
+            </a:endParaRPr>
+          </a:p>
+          <a:p>
+            <a:pPr>
+              <a:lnSpc>
+                <a:spcPct val="107000"/>
+              </a:lnSpc>
+              <a:spcBef>
+                <a:spcPts val="0"/>
+              </a:spcBef>
+            </a:pPr>
+            <a:r>
+              <a:rPr lang="en-US" sz="1600" dirty="0" smtClean="0">
+                <a:solidFill>
+                  <a:srgbClr val="000000"/>
+                </a:solidFill>
+                <a:latin typeface="Consolas" panose="020B0609020204030204" pitchFamily="49" charset="0"/>
+                <a:ea typeface="Calibri" panose="020F0502020204030204" pitchFamily="34" charset="0"/>
+                <a:cs typeface="Consolas" panose="020B0609020204030204" pitchFamily="49" charset="0"/>
+              </a:rPr>
+              <a:t> </a:t>
+            </a:r>
+            <a:endParaRPr lang="en-US" sz="1600" dirty="0" smtClean="0">
+              <a:latin typeface="Consolas" panose="020B0609020204030204" pitchFamily="49" charset="0"/>
+              <a:ea typeface="Calibri" panose="020F0502020204030204" pitchFamily="34" charset="0"/>
+              <a:cs typeface="Consolas" panose="020B0609020204030204" pitchFamily="49" charset="0"/>
+            </a:endParaRPr>
+          </a:p>
+          <a:p>
+            <a:pPr>
+              <a:lnSpc>
+                <a:spcPct val="107000"/>
+              </a:lnSpc>
+              <a:spcBef>
+                <a:spcPts val="0"/>
+              </a:spcBef>
+            </a:pPr>
+            <a:r>
+              <a:rPr lang="en-US" sz="1600" dirty="0" smtClean="0">
+                <a:solidFill>
+                  <a:srgbClr val="0000FF"/>
+                </a:solidFill>
+                <a:latin typeface="Consolas" panose="020B0609020204030204" pitchFamily="49" charset="0"/>
+                <a:ea typeface="Calibri" panose="020F0502020204030204" pitchFamily="34" charset="0"/>
+                <a:cs typeface="Consolas" panose="020B0609020204030204" pitchFamily="49" charset="0"/>
+              </a:rPr>
+              <a:t>namespace</a:t>
+            </a:r>
+            <a:r>
+              <a:rPr lang="en-US" sz="1600" dirty="0" smtClean="0">
+                <a:solidFill>
+                  <a:srgbClr val="000000"/>
+                </a:solidFill>
+                <a:latin typeface="Consolas" panose="020B0609020204030204" pitchFamily="49" charset="0"/>
+                <a:ea typeface="Calibri" panose="020F0502020204030204" pitchFamily="34" charset="0"/>
+                <a:cs typeface="Consolas" panose="020B0609020204030204" pitchFamily="49" charset="0"/>
+              </a:rPr>
+              <a:t> TourOfCSharp6</a:t>
+            </a:r>
+            <a:endParaRPr lang="en-US" sz="1600" dirty="0" smtClean="0">
+              <a:latin typeface="Consolas" panose="020B0609020204030204" pitchFamily="49" charset="0"/>
+              <a:ea typeface="Calibri" panose="020F0502020204030204" pitchFamily="34" charset="0"/>
+              <a:cs typeface="Consolas" panose="020B0609020204030204" pitchFamily="49" charset="0"/>
+            </a:endParaRPr>
+          </a:p>
+          <a:p>
+            <a:pPr>
+              <a:lnSpc>
+                <a:spcPct val="107000"/>
+              </a:lnSpc>
+              <a:spcBef>
+                <a:spcPts val="0"/>
+              </a:spcBef>
+            </a:pPr>
+            <a:r>
+              <a:rPr lang="en-US" sz="1600" dirty="0" smtClean="0">
+                <a:solidFill>
+                  <a:srgbClr val="000000"/>
+                </a:solidFill>
+                <a:latin typeface="Consolas" panose="020B0609020204030204" pitchFamily="49" charset="0"/>
+                <a:ea typeface="Calibri" panose="020F0502020204030204" pitchFamily="34" charset="0"/>
+                <a:cs typeface="Consolas" panose="020B0609020204030204" pitchFamily="49" charset="0"/>
+              </a:rPr>
+              <a:t>{ </a:t>
+            </a:r>
+            <a:endParaRPr lang="en-US" sz="1600" dirty="0" smtClean="0">
+              <a:latin typeface="Consolas" panose="020B0609020204030204" pitchFamily="49" charset="0"/>
+              <a:ea typeface="Calibri" panose="020F0502020204030204" pitchFamily="34" charset="0"/>
+              <a:cs typeface="Consolas" panose="020B0609020204030204" pitchFamily="49" charset="0"/>
+            </a:endParaRPr>
+          </a:p>
+          <a:p>
+            <a:pPr>
+              <a:lnSpc>
+                <a:spcPct val="107000"/>
+              </a:lnSpc>
+              <a:spcBef>
+                <a:spcPts val="0"/>
+              </a:spcBef>
+            </a:pPr>
+            <a:r>
+              <a:rPr lang="en-US" sz="1600" dirty="0" smtClean="0">
+                <a:solidFill>
+                  <a:srgbClr val="000000"/>
+                </a:solidFill>
+                <a:latin typeface="Consolas" panose="020B0609020204030204" pitchFamily="49" charset="0"/>
+                <a:ea typeface="Calibri" panose="020F0502020204030204" pitchFamily="34" charset="0"/>
+                <a:cs typeface="Consolas" panose="020B0609020204030204" pitchFamily="49" charset="0"/>
+              </a:rPr>
+              <a:t>  </a:t>
+            </a:r>
+            <a:r>
+              <a:rPr lang="en-US" sz="1600" dirty="0" smtClean="0">
+                <a:solidFill>
+                  <a:srgbClr val="0000FF"/>
+                </a:solidFill>
+                <a:latin typeface="Consolas" panose="020B0609020204030204" pitchFamily="49" charset="0"/>
+                <a:ea typeface="Calibri" panose="020F0502020204030204" pitchFamily="34" charset="0"/>
+                <a:cs typeface="Consolas" panose="020B0609020204030204" pitchFamily="49" charset="0"/>
+              </a:rPr>
+              <a:t>public</a:t>
+            </a:r>
+            <a:r>
+              <a:rPr lang="en-US" sz="1600" dirty="0" smtClean="0">
+                <a:solidFill>
+                  <a:srgbClr val="000000"/>
+                </a:solidFill>
+                <a:latin typeface="Consolas" panose="020B0609020204030204" pitchFamily="49" charset="0"/>
+                <a:ea typeface="Calibri" panose="020F0502020204030204" pitchFamily="34" charset="0"/>
+                <a:cs typeface="Consolas" panose="020B0609020204030204" pitchFamily="49" charset="0"/>
+              </a:rPr>
+              <a:t> </a:t>
+            </a:r>
+            <a:r>
+              <a:rPr lang="en-US" sz="1600" dirty="0" smtClean="0">
+                <a:solidFill>
+                  <a:srgbClr val="0000FF"/>
+                </a:solidFill>
+                <a:latin typeface="Consolas" panose="020B0609020204030204" pitchFamily="49" charset="0"/>
+                <a:ea typeface="Calibri" panose="020F0502020204030204" pitchFamily="34" charset="0"/>
+                <a:cs typeface="Consolas" panose="020B0609020204030204" pitchFamily="49" charset="0"/>
+              </a:rPr>
+              <a:t>class</a:t>
+            </a:r>
+            <a:r>
+              <a:rPr lang="en-US" sz="1600" dirty="0" smtClean="0">
+                <a:solidFill>
+                  <a:srgbClr val="000000"/>
+                </a:solidFill>
+                <a:latin typeface="Consolas" panose="020B0609020204030204" pitchFamily="49" charset="0"/>
+                <a:ea typeface="Calibri" panose="020F0502020204030204" pitchFamily="34" charset="0"/>
+                <a:cs typeface="Consolas" panose="020B0609020204030204" pitchFamily="49" charset="0"/>
+              </a:rPr>
+              <a:t> </a:t>
+            </a:r>
+            <a:r>
+              <a:rPr lang="en-US" sz="1600" dirty="0" smtClean="0">
+                <a:solidFill>
+                  <a:srgbClr val="2B91AF"/>
+                </a:solidFill>
+                <a:latin typeface="Consolas" panose="020B0609020204030204" pitchFamily="49" charset="0"/>
+                <a:ea typeface="Calibri" panose="020F0502020204030204" pitchFamily="34" charset="0"/>
+                <a:cs typeface="Consolas" panose="020B0609020204030204" pitchFamily="49" charset="0"/>
+              </a:rPr>
+              <a:t>Point</a:t>
+            </a:r>
+            <a:endParaRPr lang="en-US" sz="1600" dirty="0" smtClean="0">
+              <a:latin typeface="Consolas" panose="020B0609020204030204" pitchFamily="49" charset="0"/>
+              <a:ea typeface="Calibri" panose="020F0502020204030204" pitchFamily="34" charset="0"/>
+              <a:cs typeface="Consolas" panose="020B0609020204030204" pitchFamily="49" charset="0"/>
+            </a:endParaRPr>
+          </a:p>
+          <a:p>
+            <a:pPr>
+              <a:lnSpc>
+                <a:spcPct val="107000"/>
+              </a:lnSpc>
+              <a:spcBef>
+                <a:spcPts val="0"/>
+              </a:spcBef>
+            </a:pPr>
+            <a:r>
+              <a:rPr lang="en-US" sz="1600" dirty="0" smtClean="0">
+                <a:solidFill>
+                  <a:srgbClr val="000000"/>
+                </a:solidFill>
+                <a:latin typeface="Consolas" panose="020B0609020204030204" pitchFamily="49" charset="0"/>
+                <a:ea typeface="Calibri" panose="020F0502020204030204" pitchFamily="34" charset="0"/>
+                <a:cs typeface="Consolas" panose="020B0609020204030204" pitchFamily="49" charset="0"/>
+              </a:rPr>
+              <a:t>  {</a:t>
+            </a:r>
+            <a:endParaRPr lang="en-US" sz="1600" dirty="0" smtClean="0">
+              <a:latin typeface="Consolas" panose="020B0609020204030204" pitchFamily="49" charset="0"/>
+              <a:ea typeface="Calibri" panose="020F0502020204030204" pitchFamily="34" charset="0"/>
+              <a:cs typeface="Consolas" panose="020B0609020204030204" pitchFamily="49" charset="0"/>
+            </a:endParaRPr>
+          </a:p>
+          <a:p>
+            <a:pPr>
+              <a:lnSpc>
+                <a:spcPct val="107000"/>
+              </a:lnSpc>
+              <a:spcBef>
+                <a:spcPts val="0"/>
+              </a:spcBef>
+            </a:pPr>
+            <a:r>
+              <a:rPr lang="en-US" sz="1600" dirty="0" smtClean="0">
+                <a:solidFill>
+                  <a:srgbClr val="000000"/>
+                </a:solidFill>
+                <a:latin typeface="Consolas" panose="020B0609020204030204" pitchFamily="49" charset="0"/>
+                <a:ea typeface="Calibri" panose="020F0502020204030204" pitchFamily="34" charset="0"/>
+                <a:cs typeface="Consolas" panose="020B0609020204030204" pitchFamily="49" charset="0"/>
+              </a:rPr>
+              <a:t>    </a:t>
+            </a:r>
+            <a:r>
+              <a:rPr lang="en-US" sz="1600" dirty="0" smtClean="0">
+                <a:solidFill>
+                  <a:srgbClr val="0000FF"/>
+                </a:solidFill>
+                <a:latin typeface="Consolas" panose="020B0609020204030204" pitchFamily="49" charset="0"/>
+                <a:ea typeface="Calibri" panose="020F0502020204030204" pitchFamily="34" charset="0"/>
+                <a:cs typeface="Consolas" panose="020B0609020204030204" pitchFamily="49" charset="0"/>
+              </a:rPr>
+              <a:t>public</a:t>
+            </a:r>
+            <a:r>
+              <a:rPr lang="en-US" sz="1600" dirty="0" smtClean="0">
+                <a:solidFill>
+                  <a:srgbClr val="000000"/>
+                </a:solidFill>
+                <a:latin typeface="Consolas" panose="020B0609020204030204" pitchFamily="49" charset="0"/>
+                <a:ea typeface="Calibri" panose="020F0502020204030204" pitchFamily="34" charset="0"/>
+                <a:cs typeface="Consolas" panose="020B0609020204030204" pitchFamily="49" charset="0"/>
+              </a:rPr>
+              <a:t> </a:t>
+            </a:r>
+            <a:r>
+              <a:rPr lang="en-US" sz="1600" dirty="0" smtClean="0">
+                <a:solidFill>
+                  <a:srgbClr val="0000FF"/>
+                </a:solidFill>
+                <a:latin typeface="Consolas" panose="020B0609020204030204" pitchFamily="49" charset="0"/>
+                <a:ea typeface="Calibri" panose="020F0502020204030204" pitchFamily="34" charset="0"/>
+                <a:cs typeface="Consolas" panose="020B0609020204030204" pitchFamily="49" charset="0"/>
+              </a:rPr>
+              <a:t>double</a:t>
+            </a:r>
+            <a:r>
+              <a:rPr lang="en-US" sz="1600" dirty="0" smtClean="0">
+                <a:solidFill>
+                  <a:srgbClr val="000000"/>
+                </a:solidFill>
+                <a:latin typeface="Consolas" panose="020B0609020204030204" pitchFamily="49" charset="0"/>
+                <a:ea typeface="Calibri" panose="020F0502020204030204" pitchFamily="34" charset="0"/>
+                <a:cs typeface="Consolas" panose="020B0609020204030204" pitchFamily="49" charset="0"/>
+              </a:rPr>
+              <a:t> X { </a:t>
+            </a:r>
+            <a:r>
+              <a:rPr lang="en-US" sz="1600" dirty="0" smtClean="0">
+                <a:solidFill>
+                  <a:srgbClr val="0000FF"/>
+                </a:solidFill>
+                <a:latin typeface="Consolas" panose="020B0609020204030204" pitchFamily="49" charset="0"/>
+                <a:ea typeface="Calibri" panose="020F0502020204030204" pitchFamily="34" charset="0"/>
+                <a:cs typeface="Consolas" panose="020B0609020204030204" pitchFamily="49" charset="0"/>
+              </a:rPr>
+              <a:t>get</a:t>
+            </a:r>
+            <a:r>
+              <a:rPr lang="en-US" sz="1600" dirty="0" smtClean="0">
+                <a:solidFill>
+                  <a:srgbClr val="000000"/>
+                </a:solidFill>
+                <a:latin typeface="Consolas" panose="020B0609020204030204" pitchFamily="49" charset="0"/>
+                <a:ea typeface="Calibri" panose="020F0502020204030204" pitchFamily="34" charset="0"/>
+                <a:cs typeface="Consolas" panose="020B0609020204030204" pitchFamily="49" charset="0"/>
+              </a:rPr>
+              <a:t>; </a:t>
+            </a:r>
+            <a:r>
+              <a:rPr lang="en-US" sz="1600" dirty="0" smtClean="0">
+                <a:solidFill>
+                  <a:srgbClr val="0000FF"/>
+                </a:solidFill>
+                <a:latin typeface="Consolas" panose="020B0609020204030204" pitchFamily="49" charset="0"/>
+                <a:ea typeface="Calibri" panose="020F0502020204030204" pitchFamily="34" charset="0"/>
+                <a:cs typeface="Consolas" panose="020B0609020204030204" pitchFamily="49" charset="0"/>
+              </a:rPr>
+              <a:t>set</a:t>
+            </a:r>
+            <a:r>
+              <a:rPr lang="en-US" sz="1600" dirty="0" smtClean="0">
+                <a:solidFill>
+                  <a:srgbClr val="000000"/>
+                </a:solidFill>
+                <a:latin typeface="Consolas" panose="020B0609020204030204" pitchFamily="49" charset="0"/>
+                <a:ea typeface="Calibri" panose="020F0502020204030204" pitchFamily="34" charset="0"/>
+                <a:cs typeface="Consolas" panose="020B0609020204030204" pitchFamily="49" charset="0"/>
+              </a:rPr>
+              <a:t>; }</a:t>
+            </a:r>
+            <a:endParaRPr lang="en-US" sz="1600" dirty="0" smtClean="0">
+              <a:latin typeface="Consolas" panose="020B0609020204030204" pitchFamily="49" charset="0"/>
+              <a:ea typeface="Calibri" panose="020F0502020204030204" pitchFamily="34" charset="0"/>
+              <a:cs typeface="Consolas" panose="020B0609020204030204" pitchFamily="49" charset="0"/>
+            </a:endParaRPr>
+          </a:p>
+          <a:p>
+            <a:pPr>
+              <a:lnSpc>
+                <a:spcPct val="107000"/>
+              </a:lnSpc>
+              <a:spcBef>
+                <a:spcPts val="0"/>
+              </a:spcBef>
+            </a:pPr>
+            <a:r>
+              <a:rPr lang="en-US" sz="1600" dirty="0" smtClean="0">
+                <a:solidFill>
+                  <a:srgbClr val="000000"/>
+                </a:solidFill>
+                <a:latin typeface="Consolas" panose="020B0609020204030204" pitchFamily="49" charset="0"/>
+                <a:ea typeface="Calibri" panose="020F0502020204030204" pitchFamily="34" charset="0"/>
+                <a:cs typeface="Consolas" panose="020B0609020204030204" pitchFamily="49" charset="0"/>
+              </a:rPr>
+              <a:t>    </a:t>
+            </a:r>
+            <a:r>
+              <a:rPr lang="en-US" sz="1600" dirty="0" smtClean="0">
+                <a:solidFill>
+                  <a:srgbClr val="0000FF"/>
+                </a:solidFill>
+                <a:latin typeface="Consolas" panose="020B0609020204030204" pitchFamily="49" charset="0"/>
+                <a:ea typeface="Calibri" panose="020F0502020204030204" pitchFamily="34" charset="0"/>
+                <a:cs typeface="Consolas" panose="020B0609020204030204" pitchFamily="49" charset="0"/>
+              </a:rPr>
+              <a:t>public</a:t>
+            </a:r>
+            <a:r>
+              <a:rPr lang="en-US" sz="1600" dirty="0" smtClean="0">
+                <a:solidFill>
+                  <a:srgbClr val="000000"/>
+                </a:solidFill>
+                <a:latin typeface="Consolas" panose="020B0609020204030204" pitchFamily="49" charset="0"/>
+                <a:ea typeface="Calibri" panose="020F0502020204030204" pitchFamily="34" charset="0"/>
+                <a:cs typeface="Consolas" panose="020B0609020204030204" pitchFamily="49" charset="0"/>
+              </a:rPr>
+              <a:t> </a:t>
+            </a:r>
+            <a:r>
+              <a:rPr lang="en-US" sz="1600" dirty="0" smtClean="0">
+                <a:solidFill>
+                  <a:srgbClr val="0000FF"/>
+                </a:solidFill>
+                <a:latin typeface="Consolas" panose="020B0609020204030204" pitchFamily="49" charset="0"/>
+                <a:ea typeface="Calibri" panose="020F0502020204030204" pitchFamily="34" charset="0"/>
+                <a:cs typeface="Consolas" panose="020B0609020204030204" pitchFamily="49" charset="0"/>
+              </a:rPr>
+              <a:t>double</a:t>
+            </a:r>
+            <a:r>
+              <a:rPr lang="en-US" sz="1600" dirty="0" smtClean="0">
+                <a:solidFill>
+                  <a:srgbClr val="000000"/>
+                </a:solidFill>
+                <a:latin typeface="Consolas" panose="020B0609020204030204" pitchFamily="49" charset="0"/>
+                <a:ea typeface="Calibri" panose="020F0502020204030204" pitchFamily="34" charset="0"/>
+                <a:cs typeface="Consolas" panose="020B0609020204030204" pitchFamily="49" charset="0"/>
+              </a:rPr>
+              <a:t> Y { </a:t>
+            </a:r>
+            <a:r>
+              <a:rPr lang="en-US" sz="1600" dirty="0" smtClean="0">
+                <a:solidFill>
+                  <a:srgbClr val="0000FF"/>
+                </a:solidFill>
+                <a:latin typeface="Consolas" panose="020B0609020204030204" pitchFamily="49" charset="0"/>
+                <a:ea typeface="Calibri" panose="020F0502020204030204" pitchFamily="34" charset="0"/>
+                <a:cs typeface="Consolas" panose="020B0609020204030204" pitchFamily="49" charset="0"/>
+              </a:rPr>
+              <a:t>get</a:t>
+            </a:r>
+            <a:r>
+              <a:rPr lang="en-US" sz="1600" dirty="0" smtClean="0">
+                <a:solidFill>
+                  <a:srgbClr val="000000"/>
+                </a:solidFill>
+                <a:latin typeface="Consolas" panose="020B0609020204030204" pitchFamily="49" charset="0"/>
+                <a:ea typeface="Calibri" panose="020F0502020204030204" pitchFamily="34" charset="0"/>
+                <a:cs typeface="Consolas" panose="020B0609020204030204" pitchFamily="49" charset="0"/>
+              </a:rPr>
+              <a:t>; </a:t>
+            </a:r>
+            <a:r>
+              <a:rPr lang="en-US" sz="1600" dirty="0" smtClean="0">
+                <a:solidFill>
+                  <a:srgbClr val="0000FF"/>
+                </a:solidFill>
+                <a:latin typeface="Consolas" panose="020B0609020204030204" pitchFamily="49" charset="0"/>
+                <a:ea typeface="Calibri" panose="020F0502020204030204" pitchFamily="34" charset="0"/>
+                <a:cs typeface="Consolas" panose="020B0609020204030204" pitchFamily="49" charset="0"/>
+              </a:rPr>
+              <a:t>set</a:t>
+            </a:r>
+            <a:r>
+              <a:rPr lang="en-US" sz="1600" dirty="0" smtClean="0">
+                <a:solidFill>
+                  <a:srgbClr val="000000"/>
+                </a:solidFill>
+                <a:latin typeface="Consolas" panose="020B0609020204030204" pitchFamily="49" charset="0"/>
+                <a:ea typeface="Calibri" panose="020F0502020204030204" pitchFamily="34" charset="0"/>
+                <a:cs typeface="Consolas" panose="020B0609020204030204" pitchFamily="49" charset="0"/>
+              </a:rPr>
+              <a:t>; }</a:t>
+            </a:r>
+            <a:endParaRPr lang="en-US" sz="1600" dirty="0" smtClean="0">
+              <a:latin typeface="Consolas" panose="020B0609020204030204" pitchFamily="49" charset="0"/>
+              <a:ea typeface="Calibri" panose="020F0502020204030204" pitchFamily="34" charset="0"/>
+              <a:cs typeface="Consolas" panose="020B0609020204030204" pitchFamily="49" charset="0"/>
+            </a:endParaRPr>
+          </a:p>
+          <a:p>
+            <a:pPr>
+              <a:lnSpc>
+                <a:spcPct val="107000"/>
+              </a:lnSpc>
+              <a:spcBef>
+                <a:spcPts val="0"/>
+              </a:spcBef>
+            </a:pPr>
+            <a:r>
+              <a:rPr lang="en-US" sz="1600" dirty="0" smtClean="0">
+                <a:solidFill>
+                  <a:srgbClr val="000000"/>
+                </a:solidFill>
+                <a:latin typeface="Consolas" panose="020B0609020204030204" pitchFamily="49" charset="0"/>
+                <a:ea typeface="Calibri" panose="020F0502020204030204" pitchFamily="34" charset="0"/>
+                <a:cs typeface="Consolas" panose="020B0609020204030204" pitchFamily="49" charset="0"/>
+              </a:rPr>
+              <a:t>    </a:t>
+            </a:r>
+            <a:r>
+              <a:rPr lang="en-US" sz="1600" dirty="0" smtClean="0">
+                <a:solidFill>
+                  <a:srgbClr val="0000FF"/>
+                </a:solidFill>
+                <a:latin typeface="Consolas" panose="020B0609020204030204" pitchFamily="49" charset="0"/>
+                <a:ea typeface="Calibri" panose="020F0502020204030204" pitchFamily="34" charset="0"/>
+                <a:cs typeface="Consolas" panose="020B0609020204030204" pitchFamily="49" charset="0"/>
+              </a:rPr>
+              <a:t>public</a:t>
+            </a:r>
+            <a:r>
+              <a:rPr lang="en-US" sz="1600" dirty="0" smtClean="0">
+                <a:solidFill>
+                  <a:srgbClr val="000000"/>
+                </a:solidFill>
+                <a:latin typeface="Consolas" panose="020B0609020204030204" pitchFamily="49" charset="0"/>
+                <a:ea typeface="Calibri" panose="020F0502020204030204" pitchFamily="34" charset="0"/>
+                <a:cs typeface="Consolas" panose="020B0609020204030204" pitchFamily="49" charset="0"/>
+              </a:rPr>
+              <a:t> </a:t>
+            </a:r>
+            <a:r>
+              <a:rPr lang="en-US" sz="1600" dirty="0" smtClean="0">
+                <a:solidFill>
+                  <a:srgbClr val="0000FF"/>
+                </a:solidFill>
+                <a:latin typeface="Consolas" panose="020B0609020204030204" pitchFamily="49" charset="0"/>
+                <a:ea typeface="Calibri" panose="020F0502020204030204" pitchFamily="34" charset="0"/>
+                <a:cs typeface="Consolas" panose="020B0609020204030204" pitchFamily="49" charset="0"/>
+              </a:rPr>
+              <a:t>double</a:t>
+            </a:r>
+            <a:r>
+              <a:rPr lang="en-US" sz="1600" dirty="0" smtClean="0">
+                <a:solidFill>
+                  <a:srgbClr val="000000"/>
+                </a:solidFill>
+                <a:latin typeface="Consolas" panose="020B0609020204030204" pitchFamily="49" charset="0"/>
+                <a:ea typeface="Calibri" panose="020F0502020204030204" pitchFamily="34" charset="0"/>
+                <a:cs typeface="Consolas" panose="020B0609020204030204" pitchFamily="49" charset="0"/>
+              </a:rPr>
+              <a:t> Distance =&gt; </a:t>
+            </a:r>
+          </a:p>
+          <a:p>
+            <a:pPr>
+              <a:lnSpc>
+                <a:spcPct val="107000"/>
+              </a:lnSpc>
+              <a:spcBef>
+                <a:spcPts val="0"/>
+              </a:spcBef>
+            </a:pPr>
+            <a:r>
+              <a:rPr lang="en-US" sz="1600" dirty="0" smtClean="0">
+                <a:solidFill>
+                  <a:srgbClr val="000000"/>
+                </a:solidFill>
+                <a:latin typeface="Consolas" panose="020B0609020204030204" pitchFamily="49" charset="0"/>
+                <a:ea typeface="Calibri" panose="020F0502020204030204" pitchFamily="34" charset="0"/>
+                <a:cs typeface="Consolas" panose="020B0609020204030204" pitchFamily="49" charset="0"/>
+              </a:rPr>
+              <a:t>        </a:t>
+            </a:r>
+            <a:r>
+              <a:rPr lang="en-US" sz="1600" dirty="0" err="1" smtClean="0">
+                <a:solidFill>
+                  <a:srgbClr val="000000"/>
+                </a:solidFill>
+                <a:latin typeface="Consolas" panose="020B0609020204030204" pitchFamily="49" charset="0"/>
+                <a:ea typeface="Calibri" panose="020F0502020204030204" pitchFamily="34" charset="0"/>
+                <a:cs typeface="Consolas" panose="020B0609020204030204" pitchFamily="49" charset="0"/>
+              </a:rPr>
+              <a:t>Sqrt</a:t>
+            </a:r>
+            <a:r>
+              <a:rPr lang="en-US" sz="1600" dirty="0" smtClean="0">
+                <a:solidFill>
+                  <a:srgbClr val="000000"/>
+                </a:solidFill>
+                <a:latin typeface="Consolas" panose="020B0609020204030204" pitchFamily="49" charset="0"/>
+                <a:ea typeface="Calibri" panose="020F0502020204030204" pitchFamily="34" charset="0"/>
+                <a:cs typeface="Consolas" panose="020B0609020204030204" pitchFamily="49" charset="0"/>
+              </a:rPr>
+              <a:t>(X * X + Y * Y);</a:t>
+            </a:r>
+            <a:endParaRPr lang="en-US" sz="1600" dirty="0" smtClean="0">
+              <a:latin typeface="Consolas" panose="020B0609020204030204" pitchFamily="49" charset="0"/>
+              <a:ea typeface="Calibri" panose="020F0502020204030204" pitchFamily="34" charset="0"/>
+              <a:cs typeface="Consolas" panose="020B0609020204030204" pitchFamily="49" charset="0"/>
+            </a:endParaRPr>
+          </a:p>
+          <a:p>
+            <a:pPr>
+              <a:lnSpc>
+                <a:spcPct val="107000"/>
+              </a:lnSpc>
+              <a:spcBef>
+                <a:spcPts val="0"/>
+              </a:spcBef>
+            </a:pPr>
+            <a:r>
+              <a:rPr lang="en-US" sz="1600" dirty="0" smtClean="0">
+                <a:solidFill>
+                  <a:srgbClr val="000000"/>
+                </a:solidFill>
+                <a:latin typeface="Consolas" panose="020B0609020204030204" pitchFamily="49" charset="0"/>
+                <a:ea typeface="Calibri" panose="020F0502020204030204" pitchFamily="34" charset="0"/>
+                <a:cs typeface="Consolas" panose="020B0609020204030204" pitchFamily="49" charset="0"/>
+              </a:rPr>
+              <a:t>  }</a:t>
+            </a:r>
+            <a:endParaRPr lang="en-US" sz="1600" dirty="0" smtClean="0">
+              <a:latin typeface="Consolas" panose="020B0609020204030204" pitchFamily="49" charset="0"/>
+              <a:ea typeface="Calibri" panose="020F0502020204030204" pitchFamily="34" charset="0"/>
+              <a:cs typeface="Consolas" panose="020B0609020204030204" pitchFamily="49" charset="0"/>
+            </a:endParaRPr>
+          </a:p>
+          <a:p>
+            <a:pPr>
+              <a:lnSpc>
+                <a:spcPct val="107000"/>
+              </a:lnSpc>
+              <a:spcBef>
+                <a:spcPts val="0"/>
+              </a:spcBef>
+            </a:pPr>
+            <a:r>
+              <a:rPr lang="en-US" sz="1600" dirty="0" smtClean="0">
+                <a:solidFill>
+                  <a:srgbClr val="000000"/>
+                </a:solidFill>
+                <a:latin typeface="Consolas" panose="020B0609020204030204" pitchFamily="49" charset="0"/>
+                <a:ea typeface="Calibri" panose="020F0502020204030204" pitchFamily="34" charset="0"/>
+                <a:cs typeface="Consolas" panose="020B0609020204030204" pitchFamily="49" charset="0"/>
+              </a:rPr>
+              <a:t>}</a:t>
+            </a:r>
+            <a:endParaRPr lang="en-US" sz="1600" dirty="0">
+              <a:latin typeface="Consolas" panose="020B0609020204030204" pitchFamily="49" charset="0"/>
+              <a:ea typeface="Calibri" panose="020F0502020204030204" pitchFamily="34" charset="0"/>
+              <a:cs typeface="Consolas" panose="020B0609020204030204" pitchFamily="49" charset="0"/>
+            </a:endParaRPr>
+          </a:p>
+        </p:txBody>
+      </p:sp>
+      <p:sp>
+        <p:nvSpPr>
+          <p:cNvPr id="10" name="Content Placeholder 3"/>
+          <p:cNvSpPr>
+            <a:spLocks noGrp="1"/>
+          </p:cNvSpPr>
+          <p:nvPr>
+            <p:ph sz="half" idx="4294967295"/>
+          </p:nvPr>
+        </p:nvSpPr>
+        <p:spPr>
+          <a:xfrm>
+            <a:off x="4703081" y="1363286"/>
+            <a:ext cx="5202919" cy="2662803"/>
+          </a:xfrm>
+          <a:prstGeom prst="rect">
+            <a:avLst/>
+          </a:prstGeom>
+        </p:spPr>
+        <p:txBody>
+          <a:bodyPr>
+            <a:noAutofit/>
+          </a:bodyPr>
+          <a:lstStyle/>
+          <a:p>
+            <a:pPr marL="0" marR="0" indent="0">
+              <a:lnSpc>
+                <a:spcPct val="107000"/>
+              </a:lnSpc>
+              <a:spcBef>
+                <a:spcPts val="0"/>
+              </a:spcBef>
+              <a:spcAft>
+                <a:spcPts val="0"/>
+              </a:spcAft>
+              <a:buNone/>
+            </a:pPr>
+            <a:r>
+              <a:rPr lang="en-US" sz="1600" dirty="0" err="1">
+                <a:solidFill>
+                  <a:srgbClr val="0000FF"/>
+                </a:solidFill>
+                <a:latin typeface="Consolas" panose="020B0609020204030204" pitchFamily="49" charset="0"/>
+                <a:ea typeface="Calibri" panose="020F0502020204030204" pitchFamily="34" charset="0"/>
+                <a:cs typeface="Consolas" panose="020B0609020204030204" pitchFamily="49" charset="0"/>
+              </a:rPr>
+              <a:t>var</a:t>
+            </a:r>
+            <a:r>
+              <a:rPr lang="en-US" sz="1600" dirty="0">
+                <a:solidFill>
+                  <a:srgbClr val="000000"/>
+                </a:solidFill>
+                <a:latin typeface="Consolas" panose="020B0609020204030204" pitchFamily="49" charset="0"/>
+                <a:ea typeface="Calibri" panose="020F0502020204030204" pitchFamily="34" charset="0"/>
+                <a:cs typeface="Consolas" panose="020B0609020204030204" pitchFamily="49" charset="0"/>
+              </a:rPr>
+              <a:t> vendor = </a:t>
+            </a:r>
+            <a:r>
+              <a:rPr lang="en-US" sz="1600" dirty="0">
+                <a:solidFill>
+                  <a:srgbClr val="0000FF"/>
+                </a:solidFill>
+                <a:latin typeface="Consolas" panose="020B0609020204030204" pitchFamily="49" charset="0"/>
+                <a:ea typeface="Calibri" panose="020F0502020204030204" pitchFamily="34" charset="0"/>
+                <a:cs typeface="Consolas" panose="020B0609020204030204" pitchFamily="49" charset="0"/>
+              </a:rPr>
+              <a:t>new</a:t>
+            </a:r>
+            <a:r>
+              <a:rPr lang="en-US" sz="1600" dirty="0">
+                <a:solidFill>
+                  <a:srgbClr val="000000"/>
+                </a:solidFill>
+                <a:latin typeface="Consolas" panose="020B0609020204030204" pitchFamily="49" charset="0"/>
+                <a:ea typeface="Calibri" panose="020F0502020204030204" pitchFamily="34" charset="0"/>
+                <a:cs typeface="Consolas" panose="020B0609020204030204" pitchFamily="49" charset="0"/>
+              </a:rPr>
+              <a:t> </a:t>
+            </a:r>
+            <a:r>
+              <a:rPr lang="en-US" sz="1600" dirty="0">
+                <a:solidFill>
+                  <a:srgbClr val="2B91AF"/>
+                </a:solidFill>
+                <a:latin typeface="Consolas" panose="020B0609020204030204" pitchFamily="49" charset="0"/>
+                <a:ea typeface="Calibri" panose="020F0502020204030204" pitchFamily="34" charset="0"/>
+                <a:cs typeface="Consolas" panose="020B0609020204030204" pitchFamily="49" charset="0"/>
+              </a:rPr>
+              <a:t>Company</a:t>
+            </a:r>
+            <a:r>
+              <a:rPr lang="en-US" sz="1600" dirty="0">
+                <a:solidFill>
+                  <a:srgbClr val="000000"/>
+                </a:solidFill>
+                <a:latin typeface="Consolas" panose="020B0609020204030204" pitchFamily="49" charset="0"/>
+                <a:ea typeface="Calibri" panose="020F0502020204030204" pitchFamily="34" charset="0"/>
+                <a:cs typeface="Consolas" panose="020B0609020204030204" pitchFamily="49" charset="0"/>
+              </a:rPr>
+              <a:t>();</a:t>
+            </a:r>
+            <a:endParaRPr lang="en-US" sz="1600" dirty="0">
+              <a:latin typeface="Consolas" panose="020B0609020204030204" pitchFamily="49" charset="0"/>
+              <a:ea typeface="Calibri" panose="020F0502020204030204" pitchFamily="34" charset="0"/>
+              <a:cs typeface="Consolas" panose="020B0609020204030204" pitchFamily="49" charset="0"/>
+            </a:endParaRPr>
+          </a:p>
+          <a:p>
+            <a:pPr marL="0" marR="0" indent="0">
+              <a:lnSpc>
+                <a:spcPct val="107000"/>
+              </a:lnSpc>
+              <a:spcBef>
+                <a:spcPts val="0"/>
+              </a:spcBef>
+              <a:spcAft>
+                <a:spcPts val="0"/>
+              </a:spcAft>
+              <a:buNone/>
+            </a:pPr>
+            <a:r>
+              <a:rPr lang="en-US" sz="1600" dirty="0" err="1">
+                <a:solidFill>
+                  <a:srgbClr val="0000FF"/>
+                </a:solidFill>
+                <a:latin typeface="Consolas" panose="020B0609020204030204" pitchFamily="49" charset="0"/>
+                <a:ea typeface="Calibri" panose="020F0502020204030204" pitchFamily="34" charset="0"/>
+                <a:cs typeface="Consolas" panose="020B0609020204030204" pitchFamily="49" charset="0"/>
+              </a:rPr>
+              <a:t>var</a:t>
+            </a:r>
+            <a:r>
+              <a:rPr lang="en-US" sz="1600" dirty="0">
+                <a:solidFill>
+                  <a:srgbClr val="000000"/>
+                </a:solidFill>
+                <a:latin typeface="Consolas" panose="020B0609020204030204" pitchFamily="49" charset="0"/>
+                <a:ea typeface="Calibri" panose="020F0502020204030204" pitchFamily="34" charset="0"/>
+                <a:cs typeface="Consolas" panose="020B0609020204030204" pitchFamily="49" charset="0"/>
+              </a:rPr>
+              <a:t> location = </a:t>
+            </a:r>
+            <a:r>
+              <a:rPr lang="en-US" sz="1600" dirty="0">
+                <a:solidFill>
+                  <a:srgbClr val="0000FF"/>
+                </a:solidFill>
+                <a:latin typeface="Consolas" panose="020B0609020204030204" pitchFamily="49" charset="0"/>
+                <a:ea typeface="Calibri" panose="020F0502020204030204" pitchFamily="34" charset="0"/>
+                <a:cs typeface="Consolas" panose="020B0609020204030204" pitchFamily="49" charset="0"/>
+              </a:rPr>
+              <a:t>default</a:t>
+            </a:r>
+            <a:r>
+              <a:rPr lang="en-US" sz="1600" dirty="0">
+                <a:solidFill>
+                  <a:srgbClr val="000000"/>
+                </a:solidFill>
+                <a:latin typeface="Consolas" panose="020B0609020204030204" pitchFamily="49" charset="0"/>
+                <a:ea typeface="Calibri" panose="020F0502020204030204" pitchFamily="34" charset="0"/>
+                <a:cs typeface="Consolas" panose="020B0609020204030204" pitchFamily="49" charset="0"/>
+              </a:rPr>
+              <a:t>(</a:t>
+            </a:r>
+            <a:r>
+              <a:rPr lang="en-US" sz="1600" dirty="0">
+                <a:solidFill>
+                  <a:srgbClr val="0000FF"/>
+                </a:solidFill>
+                <a:latin typeface="Consolas" panose="020B0609020204030204" pitchFamily="49" charset="0"/>
+                <a:ea typeface="Calibri" panose="020F0502020204030204" pitchFamily="34" charset="0"/>
+                <a:cs typeface="Consolas" panose="020B0609020204030204" pitchFamily="49" charset="0"/>
+              </a:rPr>
+              <a:t>string</a:t>
+            </a:r>
+            <a:r>
+              <a:rPr lang="en-US" sz="1600" dirty="0">
+                <a:solidFill>
+                  <a:srgbClr val="000000"/>
+                </a:solidFill>
+                <a:latin typeface="Consolas" panose="020B0609020204030204" pitchFamily="49" charset="0"/>
+                <a:ea typeface="Calibri" panose="020F0502020204030204" pitchFamily="34" charset="0"/>
+                <a:cs typeface="Consolas" panose="020B0609020204030204" pitchFamily="49" charset="0"/>
+              </a:rPr>
+              <a:t>);</a:t>
+            </a:r>
+            <a:endParaRPr lang="en-US" sz="1600" dirty="0">
+              <a:latin typeface="Consolas" panose="020B0609020204030204" pitchFamily="49" charset="0"/>
+              <a:ea typeface="Calibri" panose="020F0502020204030204" pitchFamily="34" charset="0"/>
+              <a:cs typeface="Consolas" panose="020B0609020204030204" pitchFamily="49" charset="0"/>
+            </a:endParaRPr>
+          </a:p>
+          <a:p>
+            <a:pPr marL="0" marR="0" indent="0">
+              <a:lnSpc>
+                <a:spcPct val="107000"/>
+              </a:lnSpc>
+              <a:spcBef>
+                <a:spcPts val="0"/>
+              </a:spcBef>
+              <a:spcAft>
+                <a:spcPts val="0"/>
+              </a:spcAft>
+              <a:buNone/>
+            </a:pPr>
+            <a:r>
+              <a:rPr lang="en-US" sz="1600" dirty="0">
+                <a:solidFill>
+                  <a:srgbClr val="0000FF"/>
+                </a:solidFill>
+                <a:latin typeface="Consolas" panose="020B0609020204030204" pitchFamily="49" charset="0"/>
+                <a:ea typeface="Calibri" panose="020F0502020204030204" pitchFamily="34" charset="0"/>
+                <a:cs typeface="Consolas" panose="020B0609020204030204" pitchFamily="49" charset="0"/>
+              </a:rPr>
+              <a:t>if</a:t>
+            </a:r>
+            <a:r>
+              <a:rPr lang="en-US" sz="1600" dirty="0">
+                <a:solidFill>
+                  <a:srgbClr val="000000"/>
+                </a:solidFill>
+                <a:latin typeface="Consolas" panose="020B0609020204030204" pitchFamily="49" charset="0"/>
+                <a:ea typeface="Calibri" panose="020F0502020204030204" pitchFamily="34" charset="0"/>
+                <a:cs typeface="Consolas" panose="020B0609020204030204" pitchFamily="49" charset="0"/>
+              </a:rPr>
+              <a:t> (vendor != </a:t>
+            </a:r>
+            <a:r>
+              <a:rPr lang="en-US" sz="1600" dirty="0">
+                <a:solidFill>
+                  <a:srgbClr val="0000FF"/>
+                </a:solidFill>
+                <a:latin typeface="Consolas" panose="020B0609020204030204" pitchFamily="49" charset="0"/>
+                <a:ea typeface="Calibri" panose="020F0502020204030204" pitchFamily="34" charset="0"/>
+                <a:cs typeface="Consolas" panose="020B0609020204030204" pitchFamily="49" charset="0"/>
+              </a:rPr>
+              <a:t>null</a:t>
+            </a:r>
+            <a:r>
+              <a:rPr lang="en-US" sz="1600" dirty="0">
+                <a:solidFill>
+                  <a:srgbClr val="000000"/>
+                </a:solidFill>
+                <a:latin typeface="Consolas" panose="020B0609020204030204" pitchFamily="49" charset="0"/>
+                <a:ea typeface="Calibri" panose="020F0502020204030204" pitchFamily="34" charset="0"/>
+                <a:cs typeface="Consolas" panose="020B0609020204030204" pitchFamily="49" charset="0"/>
+              </a:rPr>
+              <a:t>)</a:t>
+            </a:r>
+            <a:endParaRPr lang="en-US" sz="1600" dirty="0">
+              <a:latin typeface="Consolas" panose="020B0609020204030204" pitchFamily="49" charset="0"/>
+              <a:ea typeface="Calibri" panose="020F0502020204030204" pitchFamily="34" charset="0"/>
+              <a:cs typeface="Consolas" panose="020B0609020204030204" pitchFamily="49" charset="0"/>
+            </a:endParaRPr>
+          </a:p>
+          <a:p>
+            <a:pPr marL="0" marR="0" indent="0">
+              <a:lnSpc>
+                <a:spcPct val="107000"/>
+              </a:lnSpc>
+              <a:spcBef>
+                <a:spcPts val="0"/>
+              </a:spcBef>
+              <a:spcAft>
+                <a:spcPts val="0"/>
+              </a:spcAft>
+              <a:buNone/>
+            </a:pPr>
+            <a:r>
+              <a:rPr lang="en-US" sz="1600" dirty="0" smtClean="0">
+                <a:solidFill>
+                  <a:srgbClr val="0000FF"/>
+                </a:solidFill>
+                <a:latin typeface="Consolas" panose="020B0609020204030204" pitchFamily="49" charset="0"/>
+                <a:ea typeface="Calibri" panose="020F0502020204030204" pitchFamily="34" charset="0"/>
+                <a:cs typeface="Consolas" panose="020B0609020204030204" pitchFamily="49" charset="0"/>
+              </a:rPr>
+              <a:t>  if</a:t>
+            </a:r>
+            <a:r>
+              <a:rPr lang="en-US" sz="1600" dirty="0" smtClean="0">
+                <a:solidFill>
+                  <a:srgbClr val="000000"/>
+                </a:solidFill>
+                <a:latin typeface="Consolas" panose="020B0609020204030204" pitchFamily="49" charset="0"/>
+                <a:ea typeface="Calibri" panose="020F0502020204030204" pitchFamily="34" charset="0"/>
+                <a:cs typeface="Consolas" panose="020B0609020204030204" pitchFamily="49" charset="0"/>
+              </a:rPr>
+              <a:t> </a:t>
+            </a:r>
+            <a:r>
+              <a:rPr lang="en-US" sz="1600" dirty="0">
+                <a:solidFill>
+                  <a:srgbClr val="000000"/>
+                </a:solidFill>
+                <a:latin typeface="Consolas" panose="020B0609020204030204" pitchFamily="49" charset="0"/>
+                <a:ea typeface="Calibri" panose="020F0502020204030204" pitchFamily="34" charset="0"/>
+                <a:cs typeface="Consolas" panose="020B0609020204030204" pitchFamily="49" charset="0"/>
+              </a:rPr>
+              <a:t>(</a:t>
+            </a:r>
+            <a:r>
+              <a:rPr lang="en-US" sz="1600" dirty="0" err="1">
+                <a:solidFill>
+                  <a:srgbClr val="000000"/>
+                </a:solidFill>
+                <a:latin typeface="Consolas" panose="020B0609020204030204" pitchFamily="49" charset="0"/>
+                <a:ea typeface="Calibri" panose="020F0502020204030204" pitchFamily="34" charset="0"/>
+                <a:cs typeface="Consolas" panose="020B0609020204030204" pitchFamily="49" charset="0"/>
+              </a:rPr>
+              <a:t>vendor.ContactPerson</a:t>
+            </a:r>
+            <a:r>
+              <a:rPr lang="en-US" sz="1600" dirty="0">
+                <a:solidFill>
+                  <a:srgbClr val="000000"/>
+                </a:solidFill>
+                <a:latin typeface="Consolas" panose="020B0609020204030204" pitchFamily="49" charset="0"/>
+                <a:ea typeface="Calibri" panose="020F0502020204030204" pitchFamily="34" charset="0"/>
+                <a:cs typeface="Consolas" panose="020B0609020204030204" pitchFamily="49" charset="0"/>
+              </a:rPr>
+              <a:t> != </a:t>
+            </a:r>
+            <a:r>
+              <a:rPr lang="en-US" sz="1600" dirty="0">
+                <a:solidFill>
+                  <a:srgbClr val="0000FF"/>
+                </a:solidFill>
+                <a:latin typeface="Consolas" panose="020B0609020204030204" pitchFamily="49" charset="0"/>
+                <a:ea typeface="Calibri" panose="020F0502020204030204" pitchFamily="34" charset="0"/>
+                <a:cs typeface="Consolas" panose="020B0609020204030204" pitchFamily="49" charset="0"/>
+              </a:rPr>
+              <a:t>null</a:t>
+            </a:r>
+            <a:r>
+              <a:rPr lang="en-US" sz="1600" dirty="0">
+                <a:solidFill>
+                  <a:srgbClr val="000000"/>
+                </a:solidFill>
+                <a:latin typeface="Consolas" panose="020B0609020204030204" pitchFamily="49" charset="0"/>
+                <a:ea typeface="Calibri" panose="020F0502020204030204" pitchFamily="34" charset="0"/>
+                <a:cs typeface="Consolas" panose="020B0609020204030204" pitchFamily="49" charset="0"/>
+              </a:rPr>
+              <a:t>)</a:t>
+            </a:r>
+            <a:endParaRPr lang="en-US" sz="1600" dirty="0">
+              <a:latin typeface="Consolas" panose="020B0609020204030204" pitchFamily="49" charset="0"/>
+              <a:ea typeface="Calibri" panose="020F0502020204030204" pitchFamily="34" charset="0"/>
+              <a:cs typeface="Consolas" panose="020B0609020204030204" pitchFamily="49" charset="0"/>
+            </a:endParaRPr>
+          </a:p>
+          <a:p>
+            <a:pPr marL="0" marR="0" indent="0">
+              <a:lnSpc>
+                <a:spcPct val="107000"/>
+              </a:lnSpc>
+              <a:spcBef>
+                <a:spcPts val="0"/>
+              </a:spcBef>
+              <a:spcAft>
+                <a:spcPts val="0"/>
+              </a:spcAft>
+              <a:buNone/>
+            </a:pPr>
+            <a:r>
+              <a:rPr lang="en-US" sz="1600" dirty="0" smtClean="0">
+                <a:solidFill>
+                  <a:srgbClr val="0000FF"/>
+                </a:solidFill>
+                <a:latin typeface="Consolas" panose="020B0609020204030204" pitchFamily="49" charset="0"/>
+                <a:ea typeface="Calibri" panose="020F0502020204030204" pitchFamily="34" charset="0"/>
+                <a:cs typeface="Consolas" panose="020B0609020204030204" pitchFamily="49" charset="0"/>
+              </a:rPr>
+              <a:t>    if</a:t>
+            </a:r>
+            <a:r>
+              <a:rPr lang="en-US" sz="1600" dirty="0" smtClean="0">
+                <a:solidFill>
+                  <a:srgbClr val="000000"/>
+                </a:solidFill>
+                <a:latin typeface="Consolas" panose="020B0609020204030204" pitchFamily="49" charset="0"/>
+                <a:ea typeface="Calibri" panose="020F0502020204030204" pitchFamily="34" charset="0"/>
+                <a:cs typeface="Consolas" panose="020B0609020204030204" pitchFamily="49" charset="0"/>
+              </a:rPr>
+              <a:t> </a:t>
+            </a:r>
+            <a:r>
+              <a:rPr lang="en-US" sz="1600" dirty="0">
+                <a:solidFill>
+                  <a:srgbClr val="000000"/>
+                </a:solidFill>
+                <a:latin typeface="Consolas" panose="020B0609020204030204" pitchFamily="49" charset="0"/>
+                <a:ea typeface="Calibri" panose="020F0502020204030204" pitchFamily="34" charset="0"/>
+                <a:cs typeface="Consolas" panose="020B0609020204030204" pitchFamily="49" charset="0"/>
+              </a:rPr>
+              <a:t>(</a:t>
+            </a:r>
+            <a:r>
+              <a:rPr lang="en-US" sz="1600" dirty="0" err="1">
+                <a:solidFill>
+                  <a:srgbClr val="000000"/>
+                </a:solidFill>
+                <a:latin typeface="Consolas" panose="020B0609020204030204" pitchFamily="49" charset="0"/>
+                <a:ea typeface="Calibri" panose="020F0502020204030204" pitchFamily="34" charset="0"/>
+                <a:cs typeface="Consolas" panose="020B0609020204030204" pitchFamily="49" charset="0"/>
+              </a:rPr>
+              <a:t>vendor.ContactPerson.HomeAddress</a:t>
+            </a:r>
+            <a:r>
+              <a:rPr lang="en-US" sz="1600" dirty="0">
+                <a:solidFill>
+                  <a:srgbClr val="000000"/>
+                </a:solidFill>
+                <a:latin typeface="Consolas" panose="020B0609020204030204" pitchFamily="49" charset="0"/>
+                <a:ea typeface="Calibri" panose="020F0502020204030204" pitchFamily="34" charset="0"/>
+                <a:cs typeface="Consolas" panose="020B0609020204030204" pitchFamily="49" charset="0"/>
+              </a:rPr>
+              <a:t> </a:t>
+            </a:r>
+            <a:endParaRPr lang="en-US" sz="1600" dirty="0" smtClean="0">
+              <a:solidFill>
+                <a:srgbClr val="000000"/>
+              </a:solidFill>
+              <a:latin typeface="Consolas" panose="020B0609020204030204" pitchFamily="49" charset="0"/>
+              <a:ea typeface="Calibri" panose="020F0502020204030204" pitchFamily="34" charset="0"/>
+              <a:cs typeface="Consolas" panose="020B0609020204030204" pitchFamily="49" charset="0"/>
+            </a:endParaRPr>
+          </a:p>
+          <a:p>
+            <a:pPr marL="0" marR="0" indent="0">
+              <a:lnSpc>
+                <a:spcPct val="107000"/>
+              </a:lnSpc>
+              <a:spcBef>
+                <a:spcPts val="0"/>
+              </a:spcBef>
+              <a:spcAft>
+                <a:spcPts val="0"/>
+              </a:spcAft>
+              <a:buNone/>
+            </a:pPr>
+            <a:r>
+              <a:rPr lang="en-US" sz="1600" dirty="0">
+                <a:solidFill>
+                  <a:srgbClr val="000000"/>
+                </a:solidFill>
+                <a:latin typeface="Consolas" panose="020B0609020204030204" pitchFamily="49" charset="0"/>
+                <a:ea typeface="Calibri" panose="020F0502020204030204" pitchFamily="34" charset="0"/>
+                <a:cs typeface="Consolas" panose="020B0609020204030204" pitchFamily="49" charset="0"/>
+              </a:rPr>
+              <a:t> </a:t>
+            </a:r>
+            <a:r>
+              <a:rPr lang="en-US" sz="1600" dirty="0" smtClean="0">
+                <a:solidFill>
+                  <a:srgbClr val="000000"/>
+                </a:solidFill>
+                <a:latin typeface="Consolas" panose="020B0609020204030204" pitchFamily="49" charset="0"/>
+                <a:ea typeface="Calibri" panose="020F0502020204030204" pitchFamily="34" charset="0"/>
+                <a:cs typeface="Consolas" panose="020B0609020204030204" pitchFamily="49" charset="0"/>
+              </a:rPr>
+              <a:t>     != </a:t>
+            </a:r>
+            <a:r>
+              <a:rPr lang="en-US" sz="1600" dirty="0">
+                <a:solidFill>
+                  <a:srgbClr val="0000FF"/>
+                </a:solidFill>
+                <a:latin typeface="Consolas" panose="020B0609020204030204" pitchFamily="49" charset="0"/>
+                <a:ea typeface="Calibri" panose="020F0502020204030204" pitchFamily="34" charset="0"/>
+                <a:cs typeface="Consolas" panose="020B0609020204030204" pitchFamily="49" charset="0"/>
+              </a:rPr>
+              <a:t>null</a:t>
+            </a:r>
+            <a:r>
+              <a:rPr lang="en-US" sz="1600" dirty="0">
+                <a:solidFill>
+                  <a:srgbClr val="000000"/>
+                </a:solidFill>
+                <a:latin typeface="Consolas" panose="020B0609020204030204" pitchFamily="49" charset="0"/>
+                <a:ea typeface="Calibri" panose="020F0502020204030204" pitchFamily="34" charset="0"/>
+                <a:cs typeface="Consolas" panose="020B0609020204030204" pitchFamily="49" charset="0"/>
+              </a:rPr>
+              <a:t>)</a:t>
+            </a:r>
+            <a:endParaRPr lang="en-US" sz="1600" dirty="0">
+              <a:latin typeface="Consolas" panose="020B0609020204030204" pitchFamily="49" charset="0"/>
+              <a:ea typeface="Calibri" panose="020F0502020204030204" pitchFamily="34" charset="0"/>
+              <a:cs typeface="Consolas" panose="020B0609020204030204" pitchFamily="49" charset="0"/>
+            </a:endParaRPr>
+          </a:p>
+          <a:p>
+            <a:pPr marL="0" marR="0" indent="0">
+              <a:lnSpc>
+                <a:spcPct val="107000"/>
+              </a:lnSpc>
+              <a:spcBef>
+                <a:spcPts val="0"/>
+              </a:spcBef>
+              <a:spcAft>
+                <a:spcPts val="0"/>
+              </a:spcAft>
+              <a:buNone/>
+            </a:pPr>
+            <a:r>
+              <a:rPr lang="en-US" sz="1600" dirty="0" smtClean="0">
+                <a:solidFill>
+                  <a:srgbClr val="000000"/>
+                </a:solidFill>
+                <a:latin typeface="Consolas" panose="020B0609020204030204" pitchFamily="49" charset="0"/>
+                <a:ea typeface="Calibri" panose="020F0502020204030204" pitchFamily="34" charset="0"/>
+                <a:cs typeface="Consolas" panose="020B0609020204030204" pitchFamily="49" charset="0"/>
+              </a:rPr>
+              <a:t>      location </a:t>
+            </a:r>
+            <a:r>
+              <a:rPr lang="en-US" sz="1600" dirty="0">
+                <a:solidFill>
+                  <a:srgbClr val="000000"/>
+                </a:solidFill>
+                <a:latin typeface="Consolas" panose="020B0609020204030204" pitchFamily="49" charset="0"/>
+                <a:ea typeface="Calibri" panose="020F0502020204030204" pitchFamily="34" charset="0"/>
+                <a:cs typeface="Consolas" panose="020B0609020204030204" pitchFamily="49" charset="0"/>
+              </a:rPr>
+              <a:t>= </a:t>
+            </a:r>
+            <a:r>
+              <a:rPr lang="en-US" sz="1600" dirty="0" err="1" smtClean="0">
+                <a:solidFill>
+                  <a:srgbClr val="000000"/>
+                </a:solidFill>
+                <a:latin typeface="Consolas" panose="020B0609020204030204" pitchFamily="49" charset="0"/>
+                <a:ea typeface="Calibri" panose="020F0502020204030204" pitchFamily="34" charset="0"/>
+                <a:cs typeface="Consolas" panose="020B0609020204030204" pitchFamily="49" charset="0"/>
+              </a:rPr>
+              <a:t>vendor.ContactPerson</a:t>
+            </a:r>
+            <a:endParaRPr lang="en-US" sz="1600" dirty="0" smtClean="0">
+              <a:solidFill>
+                <a:srgbClr val="000000"/>
+              </a:solidFill>
+              <a:latin typeface="Consolas" panose="020B0609020204030204" pitchFamily="49" charset="0"/>
+              <a:ea typeface="Calibri" panose="020F0502020204030204" pitchFamily="34" charset="0"/>
+              <a:cs typeface="Consolas" panose="020B0609020204030204" pitchFamily="49" charset="0"/>
+            </a:endParaRPr>
+          </a:p>
+          <a:p>
+            <a:pPr marL="0" marR="0" indent="0">
+              <a:lnSpc>
+                <a:spcPct val="107000"/>
+              </a:lnSpc>
+              <a:spcBef>
+                <a:spcPts val="0"/>
+              </a:spcBef>
+              <a:spcAft>
+                <a:spcPts val="0"/>
+              </a:spcAft>
+              <a:buNone/>
+            </a:pPr>
+            <a:r>
+              <a:rPr lang="en-US" sz="1600" dirty="0">
+                <a:solidFill>
+                  <a:srgbClr val="000000"/>
+                </a:solidFill>
+                <a:latin typeface="Consolas" panose="020B0609020204030204" pitchFamily="49" charset="0"/>
+                <a:ea typeface="Calibri" panose="020F0502020204030204" pitchFamily="34" charset="0"/>
+                <a:cs typeface="Consolas" panose="020B0609020204030204" pitchFamily="49" charset="0"/>
+              </a:rPr>
+              <a:t> </a:t>
+            </a:r>
+            <a:r>
+              <a:rPr lang="en-US" sz="1600" dirty="0" smtClean="0">
+                <a:solidFill>
+                  <a:srgbClr val="000000"/>
+                </a:solidFill>
+                <a:latin typeface="Consolas" panose="020B0609020204030204" pitchFamily="49" charset="0"/>
+                <a:ea typeface="Calibri" panose="020F0502020204030204" pitchFamily="34" charset="0"/>
+                <a:cs typeface="Consolas" panose="020B0609020204030204" pitchFamily="49" charset="0"/>
+              </a:rPr>
+              <a:t>       .</a:t>
+            </a:r>
+            <a:r>
+              <a:rPr lang="en-US" sz="1600" dirty="0" err="1">
+                <a:solidFill>
+                  <a:srgbClr val="000000"/>
+                </a:solidFill>
+                <a:latin typeface="Consolas" panose="020B0609020204030204" pitchFamily="49" charset="0"/>
+                <a:ea typeface="Calibri" panose="020F0502020204030204" pitchFamily="34" charset="0"/>
+                <a:cs typeface="Consolas" panose="020B0609020204030204" pitchFamily="49" charset="0"/>
+              </a:rPr>
+              <a:t>HomeAddress.LineOne</a:t>
+            </a:r>
+            <a:r>
+              <a:rPr lang="en-US" sz="1600" dirty="0">
+                <a:solidFill>
+                  <a:srgbClr val="000000"/>
+                </a:solidFill>
+                <a:latin typeface="Consolas" panose="020B0609020204030204" pitchFamily="49" charset="0"/>
+                <a:ea typeface="Calibri" panose="020F0502020204030204" pitchFamily="34" charset="0"/>
+                <a:cs typeface="Consolas" panose="020B0609020204030204" pitchFamily="49" charset="0"/>
+              </a:rPr>
+              <a:t>;</a:t>
+            </a:r>
+            <a:endParaRPr lang="en-US" sz="1600" dirty="0">
+              <a:latin typeface="Consolas" panose="020B0609020204030204" pitchFamily="49" charset="0"/>
+              <a:ea typeface="Calibri" panose="020F0502020204030204" pitchFamily="34" charset="0"/>
+              <a:cs typeface="Consolas" panose="020B0609020204030204" pitchFamily="49" charset="0"/>
+            </a:endParaRPr>
+          </a:p>
+          <a:p>
+            <a:pPr marL="0" marR="0" indent="0">
+              <a:lnSpc>
+                <a:spcPct val="107000"/>
+              </a:lnSpc>
+              <a:spcBef>
+                <a:spcPts val="0"/>
+              </a:spcBef>
+              <a:spcAft>
+                <a:spcPts val="0"/>
+              </a:spcAft>
+              <a:buNone/>
+            </a:pPr>
+            <a:r>
+              <a:rPr lang="en-US" sz="1600" dirty="0" err="1" smtClean="0">
+                <a:solidFill>
+                  <a:srgbClr val="000000"/>
+                </a:solidFill>
+                <a:latin typeface="Consolas" panose="020B0609020204030204" pitchFamily="49" charset="0"/>
+                <a:ea typeface="Calibri" panose="020F0502020204030204" pitchFamily="34" charset="0"/>
+                <a:cs typeface="Consolas" panose="020B0609020204030204" pitchFamily="49" charset="0"/>
+              </a:rPr>
+              <a:t>WriteLine</a:t>
+            </a:r>
+            <a:r>
+              <a:rPr lang="en-US" sz="1600" dirty="0" smtClean="0">
+                <a:solidFill>
+                  <a:srgbClr val="000000"/>
+                </a:solidFill>
+                <a:latin typeface="Consolas" panose="020B0609020204030204" pitchFamily="49" charset="0"/>
+                <a:ea typeface="Calibri" panose="020F0502020204030204" pitchFamily="34" charset="0"/>
+                <a:cs typeface="Consolas" panose="020B0609020204030204" pitchFamily="49" charset="0"/>
+              </a:rPr>
+              <a:t>(location</a:t>
+            </a:r>
+            <a:r>
+              <a:rPr lang="en-US" sz="1600" dirty="0">
+                <a:solidFill>
+                  <a:srgbClr val="000000"/>
+                </a:solidFill>
+                <a:latin typeface="Consolas" panose="020B0609020204030204" pitchFamily="49" charset="0"/>
+                <a:ea typeface="Calibri" panose="020F0502020204030204" pitchFamily="34" charset="0"/>
+                <a:cs typeface="Consolas" panose="020B0609020204030204" pitchFamily="49" charset="0"/>
+              </a:rPr>
+              <a:t>);</a:t>
+            </a:r>
+            <a:endParaRPr lang="en-US" sz="1600" dirty="0">
+              <a:latin typeface="Consolas" panose="020B0609020204030204" pitchFamily="49" charset="0"/>
+              <a:ea typeface="Calibri" panose="020F0502020204030204" pitchFamily="34" charset="0"/>
+              <a:cs typeface="Consolas" panose="020B0609020204030204" pitchFamily="49" charset="0"/>
+            </a:endParaRPr>
+          </a:p>
+          <a:p>
+            <a:pPr marL="45720" indent="0">
+              <a:buNone/>
+            </a:pPr>
+            <a:endParaRPr lang="en-US" sz="1600" dirty="0">
+              <a:latin typeface="Consolas" panose="020B0609020204030204" pitchFamily="49" charset="0"/>
+              <a:cs typeface="Consolas" panose="020B0609020204030204" pitchFamily="49" charset="0"/>
+            </a:endParaRPr>
+          </a:p>
+        </p:txBody>
+      </p:sp>
+      <p:sp>
+        <p:nvSpPr>
+          <p:cNvPr id="11" name="Content Placeholder 5"/>
+          <p:cNvSpPr>
+            <a:spLocks noGrp="1"/>
+          </p:cNvSpPr>
+          <p:nvPr>
+            <p:ph sz="quarter" idx="4294967295"/>
+          </p:nvPr>
+        </p:nvSpPr>
+        <p:spPr>
+          <a:xfrm>
+            <a:off x="4703081" y="4111318"/>
+            <a:ext cx="4544700" cy="1993710"/>
+          </a:xfrm>
+          <a:prstGeom prst="rect">
+            <a:avLst/>
+          </a:prstGeom>
+        </p:spPr>
+        <p:txBody>
+          <a:bodyPr>
+            <a:normAutofit/>
+          </a:bodyPr>
+          <a:lstStyle/>
+          <a:p>
+            <a:pPr marL="0" marR="0" indent="0">
+              <a:lnSpc>
+                <a:spcPct val="107000"/>
+              </a:lnSpc>
+              <a:spcBef>
+                <a:spcPts val="0"/>
+              </a:spcBef>
+              <a:spcAft>
+                <a:spcPts val="0"/>
+              </a:spcAft>
+              <a:buNone/>
+            </a:pPr>
+            <a:r>
+              <a:rPr lang="en-US" sz="1600" dirty="0" err="1">
+                <a:solidFill>
+                  <a:srgbClr val="0000FF"/>
+                </a:solidFill>
+                <a:latin typeface="Consolas" panose="020B0609020204030204" pitchFamily="49" charset="0"/>
+                <a:ea typeface="Calibri" panose="020F0502020204030204" pitchFamily="34" charset="0"/>
+                <a:cs typeface="Consolas" panose="020B0609020204030204" pitchFamily="49" charset="0"/>
+              </a:rPr>
+              <a:t>var</a:t>
+            </a:r>
+            <a:r>
+              <a:rPr lang="en-US" sz="1600" dirty="0">
+                <a:solidFill>
+                  <a:srgbClr val="000000"/>
+                </a:solidFill>
+                <a:latin typeface="Consolas" panose="020B0609020204030204" pitchFamily="49" charset="0"/>
+                <a:ea typeface="Calibri" panose="020F0502020204030204" pitchFamily="34" charset="0"/>
+                <a:cs typeface="Consolas" panose="020B0609020204030204" pitchFamily="49" charset="0"/>
+              </a:rPr>
+              <a:t> vendor = </a:t>
+            </a:r>
+            <a:r>
+              <a:rPr lang="en-US" sz="1600" dirty="0">
+                <a:solidFill>
+                  <a:srgbClr val="0000FF"/>
+                </a:solidFill>
+                <a:latin typeface="Consolas" panose="020B0609020204030204" pitchFamily="49" charset="0"/>
+                <a:ea typeface="Calibri" panose="020F0502020204030204" pitchFamily="34" charset="0"/>
+                <a:cs typeface="Consolas" panose="020B0609020204030204" pitchFamily="49" charset="0"/>
+              </a:rPr>
+              <a:t>new</a:t>
+            </a:r>
+            <a:r>
+              <a:rPr lang="en-US" sz="1600" dirty="0">
+                <a:solidFill>
+                  <a:srgbClr val="000000"/>
+                </a:solidFill>
+                <a:latin typeface="Consolas" panose="020B0609020204030204" pitchFamily="49" charset="0"/>
+                <a:ea typeface="Calibri" panose="020F0502020204030204" pitchFamily="34" charset="0"/>
+                <a:cs typeface="Consolas" panose="020B0609020204030204" pitchFamily="49" charset="0"/>
+              </a:rPr>
+              <a:t> </a:t>
+            </a:r>
+            <a:r>
+              <a:rPr lang="en-US" sz="1600" dirty="0">
+                <a:solidFill>
+                  <a:srgbClr val="2B91AF"/>
+                </a:solidFill>
+                <a:latin typeface="Consolas" panose="020B0609020204030204" pitchFamily="49" charset="0"/>
+                <a:ea typeface="Calibri" panose="020F0502020204030204" pitchFamily="34" charset="0"/>
+                <a:cs typeface="Consolas" panose="020B0609020204030204" pitchFamily="49" charset="0"/>
+              </a:rPr>
+              <a:t>Company</a:t>
+            </a:r>
+            <a:r>
+              <a:rPr lang="en-US" sz="1600" dirty="0">
+                <a:solidFill>
+                  <a:srgbClr val="000000"/>
+                </a:solidFill>
+                <a:latin typeface="Consolas" panose="020B0609020204030204" pitchFamily="49" charset="0"/>
+                <a:ea typeface="Calibri" panose="020F0502020204030204" pitchFamily="34" charset="0"/>
+                <a:cs typeface="Consolas" panose="020B0609020204030204" pitchFamily="49" charset="0"/>
+              </a:rPr>
+              <a:t>();</a:t>
+            </a:r>
+            <a:endParaRPr lang="en-US" sz="1600" dirty="0">
+              <a:latin typeface="Consolas" panose="020B0609020204030204" pitchFamily="49" charset="0"/>
+              <a:ea typeface="Calibri" panose="020F0502020204030204" pitchFamily="34" charset="0"/>
+              <a:cs typeface="Consolas" panose="020B0609020204030204" pitchFamily="49" charset="0"/>
+            </a:endParaRPr>
+          </a:p>
+          <a:p>
+            <a:pPr marL="0" marR="0" indent="0">
+              <a:lnSpc>
+                <a:spcPct val="107000"/>
+              </a:lnSpc>
+              <a:spcBef>
+                <a:spcPts val="0"/>
+              </a:spcBef>
+              <a:spcAft>
+                <a:spcPts val="0"/>
+              </a:spcAft>
+              <a:buNone/>
+            </a:pPr>
+            <a:r>
+              <a:rPr lang="en-US" sz="1600" dirty="0" err="1">
+                <a:solidFill>
+                  <a:srgbClr val="0000FF"/>
+                </a:solidFill>
+                <a:latin typeface="Consolas" panose="020B0609020204030204" pitchFamily="49" charset="0"/>
+                <a:ea typeface="Calibri" panose="020F0502020204030204" pitchFamily="34" charset="0"/>
+                <a:cs typeface="Consolas" panose="020B0609020204030204" pitchFamily="49" charset="0"/>
+              </a:rPr>
+              <a:t>var</a:t>
+            </a:r>
+            <a:r>
+              <a:rPr lang="en-US" sz="1600" dirty="0">
+                <a:solidFill>
+                  <a:srgbClr val="000000"/>
+                </a:solidFill>
+                <a:latin typeface="Consolas" panose="020B0609020204030204" pitchFamily="49" charset="0"/>
+                <a:ea typeface="Calibri" panose="020F0502020204030204" pitchFamily="34" charset="0"/>
+                <a:cs typeface="Consolas" panose="020B0609020204030204" pitchFamily="49" charset="0"/>
+              </a:rPr>
+              <a:t> location = vendor?.</a:t>
+            </a:r>
+            <a:r>
+              <a:rPr lang="en-US" sz="1600" dirty="0" err="1" smtClean="0">
+                <a:solidFill>
+                  <a:srgbClr val="000000"/>
+                </a:solidFill>
+                <a:latin typeface="Consolas" panose="020B0609020204030204" pitchFamily="49" charset="0"/>
+                <a:ea typeface="Calibri" panose="020F0502020204030204" pitchFamily="34" charset="0"/>
+                <a:cs typeface="Consolas" panose="020B0609020204030204" pitchFamily="49" charset="0"/>
+              </a:rPr>
+              <a:t>ContactPerson</a:t>
+            </a:r>
+            <a:endParaRPr lang="en-US" sz="1600" dirty="0" smtClean="0">
+              <a:solidFill>
+                <a:srgbClr val="000000"/>
+              </a:solidFill>
+              <a:latin typeface="Consolas" panose="020B0609020204030204" pitchFamily="49" charset="0"/>
+              <a:ea typeface="Calibri" panose="020F0502020204030204" pitchFamily="34" charset="0"/>
+              <a:cs typeface="Consolas" panose="020B0609020204030204" pitchFamily="49" charset="0"/>
+            </a:endParaRPr>
+          </a:p>
+          <a:p>
+            <a:pPr marL="0" marR="0" indent="0">
+              <a:lnSpc>
+                <a:spcPct val="107000"/>
+              </a:lnSpc>
+              <a:spcBef>
+                <a:spcPts val="0"/>
+              </a:spcBef>
+              <a:spcAft>
+                <a:spcPts val="0"/>
+              </a:spcAft>
+              <a:buNone/>
+            </a:pPr>
+            <a:r>
+              <a:rPr lang="en-US" sz="1600" dirty="0">
+                <a:solidFill>
+                  <a:srgbClr val="000000"/>
+                </a:solidFill>
+                <a:latin typeface="Consolas" panose="020B0609020204030204" pitchFamily="49" charset="0"/>
+                <a:ea typeface="Calibri" panose="020F0502020204030204" pitchFamily="34" charset="0"/>
+                <a:cs typeface="Consolas" panose="020B0609020204030204" pitchFamily="49" charset="0"/>
+              </a:rPr>
+              <a:t> </a:t>
+            </a:r>
+            <a:r>
+              <a:rPr lang="en-US" sz="1600" dirty="0" smtClean="0">
+                <a:solidFill>
+                  <a:srgbClr val="000000"/>
+                </a:solidFill>
+                <a:latin typeface="Consolas" panose="020B0609020204030204" pitchFamily="49" charset="0"/>
+                <a:ea typeface="Calibri" panose="020F0502020204030204" pitchFamily="34" charset="0"/>
+                <a:cs typeface="Consolas" panose="020B0609020204030204" pitchFamily="49" charset="0"/>
+              </a:rPr>
+              <a:t>   ?.</a:t>
+            </a:r>
+            <a:r>
+              <a:rPr lang="en-US" sz="1600" dirty="0" err="1">
+                <a:solidFill>
+                  <a:srgbClr val="000000"/>
+                </a:solidFill>
+                <a:latin typeface="Consolas" panose="020B0609020204030204" pitchFamily="49" charset="0"/>
+                <a:ea typeface="Calibri" panose="020F0502020204030204" pitchFamily="34" charset="0"/>
+                <a:cs typeface="Consolas" panose="020B0609020204030204" pitchFamily="49" charset="0"/>
+              </a:rPr>
+              <a:t>HomeAddress</a:t>
+            </a:r>
+            <a:r>
+              <a:rPr lang="en-US" sz="1600" dirty="0">
+                <a:solidFill>
+                  <a:srgbClr val="000000"/>
+                </a:solidFill>
+                <a:latin typeface="Consolas" panose="020B0609020204030204" pitchFamily="49" charset="0"/>
+                <a:ea typeface="Calibri" panose="020F0502020204030204" pitchFamily="34" charset="0"/>
+                <a:cs typeface="Consolas" panose="020B0609020204030204" pitchFamily="49" charset="0"/>
+              </a:rPr>
+              <a:t>?.</a:t>
+            </a:r>
+            <a:r>
+              <a:rPr lang="en-US" sz="1600" dirty="0" err="1">
+                <a:solidFill>
+                  <a:srgbClr val="000000"/>
+                </a:solidFill>
+                <a:latin typeface="Consolas" panose="020B0609020204030204" pitchFamily="49" charset="0"/>
+                <a:ea typeface="Calibri" panose="020F0502020204030204" pitchFamily="34" charset="0"/>
+                <a:cs typeface="Consolas" panose="020B0609020204030204" pitchFamily="49" charset="0"/>
+              </a:rPr>
+              <a:t>LineOne</a:t>
+            </a:r>
+            <a:r>
+              <a:rPr lang="en-US" sz="1600" dirty="0">
+                <a:solidFill>
+                  <a:srgbClr val="000000"/>
+                </a:solidFill>
+                <a:latin typeface="Consolas" panose="020B0609020204030204" pitchFamily="49" charset="0"/>
+                <a:ea typeface="Calibri" panose="020F0502020204030204" pitchFamily="34" charset="0"/>
+                <a:cs typeface="Consolas" panose="020B0609020204030204" pitchFamily="49" charset="0"/>
+              </a:rPr>
+              <a:t>;</a:t>
+            </a:r>
+            <a:endParaRPr lang="en-US" sz="1600" dirty="0">
+              <a:latin typeface="Consolas" panose="020B0609020204030204" pitchFamily="49" charset="0"/>
+              <a:ea typeface="Calibri" panose="020F0502020204030204" pitchFamily="34" charset="0"/>
+              <a:cs typeface="Consolas" panose="020B0609020204030204" pitchFamily="49" charset="0"/>
+            </a:endParaRPr>
+          </a:p>
+          <a:p>
+            <a:pPr marL="0" marR="0" indent="0">
+              <a:lnSpc>
+                <a:spcPct val="107000"/>
+              </a:lnSpc>
+              <a:spcBef>
+                <a:spcPts val="0"/>
+              </a:spcBef>
+              <a:spcAft>
+                <a:spcPts val="0"/>
+              </a:spcAft>
+              <a:buNone/>
+            </a:pPr>
+            <a:r>
+              <a:rPr lang="en-US" sz="1600" dirty="0" err="1">
+                <a:solidFill>
+                  <a:srgbClr val="000000"/>
+                </a:solidFill>
+                <a:latin typeface="Consolas" panose="020B0609020204030204" pitchFamily="49" charset="0"/>
+                <a:ea typeface="Calibri" panose="020F0502020204030204" pitchFamily="34" charset="0"/>
+                <a:cs typeface="Consolas" panose="020B0609020204030204" pitchFamily="49" charset="0"/>
+              </a:rPr>
+              <a:t>WriteLine</a:t>
+            </a:r>
+            <a:r>
+              <a:rPr lang="en-US" sz="1600" dirty="0">
+                <a:solidFill>
+                  <a:srgbClr val="000000"/>
+                </a:solidFill>
+                <a:latin typeface="Consolas" panose="020B0609020204030204" pitchFamily="49" charset="0"/>
+                <a:ea typeface="Calibri" panose="020F0502020204030204" pitchFamily="34" charset="0"/>
+                <a:cs typeface="Consolas" panose="020B0609020204030204" pitchFamily="49" charset="0"/>
+              </a:rPr>
+              <a:t>(location);</a:t>
+            </a:r>
+            <a:endParaRPr lang="en-US" sz="1600" dirty="0">
+              <a:latin typeface="Consolas" panose="020B0609020204030204" pitchFamily="49" charset="0"/>
+              <a:ea typeface="Calibri" panose="020F0502020204030204" pitchFamily="34" charset="0"/>
+              <a:cs typeface="Consolas" panose="020B0609020204030204" pitchFamily="49" charset="0"/>
+            </a:endParaRPr>
+          </a:p>
+          <a:p>
+            <a:pPr marL="45720" indent="0">
+              <a:buNone/>
+            </a:pPr>
+            <a:endParaRPr lang="en-US" sz="1600" dirty="0">
+              <a:latin typeface="Consolas" panose="020B0609020204030204" pitchFamily="49" charset="0"/>
+              <a:cs typeface="Consolas" panose="020B0609020204030204" pitchFamily="49" charset="0"/>
+            </a:endParaRPr>
+          </a:p>
+        </p:txBody>
+      </p:sp>
+    </p:spTree>
+    <p:extLst>
+      <p:ext uri="{BB962C8B-B14F-4D97-AF65-F5344CB8AC3E}">
+        <p14:creationId xmlns:p14="http://schemas.microsoft.com/office/powerpoint/2010/main" val="1004507545"/>
+      </p:ext>
+    </p:extLst>
+  </p:cSld>
+  <p:clrMapOvr>
+    <a:masterClrMapping/>
+  </p:clrMapOvr>
+  <p:transition>
+    <p:fade/>
+  </p:transition>
+  <p:timing>
+    <p:tnLst>
+      <p:par>
+        <p:cTn id="1" dur="indefinite" restart="never" nodeType="tmRoot">
+          <p:childTnLst>
+            <p:seq concurrent="1" nextAc="seek">
+              <p:cTn id="2" dur="indefinite" nodeType="mainSeq">
+                <p:childTnLst>
+                  <p:par>
+                    <p:cTn id="3" fill="hold">
+                      <p:stCondLst>
+                        <p:cond delay="indefinite"/>
+                      </p:stCondLst>
+                      <p:childTnLst>
+                        <p:par>
+                          <p:cTn id="4" fill="hold">
+                            <p:stCondLst>
+                              <p:cond delay="0"/>
+                            </p:stCondLst>
+                            <p:childTnLst>
+                              <p:par>
+                                <p:cTn id="5" presetID="10" presetClass="entr" presetSubtype="0" fill="hold" grpId="0" nodeType="clickEffect">
+                                  <p:stCondLst>
+                                    <p:cond delay="0"/>
+                                  </p:stCondLst>
+                                  <p:childTnLst>
+                                    <p:set>
+                                      <p:cBhvr>
+                                        <p:cTn id="6" dur="1" fill="hold">
+                                          <p:stCondLst>
+                                            <p:cond delay="0"/>
+                                          </p:stCondLst>
+                                        </p:cTn>
+                                        <p:tgtEl>
+                                          <p:spTgt spid="9"/>
+                                        </p:tgtEl>
+                                        <p:attrNameLst>
+                                          <p:attrName>style.visibility</p:attrName>
+                                        </p:attrNameLst>
+                                      </p:cBhvr>
+                                      <p:to>
+                                        <p:strVal val="visible"/>
+                                      </p:to>
+                                    </p:set>
+                                    <p:animEffect transition="in" filter="fade">
+                                      <p:cBhvr>
+                                        <p:cTn id="7" dur="500"/>
+                                        <p:tgtEl>
+                                          <p:spTgt spid="9"/>
+                                        </p:tgtEl>
+                                      </p:cBhvr>
+                                    </p:animEffect>
+                                  </p:childTnLst>
+                                </p:cTn>
+                              </p:par>
+                            </p:childTnLst>
+                          </p:cTn>
+                        </p:par>
+                      </p:childTnLst>
+                    </p:cTn>
+                  </p:par>
+                  <p:par>
+                    <p:cTn id="8" fill="hold">
+                      <p:stCondLst>
+                        <p:cond delay="indefinite"/>
+                      </p:stCondLst>
+                      <p:childTnLst>
+                        <p:par>
+                          <p:cTn id="9" fill="hold">
+                            <p:stCondLst>
+                              <p:cond delay="0"/>
+                            </p:stCondLst>
+                            <p:childTnLst>
+                              <p:par>
+                                <p:cTn id="10" presetID="10" presetClass="entr" presetSubtype="0" fill="hold" grpId="0" nodeType="clickEffect">
+                                  <p:stCondLst>
+                                    <p:cond delay="0"/>
+                                  </p:stCondLst>
+                                  <p:childTnLst>
+                                    <p:set>
+                                      <p:cBhvr>
+                                        <p:cTn id="11" dur="1" fill="hold">
+                                          <p:stCondLst>
+                                            <p:cond delay="0"/>
+                                          </p:stCondLst>
+                                        </p:cTn>
+                                        <p:tgtEl>
+                                          <p:spTgt spid="10">
+                                            <p:txEl>
+                                              <p:pRg st="0" end="0"/>
+                                            </p:txEl>
+                                          </p:spTgt>
+                                        </p:tgtEl>
+                                        <p:attrNameLst>
+                                          <p:attrName>style.visibility</p:attrName>
+                                        </p:attrNameLst>
+                                      </p:cBhvr>
+                                      <p:to>
+                                        <p:strVal val="visible"/>
+                                      </p:to>
+                                    </p:set>
+                                    <p:animEffect transition="in" filter="fade">
+                                      <p:cBhvr>
+                                        <p:cTn id="12" dur="500"/>
+                                        <p:tgtEl>
+                                          <p:spTgt spid="10">
+                                            <p:txEl>
+                                              <p:pRg st="0" end="0"/>
+                                            </p:txEl>
+                                          </p:spTgt>
+                                        </p:tgtEl>
+                                      </p:cBhvr>
+                                    </p:animEffect>
+                                  </p:childTnLst>
+                                </p:cTn>
+                              </p:par>
+                            </p:childTnLst>
+                          </p:cTn>
+                        </p:par>
+                      </p:childTnLst>
+                    </p:cTn>
+                  </p:par>
+                  <p:par>
+                    <p:cTn id="13" fill="hold">
+                      <p:stCondLst>
+                        <p:cond delay="indefinite"/>
+                      </p:stCondLst>
+                      <p:childTnLst>
+                        <p:par>
+                          <p:cTn id="14" fill="hold">
+                            <p:stCondLst>
+                              <p:cond delay="0"/>
+                            </p:stCondLst>
+                            <p:childTnLst>
+                              <p:par>
+                                <p:cTn id="15" presetID="10" presetClass="entr" presetSubtype="0" fill="hold" grpId="0" nodeType="clickEffect">
+                                  <p:stCondLst>
+                                    <p:cond delay="0"/>
+                                  </p:stCondLst>
+                                  <p:childTnLst>
+                                    <p:set>
+                                      <p:cBhvr>
+                                        <p:cTn id="16" dur="1" fill="hold">
+                                          <p:stCondLst>
+                                            <p:cond delay="0"/>
+                                          </p:stCondLst>
+                                        </p:cTn>
+                                        <p:tgtEl>
+                                          <p:spTgt spid="10">
+                                            <p:txEl>
+                                              <p:pRg st="1" end="1"/>
+                                            </p:txEl>
+                                          </p:spTgt>
+                                        </p:tgtEl>
+                                        <p:attrNameLst>
+                                          <p:attrName>style.visibility</p:attrName>
+                                        </p:attrNameLst>
+                                      </p:cBhvr>
+                                      <p:to>
+                                        <p:strVal val="visible"/>
+                                      </p:to>
+                                    </p:set>
+                                    <p:animEffect transition="in" filter="fade">
+                                      <p:cBhvr>
+                                        <p:cTn id="17" dur="500"/>
+                                        <p:tgtEl>
+                                          <p:spTgt spid="10">
+                                            <p:txEl>
+                                              <p:pRg st="1" end="1"/>
+                                            </p:txEl>
+                                          </p:spTgt>
+                                        </p:tgtEl>
+                                      </p:cBhvr>
+                                    </p:animEffect>
+                                  </p:childTnLst>
+                                </p:cTn>
+                              </p:par>
+                            </p:childTnLst>
+                          </p:cTn>
+                        </p:par>
+                      </p:childTnLst>
+                    </p:cTn>
+                  </p:par>
+                  <p:par>
+                    <p:cTn id="18" fill="hold">
+                      <p:stCondLst>
+                        <p:cond delay="indefinite"/>
+                      </p:stCondLst>
+                      <p:childTnLst>
+                        <p:par>
+                          <p:cTn id="19" fill="hold">
+                            <p:stCondLst>
+                              <p:cond delay="0"/>
+                            </p:stCondLst>
+                            <p:childTnLst>
+                              <p:par>
+                                <p:cTn id="20" presetID="10" presetClass="entr" presetSubtype="0" fill="hold" grpId="0" nodeType="clickEffect">
+                                  <p:stCondLst>
+                                    <p:cond delay="0"/>
+                                  </p:stCondLst>
+                                  <p:childTnLst>
+                                    <p:set>
+                                      <p:cBhvr>
+                                        <p:cTn id="21" dur="1" fill="hold">
+                                          <p:stCondLst>
+                                            <p:cond delay="0"/>
+                                          </p:stCondLst>
+                                        </p:cTn>
+                                        <p:tgtEl>
+                                          <p:spTgt spid="10">
+                                            <p:txEl>
+                                              <p:pRg st="2" end="2"/>
+                                            </p:txEl>
+                                          </p:spTgt>
+                                        </p:tgtEl>
+                                        <p:attrNameLst>
+                                          <p:attrName>style.visibility</p:attrName>
+                                        </p:attrNameLst>
+                                      </p:cBhvr>
+                                      <p:to>
+                                        <p:strVal val="visible"/>
+                                      </p:to>
+                                    </p:set>
+                                    <p:animEffect transition="in" filter="fade">
+                                      <p:cBhvr>
+                                        <p:cTn id="22" dur="500"/>
+                                        <p:tgtEl>
+                                          <p:spTgt spid="10">
+                                            <p:txEl>
+                                              <p:pRg st="2" end="2"/>
+                                            </p:txEl>
+                                          </p:spTgt>
+                                        </p:tgtEl>
+                                      </p:cBhvr>
+                                    </p:animEffect>
+                                  </p:childTnLst>
+                                </p:cTn>
+                              </p:par>
+                            </p:childTnLst>
+                          </p:cTn>
+                        </p:par>
+                      </p:childTnLst>
+                    </p:cTn>
+                  </p:par>
+                  <p:par>
+                    <p:cTn id="23" fill="hold">
+                      <p:stCondLst>
+                        <p:cond delay="indefinite"/>
+                      </p:stCondLst>
+                      <p:childTnLst>
+                        <p:par>
+                          <p:cTn id="24" fill="hold">
+                            <p:stCondLst>
+                              <p:cond delay="0"/>
+                            </p:stCondLst>
+                            <p:childTnLst>
+                              <p:par>
+                                <p:cTn id="25" presetID="10" presetClass="entr" presetSubtype="0" fill="hold" grpId="0" nodeType="clickEffect">
+                                  <p:stCondLst>
+                                    <p:cond delay="0"/>
+                                  </p:stCondLst>
+                                  <p:childTnLst>
+                                    <p:set>
+                                      <p:cBhvr>
+                                        <p:cTn id="26" dur="1" fill="hold">
+                                          <p:stCondLst>
+                                            <p:cond delay="0"/>
+                                          </p:stCondLst>
+                                        </p:cTn>
+                                        <p:tgtEl>
+                                          <p:spTgt spid="10">
+                                            <p:txEl>
+                                              <p:pRg st="3" end="3"/>
+                                            </p:txEl>
+                                          </p:spTgt>
+                                        </p:tgtEl>
+                                        <p:attrNameLst>
+                                          <p:attrName>style.visibility</p:attrName>
+                                        </p:attrNameLst>
+                                      </p:cBhvr>
+                                      <p:to>
+                                        <p:strVal val="visible"/>
+                                      </p:to>
+                                    </p:set>
+                                    <p:animEffect transition="in" filter="fade">
+                                      <p:cBhvr>
+                                        <p:cTn id="27" dur="500"/>
+                                        <p:tgtEl>
+                                          <p:spTgt spid="10">
+                                            <p:txEl>
+                                              <p:pRg st="3" end="3"/>
+                                            </p:txEl>
+                                          </p:spTgt>
+                                        </p:tgtEl>
+                                      </p:cBhvr>
+                                    </p:animEffect>
+                                  </p:childTnLst>
+                                </p:cTn>
+                              </p:par>
+                            </p:childTnLst>
+                          </p:cTn>
+                        </p:par>
+                      </p:childTnLst>
+                    </p:cTn>
+                  </p:par>
+                  <p:par>
+                    <p:cTn id="28" fill="hold">
+                      <p:stCondLst>
+                        <p:cond delay="indefinite"/>
+                      </p:stCondLst>
+                      <p:childTnLst>
+                        <p:par>
+                          <p:cTn id="29" fill="hold">
+                            <p:stCondLst>
+                              <p:cond delay="0"/>
+                            </p:stCondLst>
+                            <p:childTnLst>
+                              <p:par>
+                                <p:cTn id="30" presetID="10" presetClass="entr" presetSubtype="0" fill="hold" grpId="0" nodeType="clickEffect">
+                                  <p:stCondLst>
+                                    <p:cond delay="0"/>
+                                  </p:stCondLst>
+                                  <p:childTnLst>
+                                    <p:set>
+                                      <p:cBhvr>
+                                        <p:cTn id="31" dur="1" fill="hold">
+                                          <p:stCondLst>
+                                            <p:cond delay="0"/>
+                                          </p:stCondLst>
+                                        </p:cTn>
+                                        <p:tgtEl>
+                                          <p:spTgt spid="10">
+                                            <p:txEl>
+                                              <p:pRg st="4" end="4"/>
+                                            </p:txEl>
+                                          </p:spTgt>
+                                        </p:tgtEl>
+                                        <p:attrNameLst>
+                                          <p:attrName>style.visibility</p:attrName>
+                                        </p:attrNameLst>
+                                      </p:cBhvr>
+                                      <p:to>
+                                        <p:strVal val="visible"/>
+                                      </p:to>
+                                    </p:set>
+                                    <p:animEffect transition="in" filter="fade">
+                                      <p:cBhvr>
+                                        <p:cTn id="32" dur="500"/>
+                                        <p:tgtEl>
+                                          <p:spTgt spid="10">
+                                            <p:txEl>
+                                              <p:pRg st="4" end="4"/>
+                                            </p:txEl>
+                                          </p:spTgt>
+                                        </p:tgtEl>
+                                      </p:cBhvr>
+                                    </p:animEffect>
+                                  </p:childTnLst>
+                                </p:cTn>
+                              </p:par>
+                            </p:childTnLst>
+                          </p:cTn>
+                        </p:par>
+                      </p:childTnLst>
+                    </p:cTn>
+                  </p:par>
+                  <p:par>
+                    <p:cTn id="33" fill="hold">
+                      <p:stCondLst>
+                        <p:cond delay="indefinite"/>
+                      </p:stCondLst>
+                      <p:childTnLst>
+                        <p:par>
+                          <p:cTn id="34" fill="hold">
+                            <p:stCondLst>
+                              <p:cond delay="0"/>
+                            </p:stCondLst>
+                            <p:childTnLst>
+                              <p:par>
+                                <p:cTn id="35" presetID="10" presetClass="entr" presetSubtype="0" fill="hold" grpId="0" nodeType="clickEffect">
+                                  <p:stCondLst>
+                                    <p:cond delay="0"/>
+                                  </p:stCondLst>
+                                  <p:childTnLst>
+                                    <p:set>
+                                      <p:cBhvr>
+                                        <p:cTn id="36" dur="1" fill="hold">
+                                          <p:stCondLst>
+                                            <p:cond delay="0"/>
+                                          </p:stCondLst>
+                                        </p:cTn>
+                                        <p:tgtEl>
+                                          <p:spTgt spid="10">
+                                            <p:txEl>
+                                              <p:pRg st="5" end="5"/>
+                                            </p:txEl>
+                                          </p:spTgt>
+                                        </p:tgtEl>
+                                        <p:attrNameLst>
+                                          <p:attrName>style.visibility</p:attrName>
+                                        </p:attrNameLst>
+                                      </p:cBhvr>
+                                      <p:to>
+                                        <p:strVal val="visible"/>
+                                      </p:to>
+                                    </p:set>
+                                    <p:animEffect transition="in" filter="fade">
+                                      <p:cBhvr>
+                                        <p:cTn id="37" dur="500"/>
+                                        <p:tgtEl>
+                                          <p:spTgt spid="10">
+                                            <p:txEl>
+                                              <p:pRg st="5" end="5"/>
+                                            </p:txEl>
+                                          </p:spTgt>
+                                        </p:tgtEl>
+                                      </p:cBhvr>
+                                    </p:animEffect>
+                                  </p:childTnLst>
+                                </p:cTn>
+                              </p:par>
+                            </p:childTnLst>
+                          </p:cTn>
+                        </p:par>
+                      </p:childTnLst>
+                    </p:cTn>
+                  </p:par>
+                  <p:par>
+                    <p:cTn id="38" fill="hold">
+                      <p:stCondLst>
+                        <p:cond delay="indefinite"/>
+                      </p:stCondLst>
+                      <p:childTnLst>
+                        <p:par>
+                          <p:cTn id="39" fill="hold">
+                            <p:stCondLst>
+                              <p:cond delay="0"/>
+                            </p:stCondLst>
+                            <p:childTnLst>
+                              <p:par>
+                                <p:cTn id="40" presetID="10" presetClass="entr" presetSubtype="0" fill="hold" grpId="0" nodeType="clickEffect">
+                                  <p:stCondLst>
+                                    <p:cond delay="0"/>
+                                  </p:stCondLst>
+                                  <p:childTnLst>
+                                    <p:set>
+                                      <p:cBhvr>
+                                        <p:cTn id="41" dur="1" fill="hold">
+                                          <p:stCondLst>
+                                            <p:cond delay="0"/>
+                                          </p:stCondLst>
+                                        </p:cTn>
+                                        <p:tgtEl>
+                                          <p:spTgt spid="10">
+                                            <p:txEl>
+                                              <p:pRg st="6" end="6"/>
+                                            </p:txEl>
+                                          </p:spTgt>
+                                        </p:tgtEl>
+                                        <p:attrNameLst>
+                                          <p:attrName>style.visibility</p:attrName>
+                                        </p:attrNameLst>
+                                      </p:cBhvr>
+                                      <p:to>
+                                        <p:strVal val="visible"/>
+                                      </p:to>
+                                    </p:set>
+                                    <p:animEffect transition="in" filter="fade">
+                                      <p:cBhvr>
+                                        <p:cTn id="42" dur="500"/>
+                                        <p:tgtEl>
+                                          <p:spTgt spid="10">
+                                            <p:txEl>
+                                              <p:pRg st="6" end="6"/>
+                                            </p:txEl>
+                                          </p:spTgt>
+                                        </p:tgtEl>
+                                      </p:cBhvr>
+                                    </p:animEffect>
+                                  </p:childTnLst>
+                                </p:cTn>
+                              </p:par>
+                            </p:childTnLst>
+                          </p:cTn>
+                        </p:par>
+                      </p:childTnLst>
+                    </p:cTn>
+                  </p:par>
+                  <p:par>
+                    <p:cTn id="43" fill="hold">
+                      <p:stCondLst>
+                        <p:cond delay="indefinite"/>
+                      </p:stCondLst>
+                      <p:childTnLst>
+                        <p:par>
+                          <p:cTn id="44" fill="hold">
+                            <p:stCondLst>
+                              <p:cond delay="0"/>
+                            </p:stCondLst>
+                            <p:childTnLst>
+                              <p:par>
+                                <p:cTn id="45" presetID="10" presetClass="entr" presetSubtype="0" fill="hold" grpId="0" nodeType="clickEffect">
+                                  <p:stCondLst>
+                                    <p:cond delay="0"/>
+                                  </p:stCondLst>
+                                  <p:childTnLst>
+                                    <p:set>
+                                      <p:cBhvr>
+                                        <p:cTn id="46" dur="1" fill="hold">
+                                          <p:stCondLst>
+                                            <p:cond delay="0"/>
+                                          </p:stCondLst>
+                                        </p:cTn>
+                                        <p:tgtEl>
+                                          <p:spTgt spid="10">
+                                            <p:txEl>
+                                              <p:pRg st="7" end="7"/>
+                                            </p:txEl>
+                                          </p:spTgt>
+                                        </p:tgtEl>
+                                        <p:attrNameLst>
+                                          <p:attrName>style.visibility</p:attrName>
+                                        </p:attrNameLst>
+                                      </p:cBhvr>
+                                      <p:to>
+                                        <p:strVal val="visible"/>
+                                      </p:to>
+                                    </p:set>
+                                    <p:animEffect transition="in" filter="fade">
+                                      <p:cBhvr>
+                                        <p:cTn id="47" dur="500"/>
+                                        <p:tgtEl>
+                                          <p:spTgt spid="10">
+                                            <p:txEl>
+                                              <p:pRg st="7" end="7"/>
+                                            </p:txEl>
+                                          </p:spTgt>
+                                        </p:tgtEl>
+                                      </p:cBhvr>
+                                    </p:animEffect>
+                                  </p:childTnLst>
+                                </p:cTn>
+                              </p:par>
+                            </p:childTnLst>
+                          </p:cTn>
+                        </p:par>
+                      </p:childTnLst>
+                    </p:cTn>
+                  </p:par>
+                  <p:par>
+                    <p:cTn id="48" fill="hold">
+                      <p:stCondLst>
+                        <p:cond delay="indefinite"/>
+                      </p:stCondLst>
+                      <p:childTnLst>
+                        <p:par>
+                          <p:cTn id="49" fill="hold">
+                            <p:stCondLst>
+                              <p:cond delay="0"/>
+                            </p:stCondLst>
+                            <p:childTnLst>
+                              <p:par>
+                                <p:cTn id="50" presetID="10" presetClass="entr" presetSubtype="0" fill="hold" grpId="0" nodeType="clickEffect">
+                                  <p:stCondLst>
+                                    <p:cond delay="0"/>
+                                  </p:stCondLst>
+                                  <p:childTnLst>
+                                    <p:set>
+                                      <p:cBhvr>
+                                        <p:cTn id="51" dur="1" fill="hold">
+                                          <p:stCondLst>
+                                            <p:cond delay="0"/>
+                                          </p:stCondLst>
+                                        </p:cTn>
+                                        <p:tgtEl>
+                                          <p:spTgt spid="10">
+                                            <p:txEl>
+                                              <p:pRg st="8" end="8"/>
+                                            </p:txEl>
+                                          </p:spTgt>
+                                        </p:tgtEl>
+                                        <p:attrNameLst>
+                                          <p:attrName>style.visibility</p:attrName>
+                                        </p:attrNameLst>
+                                      </p:cBhvr>
+                                      <p:to>
+                                        <p:strVal val="visible"/>
+                                      </p:to>
+                                    </p:set>
+                                    <p:animEffect transition="in" filter="fade">
+                                      <p:cBhvr>
+                                        <p:cTn id="52" dur="500"/>
+                                        <p:tgtEl>
+                                          <p:spTgt spid="10">
+                                            <p:txEl>
+                                              <p:pRg st="8" end="8"/>
+                                            </p:txEl>
+                                          </p:spTgt>
+                                        </p:tgtEl>
+                                      </p:cBhvr>
+                                    </p:animEffect>
+                                  </p:childTnLst>
+                                </p:cTn>
+                              </p:par>
+                            </p:childTnLst>
+                          </p:cTn>
+                        </p:par>
+                      </p:childTnLst>
+                    </p:cTn>
+                  </p:par>
+                  <p:par>
+                    <p:cTn id="53" fill="hold">
+                      <p:stCondLst>
+                        <p:cond delay="indefinite"/>
+                      </p:stCondLst>
+                      <p:childTnLst>
+                        <p:par>
+                          <p:cTn id="54" fill="hold">
+                            <p:stCondLst>
+                              <p:cond delay="0"/>
+                            </p:stCondLst>
+                            <p:childTnLst>
+                              <p:par>
+                                <p:cTn id="55" presetID="10" presetClass="entr" presetSubtype="0" fill="hold" grpId="0" nodeType="clickEffect">
+                                  <p:stCondLst>
+                                    <p:cond delay="0"/>
+                                  </p:stCondLst>
+                                  <p:childTnLst>
+                                    <p:set>
+                                      <p:cBhvr>
+                                        <p:cTn id="56" dur="1" fill="hold">
+                                          <p:stCondLst>
+                                            <p:cond delay="0"/>
+                                          </p:stCondLst>
+                                        </p:cTn>
+                                        <p:tgtEl>
+                                          <p:spTgt spid="11">
+                                            <p:txEl>
+                                              <p:pRg st="0" end="0"/>
+                                            </p:txEl>
+                                          </p:spTgt>
+                                        </p:tgtEl>
+                                        <p:attrNameLst>
+                                          <p:attrName>style.visibility</p:attrName>
+                                        </p:attrNameLst>
+                                      </p:cBhvr>
+                                      <p:to>
+                                        <p:strVal val="visible"/>
+                                      </p:to>
+                                    </p:set>
+                                    <p:animEffect transition="in" filter="fade">
+                                      <p:cBhvr>
+                                        <p:cTn id="57" dur="500"/>
+                                        <p:tgtEl>
+                                          <p:spTgt spid="11">
+                                            <p:txEl>
+                                              <p:pRg st="0" end="0"/>
+                                            </p:txEl>
+                                          </p:spTgt>
+                                        </p:tgtEl>
+                                      </p:cBhvr>
+                                    </p:animEffect>
+                                  </p:childTnLst>
+                                </p:cTn>
+                              </p:par>
+                            </p:childTnLst>
+                          </p:cTn>
+                        </p:par>
+                      </p:childTnLst>
+                    </p:cTn>
+                  </p:par>
+                  <p:par>
+                    <p:cTn id="58" fill="hold">
+                      <p:stCondLst>
+                        <p:cond delay="indefinite"/>
+                      </p:stCondLst>
+                      <p:childTnLst>
+                        <p:par>
+                          <p:cTn id="59" fill="hold">
+                            <p:stCondLst>
+                              <p:cond delay="0"/>
+                            </p:stCondLst>
+                            <p:childTnLst>
+                              <p:par>
+                                <p:cTn id="60" presetID="10" presetClass="entr" presetSubtype="0" fill="hold" grpId="0" nodeType="clickEffect">
+                                  <p:stCondLst>
+                                    <p:cond delay="0"/>
+                                  </p:stCondLst>
+                                  <p:childTnLst>
+                                    <p:set>
+                                      <p:cBhvr>
+                                        <p:cTn id="61" dur="1" fill="hold">
+                                          <p:stCondLst>
+                                            <p:cond delay="0"/>
+                                          </p:stCondLst>
+                                        </p:cTn>
+                                        <p:tgtEl>
+                                          <p:spTgt spid="11">
+                                            <p:txEl>
+                                              <p:pRg st="1" end="1"/>
+                                            </p:txEl>
+                                          </p:spTgt>
+                                        </p:tgtEl>
+                                        <p:attrNameLst>
+                                          <p:attrName>style.visibility</p:attrName>
+                                        </p:attrNameLst>
+                                      </p:cBhvr>
+                                      <p:to>
+                                        <p:strVal val="visible"/>
+                                      </p:to>
+                                    </p:set>
+                                    <p:animEffect transition="in" filter="fade">
+                                      <p:cBhvr>
+                                        <p:cTn id="62" dur="500"/>
+                                        <p:tgtEl>
+                                          <p:spTgt spid="11">
+                                            <p:txEl>
+                                              <p:pRg st="1" end="1"/>
+                                            </p:txEl>
+                                          </p:spTgt>
+                                        </p:tgtEl>
+                                      </p:cBhvr>
+                                    </p:animEffect>
+                                  </p:childTnLst>
+                                </p:cTn>
+                              </p:par>
+                            </p:childTnLst>
+                          </p:cTn>
+                        </p:par>
+                      </p:childTnLst>
+                    </p:cTn>
+                  </p:par>
+                  <p:par>
+                    <p:cTn id="63" fill="hold">
+                      <p:stCondLst>
+                        <p:cond delay="indefinite"/>
+                      </p:stCondLst>
+                      <p:childTnLst>
+                        <p:par>
+                          <p:cTn id="64" fill="hold">
+                            <p:stCondLst>
+                              <p:cond delay="0"/>
+                            </p:stCondLst>
+                            <p:childTnLst>
+                              <p:par>
+                                <p:cTn id="65" presetID="10" presetClass="entr" presetSubtype="0" fill="hold" grpId="0" nodeType="clickEffect">
+                                  <p:stCondLst>
+                                    <p:cond delay="0"/>
+                                  </p:stCondLst>
+                                  <p:childTnLst>
+                                    <p:set>
+                                      <p:cBhvr>
+                                        <p:cTn id="66" dur="1" fill="hold">
+                                          <p:stCondLst>
+                                            <p:cond delay="0"/>
+                                          </p:stCondLst>
+                                        </p:cTn>
+                                        <p:tgtEl>
+                                          <p:spTgt spid="11">
+                                            <p:txEl>
+                                              <p:pRg st="2" end="2"/>
+                                            </p:txEl>
+                                          </p:spTgt>
+                                        </p:tgtEl>
+                                        <p:attrNameLst>
+                                          <p:attrName>style.visibility</p:attrName>
+                                        </p:attrNameLst>
+                                      </p:cBhvr>
+                                      <p:to>
+                                        <p:strVal val="visible"/>
+                                      </p:to>
+                                    </p:set>
+                                    <p:animEffect transition="in" filter="fade">
+                                      <p:cBhvr>
+                                        <p:cTn id="67" dur="500"/>
+                                        <p:tgtEl>
+                                          <p:spTgt spid="11">
+                                            <p:txEl>
+                                              <p:pRg st="2" end="2"/>
+                                            </p:txEl>
+                                          </p:spTgt>
+                                        </p:tgtEl>
+                                      </p:cBhvr>
+                                    </p:animEffect>
+                                  </p:childTnLst>
+                                </p:cTn>
+                              </p:par>
+                            </p:childTnLst>
+                          </p:cTn>
+                        </p:par>
+                      </p:childTnLst>
+                    </p:cTn>
+                  </p:par>
+                  <p:par>
+                    <p:cTn id="68" fill="hold">
+                      <p:stCondLst>
+                        <p:cond delay="indefinite"/>
+                      </p:stCondLst>
+                      <p:childTnLst>
+                        <p:par>
+                          <p:cTn id="69" fill="hold">
+                            <p:stCondLst>
+                              <p:cond delay="0"/>
+                            </p:stCondLst>
+                            <p:childTnLst>
+                              <p:par>
+                                <p:cTn id="70" presetID="10" presetClass="entr" presetSubtype="0" fill="hold" grpId="0" nodeType="clickEffect">
+                                  <p:stCondLst>
+                                    <p:cond delay="0"/>
+                                  </p:stCondLst>
+                                  <p:childTnLst>
+                                    <p:set>
+                                      <p:cBhvr>
+                                        <p:cTn id="71" dur="1" fill="hold">
+                                          <p:stCondLst>
+                                            <p:cond delay="0"/>
+                                          </p:stCondLst>
+                                        </p:cTn>
+                                        <p:tgtEl>
+                                          <p:spTgt spid="11">
+                                            <p:txEl>
+                                              <p:pRg st="3" end="3"/>
+                                            </p:txEl>
+                                          </p:spTgt>
+                                        </p:tgtEl>
+                                        <p:attrNameLst>
+                                          <p:attrName>style.visibility</p:attrName>
+                                        </p:attrNameLst>
+                                      </p:cBhvr>
+                                      <p:to>
+                                        <p:strVal val="visible"/>
+                                      </p:to>
+                                    </p:set>
+                                    <p:animEffect transition="in" filter="fade">
+                                      <p:cBhvr>
+                                        <p:cTn id="72" dur="500"/>
+                                        <p:tgtEl>
+                                          <p:spTgt spid="11">
+                                            <p:txEl>
+                                              <p:pRg st="3" end="3"/>
+                                            </p:txEl>
+                                          </p:spTgt>
+                                        </p:tgtEl>
+                                      </p:cBhvr>
+                                    </p:animEffect>
+                                  </p:childTnLst>
+                                </p:cTn>
+                              </p:par>
+                            </p:childTnLst>
+                          </p:cTn>
+                        </p:par>
+                      </p:childTnLst>
+                    </p:cTn>
+                  </p:par>
+                </p:childTnLst>
+              </p:cTn>
+              <p:prevCondLst>
+                <p:cond evt="onPrev" delay="0">
+                  <p:tgtEl>
+                    <p:sldTgt/>
+                  </p:tgtEl>
+                </p:cond>
+              </p:prevCondLst>
+              <p:nextCondLst>
+                <p:cond evt="onNext" delay="0">
+                  <p:tgtEl>
+                    <p:sldTgt/>
+                  </p:tgtEl>
+                </p:cond>
+              </p:nextCondLst>
+            </p:seq>
+          </p:childTnLst>
+        </p:cTn>
+      </p:par>
+    </p:tnLst>
+    <p:bldLst>
+      <p:bldP spid="9" grpId="0"/>
+      <p:bldP spid="10" grpId="0" build="p"/>
+      <p:bldP spid="11" grpId="0" build="p"/>
+    </p:bldLst>
+  </p:timing>
+</p:sld>
+</file>
+
+<file path=ppt/slides/slide17.xml><?xml version="1.0" encoding="utf-8"?>
 <p:sld xmlns:a="http://schemas.openxmlformats.org/drawingml/2006/main" xmlns:r="http://schemas.openxmlformats.org/officeDocument/2006/relationships" xmlns:p="http://schemas.openxmlformats.org/presentationml/2006/main">
   <p:cSld>
     <p:spTree>
@@ -12613,7 +15480,7 @@
                 <a:gridCol w="11521532">
                   <a:extLst>
                     <a:ext uri="{9D8B030D-6E8A-4147-A177-3AD203B41FA5}">
-                      <a16:colId xmlns:a16="http://schemas.microsoft.com/office/drawing/2014/main" xmlns="" val="1632794655"/>
+                      <a16:colId xmlns="" xmlns:a16="http://schemas.microsoft.com/office/drawing/2014/main" val="1632794655"/>
                     </a:ext>
                   </a:extLst>
                 </a:gridCol>
@@ -12641,7 +15508,7 @@
                 </a:tc>
                 <a:extLst>
                   <a:ext uri="{0D108BD9-81ED-4DB2-BD59-A6C34878D82A}">
-                    <a16:rowId xmlns:a16="http://schemas.microsoft.com/office/drawing/2014/main" xmlns="" val="1789177411"/>
+                    <a16:rowId xmlns="" xmlns:a16="http://schemas.microsoft.com/office/drawing/2014/main" val="1789177411"/>
                   </a:ext>
                 </a:extLst>
               </a:tr>
@@ -12676,7 +15543,7 @@
                 </a:tc>
                 <a:extLst>
                   <a:ext uri="{0D108BD9-81ED-4DB2-BD59-A6C34878D82A}">
-                    <a16:rowId xmlns:a16="http://schemas.microsoft.com/office/drawing/2014/main" xmlns="" val="3842815335"/>
+                    <a16:rowId xmlns="" xmlns:a16="http://schemas.microsoft.com/office/drawing/2014/main" val="3842815335"/>
                   </a:ext>
                 </a:extLst>
               </a:tr>
@@ -12720,7 +15587,7 @@
                 </a:tc>
                 <a:extLst>
                   <a:ext uri="{0D108BD9-81ED-4DB2-BD59-A6C34878D82A}">
-                    <a16:rowId xmlns:a16="http://schemas.microsoft.com/office/drawing/2014/main" xmlns="" val="321066646"/>
+                    <a16:rowId xmlns="" xmlns:a16="http://schemas.microsoft.com/office/drawing/2014/main" val="321066646"/>
                   </a:ext>
                 </a:extLst>
               </a:tr>
@@ -12779,7 +15646,7 @@
                 </a:tc>
                 <a:extLst>
                   <a:ext uri="{0D108BD9-81ED-4DB2-BD59-A6C34878D82A}">
-                    <a16:rowId xmlns:a16="http://schemas.microsoft.com/office/drawing/2014/main" xmlns="" val="3812060533"/>
+                    <a16:rowId xmlns="" xmlns:a16="http://schemas.microsoft.com/office/drawing/2014/main" val="3812060533"/>
                   </a:ext>
                 </a:extLst>
               </a:tr>
@@ -12814,7 +15681,7 @@
                 </a:tc>
                 <a:extLst>
                   <a:ext uri="{0D108BD9-81ED-4DB2-BD59-A6C34878D82A}">
-                    <a16:rowId xmlns:a16="http://schemas.microsoft.com/office/drawing/2014/main" xmlns="" val="733235577"/>
+                    <a16:rowId xmlns="" xmlns:a16="http://schemas.microsoft.com/office/drawing/2014/main" val="733235577"/>
                   </a:ext>
                 </a:extLst>
               </a:tr>
@@ -12852,7 +15719,7 @@
                 </a:tc>
                 <a:extLst>
                   <a:ext uri="{0D108BD9-81ED-4DB2-BD59-A6C34878D82A}">
-                    <a16:rowId xmlns:a16="http://schemas.microsoft.com/office/drawing/2014/main" xmlns="" val="2343148695"/>
+                    <a16:rowId xmlns="" xmlns:a16="http://schemas.microsoft.com/office/drawing/2014/main" val="2343148695"/>
                   </a:ext>
                 </a:extLst>
               </a:tr>
@@ -13134,16 +16001,6 @@
               </a:rPr>
               <a:t>Null Coalescing Operator</a:t>
             </a:r>
-            <a:endParaRPr lang="en-US" sz="4000" dirty="0" smtClean="0">
-              <a:ln w="0"/>
-              <a:effectLst>
-                <a:outerShdw blurRad="38100" dist="19050" dir="2700000" algn="tl" rotWithShape="0">
-                  <a:schemeClr val="dk1">
-                    <a:alpha val="40000"/>
-                  </a:schemeClr>
-                </a:outerShdw>
-              </a:effectLst>
-            </a:endParaRPr>
           </a:p>
         </p:txBody>
       </p:sp>
@@ -17384,12 +20241,21 @@
 </file>
 
 <file path=customXml/item1.xml><?xml version="1.0" encoding="utf-8"?>
-<?mso-contentType ?>
-<FormTemplates xmlns="http://schemas.microsoft.com/sharepoint/v3/contenttype/forms">
-  <Display>DocumentLibraryForm</Display>
-  <Edit>DocumentLibraryForm</Edit>
-  <New>DocumentLibraryForm</New>
-</FormTemplates>
+<p:properties xmlns:p="http://schemas.microsoft.com/office/2006/metadata/properties" xmlns:xsi="http://www.w3.org/2001/XMLSchema-instance" xmlns:pc="http://schemas.microsoft.com/office/infopath/2007/PartnerControls">
+  <documentManagement>
+    <TaxCatchAll xmlns="230e9df3-be65-4c73-a93b-d1236ebd677e"/>
+    <PublishingExpirationDate xmlns="http://schemas.microsoft.com/sharepoint/v3" xsi:nil="true"/>
+    <PublishingStartDate xmlns="http://schemas.microsoft.com/sharepoint/v3" xsi:nil="true"/>
+    <TaxKeywordTaxHTField xmlns="230e9df3-be65-4c73-a93b-d1236ebd677e">
+      <Terms xmlns="http://schemas.microsoft.com/office/infopath/2007/PartnerControls">
+        <TermInfo xmlns="http://schemas.microsoft.com/office/infopath/2007/PartnerControls">
+          <TermName xmlns="http://schemas.microsoft.com/office/infopath/2007/PartnerControls">&lt;Any Related Keywords&gt;</TermName>
+          <TermId xmlns="http://schemas.microsoft.com/office/infopath/2007/PartnerControls">11111111-1111-1111-1111-111111111111</TermId>
+        </TermInfo>
+      </Terms>
+    </TaxKeywordTaxHTField>
+  </documentManagement>
+</p:properties>
 </file>
 
 <file path=customXml/item2.xml><?xml version="1.0" encoding="utf-8"?>
@@ -17575,27 +20441,21 @@
 </file>
 
 <file path=customXml/item3.xml><?xml version="1.0" encoding="utf-8"?>
-<p:properties xmlns:p="http://schemas.microsoft.com/office/2006/metadata/properties" xmlns:xsi="http://www.w3.org/2001/XMLSchema-instance" xmlns:pc="http://schemas.microsoft.com/office/infopath/2007/PartnerControls">
-  <documentManagement>
-    <TaxCatchAll xmlns="230e9df3-be65-4c73-a93b-d1236ebd677e"/>
-    <PublishingExpirationDate xmlns="http://schemas.microsoft.com/sharepoint/v3" xsi:nil="true"/>
-    <PublishingStartDate xmlns="http://schemas.microsoft.com/sharepoint/v3" xsi:nil="true"/>
-    <TaxKeywordTaxHTField xmlns="230e9df3-be65-4c73-a93b-d1236ebd677e">
-      <Terms xmlns="http://schemas.microsoft.com/office/infopath/2007/PartnerControls">
-        <TermInfo xmlns="http://schemas.microsoft.com/office/infopath/2007/PartnerControls">
-          <TermName xmlns="http://schemas.microsoft.com/office/infopath/2007/PartnerControls">&lt;Any Related Keywords&gt;</TermName>
-          <TermId xmlns="http://schemas.microsoft.com/office/infopath/2007/PartnerControls">11111111-1111-1111-1111-111111111111</TermId>
-        </TermInfo>
-      </Terms>
-    </TaxKeywordTaxHTField>
-  </documentManagement>
-</p:properties>
+<?mso-contentType ?>
+<FormTemplates xmlns="http://schemas.microsoft.com/sharepoint/v3/contenttype/forms">
+  <Display>DocumentLibraryForm</Display>
+  <Edit>DocumentLibraryForm</Edit>
+  <New>DocumentLibraryForm</New>
+</FormTemplates>
 </file>
 
 <file path=customXml/itemProps1.xml><?xml version="1.0" encoding="utf-8"?>
-<ds:datastoreItem xmlns:ds="http://schemas.openxmlformats.org/officeDocument/2006/customXml" ds:itemID="{758FDAC0-319D-4A54-8D8E-1D42CB1F8004}">
+<ds:datastoreItem xmlns:ds="http://schemas.openxmlformats.org/officeDocument/2006/customXml" ds:itemID="{F990F116-B58F-4255-B05B-DA3808E0E5C6}">
   <ds:schemaRefs>
-    <ds:schemaRef ds:uri="http://schemas.microsoft.com/sharepoint/v3/contenttype/forms"/>
+    <ds:schemaRef ds:uri="http://schemas.microsoft.com/office/2006/metadata/properties"/>
+    <ds:schemaRef ds:uri="http://schemas.microsoft.com/office/infopath/2007/PartnerControls"/>
+    <ds:schemaRef ds:uri="230e9df3-be65-4c73-a93b-d1236ebd677e"/>
+    <ds:schemaRef ds:uri="http://schemas.microsoft.com/sharepoint/v3"/>
   </ds:schemaRefs>
 </ds:datastoreItem>
 </file>
@@ -17621,12 +20481,9 @@
 </file>
 
 <file path=customXml/itemProps3.xml><?xml version="1.0" encoding="utf-8"?>
-<ds:datastoreItem xmlns:ds="http://schemas.openxmlformats.org/officeDocument/2006/customXml" ds:itemID="{F990F116-B58F-4255-B05B-DA3808E0E5C6}">
+<ds:datastoreItem xmlns:ds="http://schemas.openxmlformats.org/officeDocument/2006/customXml" ds:itemID="{758FDAC0-319D-4A54-8D8E-1D42CB1F8004}">
   <ds:schemaRefs>
-    <ds:schemaRef ds:uri="http://schemas.microsoft.com/office/2006/metadata/properties"/>
-    <ds:schemaRef ds:uri="http://schemas.microsoft.com/office/infopath/2007/PartnerControls"/>
-    <ds:schemaRef ds:uri="230e9df3-be65-4c73-a93b-d1236ebd677e"/>
-    <ds:schemaRef ds:uri="http://schemas.microsoft.com/sharepoint/v3"/>
+    <ds:schemaRef ds:uri="http://schemas.microsoft.com/sharepoint/v3/contenttype/forms"/>
   </ds:schemaRefs>
 </ds:datastoreItem>
 </file>
</xml_diff>

<commit_message>
Update slides for Module 2
</commit_message>
<xml_diff>
--- a/Slides/MVA-What'sNewC#6-Module1.pptx
+++ b/Slides/MVA-What'sNewC#6-Module1.pptx
@@ -15461,7 +15461,7 @@
             <p:ph sz="quarter" idx="10"/>
             <p:extLst>
               <p:ext uri="{D42A27DB-BD31-4B8C-83A1-F6EECF244321}">
-                <p14:modId xmlns:p14="http://schemas.microsoft.com/office/powerpoint/2010/main" val="4192331904"/>
+                <p14:modId xmlns:p14="http://schemas.microsoft.com/office/powerpoint/2010/main" val="3744406891"/>
               </p:ext>
             </p:extLst>
           </p:nvPr>
@@ -15480,7 +15480,7 @@
                 <a:gridCol w="11521532">
                   <a:extLst>
                     <a:ext uri="{9D8B030D-6E8A-4147-A177-3AD203B41FA5}">
-                      <a16:colId xmlns="" xmlns:a16="http://schemas.microsoft.com/office/drawing/2014/main" val="1632794655"/>
+                      <a16:colId xmlns:a16="http://schemas.microsoft.com/office/drawing/2014/main" xmlns="" val="1632794655"/>
                     </a:ext>
                   </a:extLst>
                 </a:gridCol>
@@ -15508,7 +15508,7 @@
                 </a:tc>
                 <a:extLst>
                   <a:ext uri="{0D108BD9-81ED-4DB2-BD59-A6C34878D82A}">
-                    <a16:rowId xmlns="" xmlns:a16="http://schemas.microsoft.com/office/drawing/2014/main" val="1789177411"/>
+                    <a16:rowId xmlns:a16="http://schemas.microsoft.com/office/drawing/2014/main" xmlns="" val="1789177411"/>
                   </a:ext>
                 </a:extLst>
               </a:tr>
@@ -15519,21 +15519,21 @@
                     <a:lstStyle/>
                     <a:p>
                       <a:r>
-                        <a:rPr lang="en-US" sz="2400" dirty="0" smtClean="0">
+                        <a:rPr lang="en-US" sz="2400" b="1" i="1" dirty="0" smtClean="0">
                           <a:latin typeface="Segoe UI Light" panose="020B0502040204020203" pitchFamily="34" charset="0"/>
                           <a:cs typeface="Segoe UI Light" panose="020B0502040204020203" pitchFamily="34" charset="0"/>
                         </a:rPr>
                         <a:t>01 | </a:t>
                       </a:r>
                       <a:r>
-                        <a:rPr lang="en-US" sz="2400" dirty="0" smtClean="0"/>
+                        <a:rPr lang="en-US" sz="2400" b="1" i="1" dirty="0" smtClean="0"/>
                         <a:t>C#</a:t>
                       </a:r>
                       <a:r>
-                        <a:rPr lang="en-US" sz="2400" baseline="0" dirty="0" smtClean="0"/>
+                        <a:rPr lang="en-US" sz="2400" b="1" i="1" baseline="0" dirty="0" smtClean="0"/>
                         <a:t> features add productivity and conciseness</a:t>
                       </a:r>
-                      <a:endParaRPr lang="en-US" sz="2400" dirty="0">
+                      <a:endParaRPr lang="en-US" sz="2400" b="1" i="1" dirty="0">
                         <a:latin typeface="Segoe UI Light" panose="020B0502040204020203" pitchFamily="34" charset="0"/>
                         <a:cs typeface="Segoe UI Light" panose="020B0502040204020203" pitchFamily="34" charset="0"/>
                       </a:endParaRPr>
@@ -15543,7 +15543,7 @@
                 </a:tc>
                 <a:extLst>
                   <a:ext uri="{0D108BD9-81ED-4DB2-BD59-A6C34878D82A}">
-                    <a16:rowId xmlns="" xmlns:a16="http://schemas.microsoft.com/office/drawing/2014/main" val="3842815335"/>
+                    <a16:rowId xmlns:a16="http://schemas.microsoft.com/office/drawing/2014/main" xmlns="" val="3842815335"/>
                   </a:ext>
                 </a:extLst>
               </a:tr>
@@ -15587,7 +15587,7 @@
                 </a:tc>
                 <a:extLst>
                   <a:ext uri="{0D108BD9-81ED-4DB2-BD59-A6C34878D82A}">
-                    <a16:rowId xmlns="" xmlns:a16="http://schemas.microsoft.com/office/drawing/2014/main" val="321066646"/>
+                    <a16:rowId xmlns:a16="http://schemas.microsoft.com/office/drawing/2014/main" xmlns="" val="321066646"/>
                   </a:ext>
                 </a:extLst>
               </a:tr>
@@ -15646,7 +15646,7 @@
                 </a:tc>
                 <a:extLst>
                   <a:ext uri="{0D108BD9-81ED-4DB2-BD59-A6C34878D82A}">
-                    <a16:rowId xmlns="" xmlns:a16="http://schemas.microsoft.com/office/drawing/2014/main" val="3812060533"/>
+                    <a16:rowId xmlns:a16="http://schemas.microsoft.com/office/drawing/2014/main" xmlns="" val="3812060533"/>
                   </a:ext>
                 </a:extLst>
               </a:tr>
@@ -15681,7 +15681,7 @@
                 </a:tc>
                 <a:extLst>
                   <a:ext uri="{0D108BD9-81ED-4DB2-BD59-A6C34878D82A}">
-                    <a16:rowId xmlns="" xmlns:a16="http://schemas.microsoft.com/office/drawing/2014/main" val="733235577"/>
+                    <a16:rowId xmlns:a16="http://schemas.microsoft.com/office/drawing/2014/main" xmlns="" val="733235577"/>
                   </a:ext>
                 </a:extLst>
               </a:tr>
@@ -15719,7 +15719,7 @@
                 </a:tc>
                 <a:extLst>
                   <a:ext uri="{0D108BD9-81ED-4DB2-BD59-A6C34878D82A}">
-                    <a16:rowId xmlns="" xmlns:a16="http://schemas.microsoft.com/office/drawing/2014/main" val="2343148695"/>
+                    <a16:rowId xmlns:a16="http://schemas.microsoft.com/office/drawing/2014/main" xmlns="" val="2343148695"/>
                   </a:ext>
                 </a:extLst>
               </a:tr>
@@ -20241,24 +20241,6 @@
 </file>
 
 <file path=customXml/item1.xml><?xml version="1.0" encoding="utf-8"?>
-<p:properties xmlns:p="http://schemas.microsoft.com/office/2006/metadata/properties" xmlns:xsi="http://www.w3.org/2001/XMLSchema-instance" xmlns:pc="http://schemas.microsoft.com/office/infopath/2007/PartnerControls">
-  <documentManagement>
-    <TaxCatchAll xmlns="230e9df3-be65-4c73-a93b-d1236ebd677e"/>
-    <PublishingExpirationDate xmlns="http://schemas.microsoft.com/sharepoint/v3" xsi:nil="true"/>
-    <PublishingStartDate xmlns="http://schemas.microsoft.com/sharepoint/v3" xsi:nil="true"/>
-    <TaxKeywordTaxHTField xmlns="230e9df3-be65-4c73-a93b-d1236ebd677e">
-      <Terms xmlns="http://schemas.microsoft.com/office/infopath/2007/PartnerControls">
-        <TermInfo xmlns="http://schemas.microsoft.com/office/infopath/2007/PartnerControls">
-          <TermName xmlns="http://schemas.microsoft.com/office/infopath/2007/PartnerControls">&lt;Any Related Keywords&gt;</TermName>
-          <TermId xmlns="http://schemas.microsoft.com/office/infopath/2007/PartnerControls">11111111-1111-1111-1111-111111111111</TermId>
-        </TermInfo>
-      </Terms>
-    </TaxKeywordTaxHTField>
-  </documentManagement>
-</p:properties>
-</file>
-
-<file path=customXml/item2.xml><?xml version="1.0" encoding="utf-8"?>
 <ct:contentTypeSchema xmlns:ct="http://schemas.microsoft.com/office/2006/metadata/contentType" xmlns:ma="http://schemas.microsoft.com/office/2006/metadata/properties/metaAttributes" ct:_="" ma:_="" ma:contentTypeName="Document" ma:contentTypeID="0x010100496889825850D44592AC5D2F43187AE4" ma:contentTypeVersion="5" ma:contentTypeDescription="Create a new document." ma:contentTypeScope="" ma:versionID="2e43eb919f408cd810abfc945a86e7c8">
   <xsd:schema xmlns:xsd="http://www.w3.org/2001/XMLSchema" xmlns:xs="http://www.w3.org/2001/XMLSchema" xmlns:p="http://schemas.microsoft.com/office/2006/metadata/properties" xmlns:ns1="http://schemas.microsoft.com/sharepoint/v3" xmlns:ns2="230e9df3-be65-4c73-a93b-d1236ebd677e" xmlns:ns3="27aa9422-7f1f-4c84-9cdf-302b1a67e513" targetNamespace="http://schemas.microsoft.com/office/2006/metadata/properties" ma:root="true" ma:fieldsID="3b003b013a7c5b8f8e3d494956829bef" ns1:_="" ns2:_="" ns3:_="">
     <xsd:import namespace="http://schemas.microsoft.com/sharepoint/v3"/>
@@ -20440,6 +20422,24 @@
 </ct:contentTypeSchema>
 </file>
 
+<file path=customXml/item2.xml><?xml version="1.0" encoding="utf-8"?>
+<p:properties xmlns:p="http://schemas.microsoft.com/office/2006/metadata/properties" xmlns:xsi="http://www.w3.org/2001/XMLSchema-instance" xmlns:pc="http://schemas.microsoft.com/office/infopath/2007/PartnerControls">
+  <documentManagement>
+    <TaxCatchAll xmlns="230e9df3-be65-4c73-a93b-d1236ebd677e"/>
+    <PublishingExpirationDate xmlns="http://schemas.microsoft.com/sharepoint/v3" xsi:nil="true"/>
+    <PublishingStartDate xmlns="http://schemas.microsoft.com/sharepoint/v3" xsi:nil="true"/>
+    <TaxKeywordTaxHTField xmlns="230e9df3-be65-4c73-a93b-d1236ebd677e">
+      <Terms xmlns="http://schemas.microsoft.com/office/infopath/2007/PartnerControls">
+        <TermInfo xmlns="http://schemas.microsoft.com/office/infopath/2007/PartnerControls">
+          <TermName xmlns="http://schemas.microsoft.com/office/infopath/2007/PartnerControls">&lt;Any Related Keywords&gt;</TermName>
+          <TermId xmlns="http://schemas.microsoft.com/office/infopath/2007/PartnerControls">11111111-1111-1111-1111-111111111111</TermId>
+        </TermInfo>
+      </Terms>
+    </TaxKeywordTaxHTField>
+  </documentManagement>
+</p:properties>
+</file>
+
 <file path=customXml/item3.xml><?xml version="1.0" encoding="utf-8"?>
 <?mso-contentType ?>
 <FormTemplates xmlns="http://schemas.microsoft.com/sharepoint/v3/contenttype/forms">
@@ -20450,17 +20450,6 @@
 </file>
 
 <file path=customXml/itemProps1.xml><?xml version="1.0" encoding="utf-8"?>
-<ds:datastoreItem xmlns:ds="http://schemas.openxmlformats.org/officeDocument/2006/customXml" ds:itemID="{F990F116-B58F-4255-B05B-DA3808E0E5C6}">
-  <ds:schemaRefs>
-    <ds:schemaRef ds:uri="http://schemas.microsoft.com/office/2006/metadata/properties"/>
-    <ds:schemaRef ds:uri="http://schemas.microsoft.com/office/infopath/2007/PartnerControls"/>
-    <ds:schemaRef ds:uri="230e9df3-be65-4c73-a93b-d1236ebd677e"/>
-    <ds:schemaRef ds:uri="http://schemas.microsoft.com/sharepoint/v3"/>
-  </ds:schemaRefs>
-</ds:datastoreItem>
-</file>
-
-<file path=customXml/itemProps2.xml><?xml version="1.0" encoding="utf-8"?>
 <ds:datastoreItem xmlns:ds="http://schemas.openxmlformats.org/officeDocument/2006/customXml" ds:itemID="{8279456A-742D-4736-95C0-19A1E0B853B2}">
   <ds:schemaRefs>
     <ds:schemaRef ds:uri="http://schemas.microsoft.com/office/2006/metadata/contentType"/>
@@ -20480,6 +20469,17 @@
 </ds:datastoreItem>
 </file>
 
+<file path=customXml/itemProps2.xml><?xml version="1.0" encoding="utf-8"?>
+<ds:datastoreItem xmlns:ds="http://schemas.openxmlformats.org/officeDocument/2006/customXml" ds:itemID="{F990F116-B58F-4255-B05B-DA3808E0E5C6}">
+  <ds:schemaRefs>
+    <ds:schemaRef ds:uri="http://schemas.microsoft.com/office/2006/metadata/properties"/>
+    <ds:schemaRef ds:uri="http://schemas.microsoft.com/office/infopath/2007/PartnerControls"/>
+    <ds:schemaRef ds:uri="230e9df3-be65-4c73-a93b-d1236ebd677e"/>
+    <ds:schemaRef ds:uri="http://schemas.microsoft.com/sharepoint/v3"/>
+  </ds:schemaRefs>
+</ds:datastoreItem>
+</file>
+
 <file path=customXml/itemProps3.xml><?xml version="1.0" encoding="utf-8"?>
 <ds:datastoreItem xmlns:ds="http://schemas.openxmlformats.org/officeDocument/2006/customXml" ds:itemID="{758FDAC0-319D-4A54-8D8E-1D42CB1F8004}">
   <ds:schemaRefs>

</xml_diff>